<commit_message>
Updated it even more
</commit_message>
<xml_diff>
--- a/Documentation/SmartGridChain.pptx
+++ b/Documentation/SmartGridChain.pptx
@@ -6,10 +6,10 @@
     <p:sldMasterId id="2147483660" r:id="rId2"/>
   </p:sldMasterIdLst>
   <p:notesMasterIdLst>
-    <p:notesMasterId r:id="rId12"/>
+    <p:notesMasterId r:id="rId14"/>
   </p:notesMasterIdLst>
   <p:handoutMasterIdLst>
-    <p:handoutMasterId r:id="rId13"/>
+    <p:handoutMasterId r:id="rId15"/>
   </p:handoutMasterIdLst>
   <p:sldIdLst>
     <p:sldId id="277" r:id="rId3"/>
@@ -18,9 +18,11 @@
     <p:sldId id="271" r:id="rId6"/>
     <p:sldId id="278" r:id="rId7"/>
     <p:sldId id="272" r:id="rId8"/>
-    <p:sldId id="273" r:id="rId9"/>
-    <p:sldId id="274" r:id="rId10"/>
-    <p:sldId id="275" r:id="rId11"/>
+    <p:sldId id="280" r:id="rId9"/>
+    <p:sldId id="279" r:id="rId10"/>
+    <p:sldId id="273" r:id="rId11"/>
+    <p:sldId id="274" r:id="rId12"/>
+    <p:sldId id="275" r:id="rId13"/>
   </p:sldIdLst>
   <p:sldSz cx="9144000" cy="5143500" type="screen16x9"/>
   <p:notesSz cx="6858000" cy="9144000"/>
@@ -127,7 +129,7 @@
             <a:srgbClr val="A4A3A4"/>
           </p15:clr>
         </p15:guide>
-        <p15:guide id="2" pos="2880">
+        <p15:guide id="2" pos="5420" userDrawn="1">
           <p15:clr>
             <a:srgbClr val="A4A3A4"/>
           </p15:clr>
@@ -1241,6 +1243,186 @@
     <p:extLst>
       <p:ext uri="{BB962C8B-B14F-4D97-AF65-F5344CB8AC3E}">
         <p14:creationId xmlns:p14="http://schemas.microsoft.com/office/powerpoint/2010/main" val="2201260014"/>
+      </p:ext>
+    </p:extLst>
+  </p:cSld>
+  <p:clrMapOvr>
+    <a:masterClrMapping/>
+  </p:clrMapOvr>
+</p:notes>
+</file>
+
+<file path=ppt/notesSlides/notesSlide5.xml><?xml version="1.0" encoding="utf-8"?>
+<p:notes xmlns:a="http://schemas.openxmlformats.org/drawingml/2006/main" xmlns:r="http://schemas.openxmlformats.org/officeDocument/2006/relationships" xmlns:p="http://schemas.openxmlformats.org/presentationml/2006/main">
+  <p:cSld>
+    <p:spTree>
+      <p:nvGrpSpPr>
+        <p:cNvPr id="1" name=""/>
+        <p:cNvGrpSpPr/>
+        <p:nvPr/>
+      </p:nvGrpSpPr>
+      <p:grpSpPr>
+        <a:xfrm>
+          <a:off x="0" y="0"/>
+          <a:ext cx="0" cy="0"/>
+          <a:chOff x="0" y="0"/>
+          <a:chExt cx="0" cy="0"/>
+        </a:xfrm>
+      </p:grpSpPr>
+      <p:sp>
+        <p:nvSpPr>
+          <p:cNvPr id="2" name="Tijdelijke aanduiding voor dia-afbeelding 1"/>
+          <p:cNvSpPr>
+            <a:spLocks noGrp="1" noRot="1" noChangeAspect="1"/>
+          </p:cNvSpPr>
+          <p:nvPr>
+            <p:ph type="sldImg"/>
+          </p:nvPr>
+        </p:nvSpPr>
+        <p:spPr/>
+      </p:sp>
+      <p:sp>
+        <p:nvSpPr>
+          <p:cNvPr id="3" name="Tijdelijke aanduiding voor notities 2"/>
+          <p:cNvSpPr>
+            <a:spLocks noGrp="1"/>
+          </p:cNvSpPr>
+          <p:nvPr>
+            <p:ph type="body" idx="1"/>
+          </p:nvPr>
+        </p:nvSpPr>
+        <p:spPr/>
+        <p:txBody>
+          <a:bodyPr/>
+          <a:lstStyle/>
+          <a:p>
+            <a:endParaRPr lang="en-US" dirty="0"/>
+          </a:p>
+        </p:txBody>
+      </p:sp>
+      <p:sp>
+        <p:nvSpPr>
+          <p:cNvPr id="4" name="Tijdelijke aanduiding voor dianummer 3"/>
+          <p:cNvSpPr>
+            <a:spLocks noGrp="1"/>
+          </p:cNvSpPr>
+          <p:nvPr>
+            <p:ph type="sldNum" sz="quarter" idx="10"/>
+          </p:nvPr>
+        </p:nvSpPr>
+        <p:spPr/>
+        <p:txBody>
+          <a:bodyPr/>
+          <a:lstStyle/>
+          <a:p>
+            <a:fld id="{37ABA2E9-BF41-4C3A-A6E3-EB331EAF49EB}" type="slidenum">
+              <a:rPr lang="nl-NL" smtClean="0"/>
+              <a:t>6</a:t>
+            </a:fld>
+            <a:endParaRPr lang="nl-NL"/>
+          </a:p>
+        </p:txBody>
+      </p:sp>
+    </p:spTree>
+    <p:extLst>
+      <p:ext uri="{BB962C8B-B14F-4D97-AF65-F5344CB8AC3E}">
+        <p14:creationId xmlns:p14="http://schemas.microsoft.com/office/powerpoint/2010/main" val="4283458700"/>
+      </p:ext>
+    </p:extLst>
+  </p:cSld>
+  <p:clrMapOvr>
+    <a:masterClrMapping/>
+  </p:clrMapOvr>
+</p:notes>
+</file>
+
+<file path=ppt/notesSlides/notesSlide6.xml><?xml version="1.0" encoding="utf-8"?>
+<p:notes xmlns:a="http://schemas.openxmlformats.org/drawingml/2006/main" xmlns:r="http://schemas.openxmlformats.org/officeDocument/2006/relationships" xmlns:p="http://schemas.openxmlformats.org/presentationml/2006/main">
+  <p:cSld>
+    <p:spTree>
+      <p:nvGrpSpPr>
+        <p:cNvPr id="1" name=""/>
+        <p:cNvGrpSpPr/>
+        <p:nvPr/>
+      </p:nvGrpSpPr>
+      <p:grpSpPr>
+        <a:xfrm>
+          <a:off x="0" y="0"/>
+          <a:ext cx="0" cy="0"/>
+          <a:chOff x="0" y="0"/>
+          <a:chExt cx="0" cy="0"/>
+        </a:xfrm>
+      </p:grpSpPr>
+      <p:sp>
+        <p:nvSpPr>
+          <p:cNvPr id="2" name="Tijdelijke aanduiding voor dia-afbeelding 1"/>
+          <p:cNvSpPr>
+            <a:spLocks noGrp="1" noRot="1" noChangeAspect="1"/>
+          </p:cNvSpPr>
+          <p:nvPr>
+            <p:ph type="sldImg"/>
+          </p:nvPr>
+        </p:nvSpPr>
+        <p:spPr/>
+      </p:sp>
+      <p:sp>
+        <p:nvSpPr>
+          <p:cNvPr id="3" name="Tijdelijke aanduiding voor notities 2"/>
+          <p:cNvSpPr>
+            <a:spLocks noGrp="1"/>
+          </p:cNvSpPr>
+          <p:nvPr>
+            <p:ph type="body" idx="1"/>
+          </p:nvPr>
+        </p:nvSpPr>
+        <p:spPr/>
+        <p:txBody>
+          <a:bodyPr/>
+          <a:lstStyle/>
+          <a:p>
+            <a:r>
+              <a:rPr lang="en-US" sz="1200" b="0" i="0" u="none" strike="noStrike" kern="1200" dirty="0">
+                <a:solidFill>
+                  <a:schemeClr val="tx1"/>
+                </a:solidFill>
+                <a:effectLst/>
+                <a:latin typeface="+mn-lt"/>
+                <a:ea typeface="+mn-ea"/>
+                <a:cs typeface="+mn-cs"/>
+              </a:rPr>
+              <a:t>Proof of stake (proof of work defies the purpose: waste energy to solve energy problems</a:t>
+            </a:r>
+            <a:endParaRPr lang="en-US" dirty="0"/>
+          </a:p>
+        </p:txBody>
+      </p:sp>
+      <p:sp>
+        <p:nvSpPr>
+          <p:cNvPr id="4" name="Tijdelijke aanduiding voor dianummer 3"/>
+          <p:cNvSpPr>
+            <a:spLocks noGrp="1"/>
+          </p:cNvSpPr>
+          <p:nvPr>
+            <p:ph type="sldNum" sz="quarter" idx="10"/>
+          </p:nvPr>
+        </p:nvSpPr>
+        <p:spPr/>
+        <p:txBody>
+          <a:bodyPr/>
+          <a:lstStyle/>
+          <a:p>
+            <a:fld id="{37ABA2E9-BF41-4C3A-A6E3-EB331EAF49EB}" type="slidenum">
+              <a:rPr lang="nl-NL" smtClean="0"/>
+              <a:t>8</a:t>
+            </a:fld>
+            <a:endParaRPr lang="nl-NL"/>
+          </a:p>
+        </p:txBody>
+      </p:sp>
+    </p:spTree>
+    <p:extLst>
+      <p:ext uri="{BB962C8B-B14F-4D97-AF65-F5344CB8AC3E}">
+        <p14:creationId xmlns:p14="http://schemas.microsoft.com/office/powerpoint/2010/main" val="2525328243"/>
       </p:ext>
     </p:extLst>
   </p:cSld>
@@ -3363,7 +3545,7 @@
         </p:nvSpPr>
         <p:spPr>
           <a:xfrm>
-            <a:off x="1560786" y="2119070"/>
+            <a:off x="1560786" y="2134438"/>
             <a:ext cx="7583214" cy="849367"/>
           </a:xfrm>
           <a:prstGeom prst="rect">
@@ -3565,6 +3747,172 @@
 </p:sld>
 </file>
 
+<file path=ppt/slides/slide10.xml><?xml version="1.0" encoding="utf-8"?>
+<p:sld xmlns:a="http://schemas.openxmlformats.org/drawingml/2006/main" xmlns:r="http://schemas.openxmlformats.org/officeDocument/2006/relationships" xmlns:p="http://schemas.openxmlformats.org/presentationml/2006/main">
+  <p:cSld>
+    <p:spTree>
+      <p:nvGrpSpPr>
+        <p:cNvPr id="1" name=""/>
+        <p:cNvGrpSpPr/>
+        <p:nvPr/>
+      </p:nvGrpSpPr>
+      <p:grpSpPr>
+        <a:xfrm>
+          <a:off x="0" y="0"/>
+          <a:ext cx="0" cy="0"/>
+          <a:chOff x="0" y="0"/>
+          <a:chExt cx="0" cy="0"/>
+        </a:xfrm>
+      </p:grpSpPr>
+      <p:sp>
+        <p:nvSpPr>
+          <p:cNvPr id="2" name="Title 1"/>
+          <p:cNvSpPr>
+            <a:spLocks noGrp="1"/>
+          </p:cNvSpPr>
+          <p:nvPr>
+            <p:ph type="title"/>
+          </p:nvPr>
+        </p:nvSpPr>
+        <p:spPr/>
+        <p:txBody>
+          <a:bodyPr>
+            <a:normAutofit/>
+          </a:bodyPr>
+          <a:lstStyle/>
+          <a:p>
+            <a:r>
+              <a:rPr lang="en-US" dirty="0"/>
+              <a:t>Demo</a:t>
+            </a:r>
+          </a:p>
+        </p:txBody>
+      </p:sp>
+      <p:sp>
+        <p:nvSpPr>
+          <p:cNvPr id="3" name="Content Placeholder 2"/>
+          <p:cNvSpPr>
+            <a:spLocks noGrp="1"/>
+          </p:cNvSpPr>
+          <p:nvPr>
+            <p:ph idx="1"/>
+          </p:nvPr>
+        </p:nvSpPr>
+        <p:spPr>
+          <a:xfrm>
+            <a:off x="1763106" y="842037"/>
+            <a:ext cx="7106464" cy="3844235"/>
+          </a:xfrm>
+        </p:spPr>
+        <p:txBody>
+          <a:bodyPr>
+            <a:normAutofit/>
+          </a:bodyPr>
+          <a:lstStyle/>
+          <a:p>
+            <a:pPr marL="0" indent="0">
+              <a:buNone/>
+            </a:pPr>
+            <a:endParaRPr lang="en-US" dirty="0"/>
+          </a:p>
+        </p:txBody>
+      </p:sp>
+    </p:spTree>
+    <p:extLst>
+      <p:ext uri="{BB962C8B-B14F-4D97-AF65-F5344CB8AC3E}">
+        <p14:creationId xmlns:p14="http://schemas.microsoft.com/office/powerpoint/2010/main" val="3839504634"/>
+      </p:ext>
+    </p:extLst>
+  </p:cSld>
+  <p:clrMapOvr>
+    <a:masterClrMapping/>
+  </p:clrMapOvr>
+</p:sld>
+</file>
+
+<file path=ppt/slides/slide11.xml><?xml version="1.0" encoding="utf-8"?>
+<p:sld xmlns:a="http://schemas.openxmlformats.org/drawingml/2006/main" xmlns:r="http://schemas.openxmlformats.org/officeDocument/2006/relationships" xmlns:p="http://schemas.openxmlformats.org/presentationml/2006/main">
+  <p:cSld>
+    <p:spTree>
+      <p:nvGrpSpPr>
+        <p:cNvPr id="1" name=""/>
+        <p:cNvGrpSpPr/>
+        <p:nvPr/>
+      </p:nvGrpSpPr>
+      <p:grpSpPr>
+        <a:xfrm>
+          <a:off x="0" y="0"/>
+          <a:ext cx="0" cy="0"/>
+          <a:chOff x="0" y="0"/>
+          <a:chExt cx="0" cy="0"/>
+        </a:xfrm>
+      </p:grpSpPr>
+      <p:sp>
+        <p:nvSpPr>
+          <p:cNvPr id="2" name="Title 1"/>
+          <p:cNvSpPr>
+            <a:spLocks noGrp="1"/>
+          </p:cNvSpPr>
+          <p:nvPr>
+            <p:ph type="title"/>
+          </p:nvPr>
+        </p:nvSpPr>
+        <p:spPr/>
+        <p:txBody>
+          <a:bodyPr>
+            <a:normAutofit/>
+          </a:bodyPr>
+          <a:lstStyle/>
+          <a:p>
+            <a:r>
+              <a:rPr lang="en-US" dirty="0"/>
+              <a:t>Questions</a:t>
+            </a:r>
+          </a:p>
+        </p:txBody>
+      </p:sp>
+      <p:sp>
+        <p:nvSpPr>
+          <p:cNvPr id="3" name="Content Placeholder 2"/>
+          <p:cNvSpPr>
+            <a:spLocks noGrp="1"/>
+          </p:cNvSpPr>
+          <p:nvPr>
+            <p:ph idx="1"/>
+          </p:nvPr>
+        </p:nvSpPr>
+        <p:spPr>
+          <a:xfrm>
+            <a:off x="1763106" y="842037"/>
+            <a:ext cx="7106464" cy="3844235"/>
+          </a:xfrm>
+        </p:spPr>
+        <p:txBody>
+          <a:bodyPr>
+            <a:normAutofit/>
+          </a:bodyPr>
+          <a:lstStyle/>
+          <a:p>
+            <a:pPr marL="0" indent="0">
+              <a:buNone/>
+            </a:pPr>
+            <a:endParaRPr lang="en-US" dirty="0"/>
+          </a:p>
+        </p:txBody>
+      </p:sp>
+    </p:spTree>
+    <p:extLst>
+      <p:ext uri="{BB962C8B-B14F-4D97-AF65-F5344CB8AC3E}">
+        <p14:creationId xmlns:p14="http://schemas.microsoft.com/office/powerpoint/2010/main" val="2585660627"/>
+      </p:ext>
+    </p:extLst>
+  </p:cSld>
+  <p:clrMapOvr>
+    <a:masterClrMapping/>
+  </p:clrMapOvr>
+</p:sld>
+</file>
+
 <file path=ppt/slides/slide2.xml><?xml version="1.0" encoding="utf-8"?>
 <p:sld xmlns:a="http://schemas.openxmlformats.org/drawingml/2006/main" xmlns:r="http://schemas.openxmlformats.org/officeDocument/2006/relationships" xmlns:p="http://schemas.openxmlformats.org/presentationml/2006/main">
   <p:cSld>
@@ -3917,7 +4265,7 @@
         </p:nvSpPr>
         <p:spPr>
           <a:xfrm>
-            <a:off x="5987206" y="4267403"/>
+            <a:off x="5594177" y="4243340"/>
             <a:ext cx="3075343" cy="553998"/>
           </a:xfrm>
           <a:prstGeom prst="rect">
@@ -4017,7 +4365,7 @@
         </p:nvSpPr>
         <p:spPr>
           <a:xfrm>
-            <a:off x="5891406" y="4042563"/>
+            <a:off x="5498377" y="4018500"/>
             <a:ext cx="1588232" cy="307777"/>
           </a:xfrm>
           <a:prstGeom prst="rect">
@@ -7264,7 +7612,7 @@
         </p:nvSpPr>
         <p:spPr>
           <a:xfrm>
-            <a:off x="5987206" y="4267403"/>
+            <a:off x="5518482" y="4267403"/>
             <a:ext cx="3075343" cy="553998"/>
           </a:xfrm>
           <a:prstGeom prst="rect">
@@ -7364,7 +7712,7 @@
         </p:nvSpPr>
         <p:spPr>
           <a:xfrm>
-            <a:off x="5891406" y="4042563"/>
+            <a:off x="5422682" y="4042563"/>
             <a:ext cx="1588232" cy="307777"/>
           </a:xfrm>
           <a:prstGeom prst="rect">
@@ -7694,26 +8042,35 @@
                                   </p:childTnLst>
                                 </p:cTn>
                               </p:par>
-                            </p:childTnLst>
-                          </p:cTn>
-                        </p:par>
-                      </p:childTnLst>
-                    </p:cTn>
-                  </p:par>
-                  <p:par>
-                    <p:cTn id="25" fill="hold">
-                      <p:stCondLst>
-                        <p:cond delay="indefinite"/>
-                      </p:stCondLst>
-                      <p:childTnLst>
-                        <p:par>
-                          <p:cTn id="26" fill="hold">
-                            <p:stCondLst>
-                              <p:cond delay="0"/>
-                            </p:stCondLst>
-                            <p:childTnLst>
                               <p:par>
-                                <p:cTn id="27" presetID="1" presetClass="entr" presetSubtype="0" fill="hold" grpId="0" nodeType="clickEffect">
+                                <p:cTn id="25" presetID="1" presetClass="entr" presetSubtype="0" fill="hold" grpId="0" nodeType="withEffect">
+                                  <p:stCondLst>
+                                    <p:cond delay="0"/>
+                                  </p:stCondLst>
+                                  <p:childTnLst>
+                                    <p:set>
+                                      <p:cBhvr>
+                                        <p:cTn id="26" dur="1" fill="hold">
+                                          <p:stCondLst>
+                                            <p:cond delay="0"/>
+                                          </p:stCondLst>
+                                        </p:cTn>
+                                        <p:tgtEl>
+                                          <p:spTgt spid="192"/>
+                                        </p:tgtEl>
+                                        <p:attrNameLst>
+                                          <p:attrName>style.visibility</p:attrName>
+                                        </p:attrNameLst>
+                                      </p:cBhvr>
+                                      <p:to>
+                                        <p:strVal val="visible"/>
+                                      </p:to>
+                                    </p:set>
+                                  </p:childTnLst>
+                                </p:cTn>
+                              </p:par>
+                              <p:par>
+                                <p:cTn id="27" presetID="1" presetClass="entr" presetSubtype="0" fill="hold" grpId="0" nodeType="withEffect">
                                   <p:stCondLst>
                                     <p:cond delay="0"/>
                                   </p:stCondLst>
@@ -7726,7 +8083,7 @@
                                           </p:stCondLst>
                                         </p:cTn>
                                         <p:tgtEl>
-                                          <p:spTgt spid="145"/>
+                                          <p:spTgt spid="193"/>
                                         </p:tgtEl>
                                         <p:attrNameLst>
                                           <p:attrName>style.visibility</p:attrName>
@@ -7771,7 +8128,7 @@
                                           </p:stCondLst>
                                         </p:cTn>
                                         <p:tgtEl>
-                                          <p:spTgt spid="147"/>
+                                          <p:spTgt spid="145"/>
                                         </p:tgtEl>
                                         <p:attrNameLst>
                                           <p:attrName>style.visibility</p:attrName>
@@ -7816,7 +8173,7 @@
                                           </p:stCondLst>
                                         </p:cTn>
                                         <p:tgtEl>
-                                          <p:spTgt spid="155"/>
+                                          <p:spTgt spid="147"/>
                                         </p:tgtEl>
                                         <p:attrNameLst>
                                           <p:attrName>style.visibility</p:attrName>
@@ -7861,7 +8218,7 @@
                                           </p:stCondLst>
                                         </p:cTn>
                                         <p:tgtEl>
-                                          <p:spTgt spid="156"/>
+                                          <p:spTgt spid="155"/>
                                         </p:tgtEl>
                                         <p:attrNameLst>
                                           <p:attrName>style.visibility</p:attrName>
@@ -7893,7 +8250,7 @@
                             </p:stCondLst>
                             <p:childTnLst>
                               <p:par>
-                                <p:cTn id="43" presetID="1" presetClass="entr" presetSubtype="0" fill="hold" nodeType="clickEffect">
+                                <p:cTn id="43" presetID="1" presetClass="entr" presetSubtype="0" fill="hold" grpId="0" nodeType="clickEffect">
                                   <p:stCondLst>
                                     <p:cond delay="0"/>
                                   </p:stCondLst>
@@ -7901,6 +8258,51 @@
                                     <p:set>
                                       <p:cBhvr>
                                         <p:cTn id="44" dur="1" fill="hold">
+                                          <p:stCondLst>
+                                            <p:cond delay="0"/>
+                                          </p:stCondLst>
+                                        </p:cTn>
+                                        <p:tgtEl>
+                                          <p:spTgt spid="156"/>
+                                        </p:tgtEl>
+                                        <p:attrNameLst>
+                                          <p:attrName>style.visibility</p:attrName>
+                                        </p:attrNameLst>
+                                      </p:cBhvr>
+                                      <p:to>
+                                        <p:strVal val="visible"/>
+                                      </p:to>
+                                    </p:set>
+                                  </p:childTnLst>
+                                </p:cTn>
+                              </p:par>
+                            </p:childTnLst>
+                          </p:cTn>
+                        </p:par>
+                      </p:childTnLst>
+                    </p:cTn>
+                  </p:par>
+                  <p:par>
+                    <p:cTn id="45" fill="hold">
+                      <p:stCondLst>
+                        <p:cond delay="indefinite"/>
+                      </p:stCondLst>
+                      <p:childTnLst>
+                        <p:par>
+                          <p:cTn id="46" fill="hold">
+                            <p:stCondLst>
+                              <p:cond delay="0"/>
+                            </p:stCondLst>
+                            <p:childTnLst>
+                              <p:par>
+                                <p:cTn id="47" presetID="1" presetClass="entr" presetSubtype="0" fill="hold" nodeType="clickEffect">
+                                  <p:stCondLst>
+                                    <p:cond delay="0"/>
+                                  </p:stCondLst>
+                                  <p:childTnLst>
+                                    <p:set>
+                                      <p:cBhvr>
+                                        <p:cTn id="48" dur="1" fill="hold">
                                           <p:stCondLst>
                                             <p:cond delay="0"/>
                                           </p:stCondLst>
@@ -7920,14 +8322,14 @@
                                 </p:cTn>
                               </p:par>
                               <p:par>
-                                <p:cTn id="45" presetID="1" presetClass="entr" presetSubtype="0" fill="hold" nodeType="withEffect">
+                                <p:cTn id="49" presetID="1" presetClass="entr" presetSubtype="0" fill="hold" nodeType="withEffect">
                                   <p:stCondLst>
                                     <p:cond delay="0"/>
                                   </p:stCondLst>
                                   <p:childTnLst>
                                     <p:set>
                                       <p:cBhvr>
-                                        <p:cTn id="46" dur="1" fill="hold">
+                                        <p:cTn id="50" dur="1" fill="hold">
                                           <p:stCondLst>
                                             <p:cond delay="0"/>
                                           </p:stCondLst>
@@ -7953,26 +8355,26 @@
                     </p:cTn>
                   </p:par>
                   <p:par>
-                    <p:cTn id="47" fill="hold">
+                    <p:cTn id="51" fill="hold">
                       <p:stCondLst>
                         <p:cond delay="indefinite"/>
                       </p:stCondLst>
                       <p:childTnLst>
                         <p:par>
-                          <p:cTn id="48" fill="hold">
+                          <p:cTn id="52" fill="hold">
                             <p:stCondLst>
                               <p:cond delay="0"/>
                             </p:stCondLst>
                             <p:childTnLst>
                               <p:par>
-                                <p:cTn id="49" presetID="1" presetClass="entr" presetSubtype="0" fill="hold" grpId="0" nodeType="clickEffect">
+                                <p:cTn id="53" presetID="1" presetClass="entr" presetSubtype="0" fill="hold" grpId="0" nodeType="clickEffect">
                                   <p:stCondLst>
                                     <p:cond delay="0"/>
                                   </p:stCondLst>
                                   <p:childTnLst>
                                     <p:set>
                                       <p:cBhvr>
-                                        <p:cTn id="50" dur="1" fill="hold">
+                                        <p:cTn id="54" dur="1" fill="hold">
                                           <p:stCondLst>
                                             <p:cond delay="0"/>
                                           </p:stCondLst>
@@ -7992,14 +8394,14 @@
                                 </p:cTn>
                               </p:par>
                               <p:par>
-                                <p:cTn id="51" presetID="1" presetClass="entr" presetSubtype="0" fill="hold" grpId="0" nodeType="withEffect">
+                                <p:cTn id="55" presetID="1" presetClass="entr" presetSubtype="0" fill="hold" grpId="0" nodeType="withEffect">
                                   <p:stCondLst>
                                     <p:cond delay="0"/>
                                   </p:stCondLst>
                                   <p:childTnLst>
                                     <p:set>
                                       <p:cBhvr>
-                                        <p:cTn id="52" dur="1" fill="hold">
+                                        <p:cTn id="56" dur="1" fill="hold">
                                           <p:stCondLst>
                                             <p:cond delay="0"/>
                                           </p:stCondLst>
@@ -8025,26 +8427,26 @@
                     </p:cTn>
                   </p:par>
                   <p:par>
-                    <p:cTn id="53" fill="hold">
+                    <p:cTn id="57" fill="hold">
                       <p:stCondLst>
                         <p:cond delay="indefinite"/>
                       </p:stCondLst>
                       <p:childTnLst>
                         <p:par>
-                          <p:cTn id="54" fill="hold">
+                          <p:cTn id="58" fill="hold">
                             <p:stCondLst>
                               <p:cond delay="0"/>
                             </p:stCondLst>
                             <p:childTnLst>
                               <p:par>
-                                <p:cTn id="55" presetID="1" presetClass="entr" presetSubtype="0" fill="hold" grpId="0" nodeType="clickEffect">
+                                <p:cTn id="59" presetID="1" presetClass="entr" presetSubtype="0" fill="hold" grpId="0" nodeType="clickEffect">
                                   <p:stCondLst>
                                     <p:cond delay="0"/>
                                   </p:stCondLst>
                                   <p:childTnLst>
                                     <p:set>
                                       <p:cBhvr>
-                                        <p:cTn id="56" dur="1" fill="hold">
+                                        <p:cTn id="60" dur="1" fill="hold">
                                           <p:stCondLst>
                                             <p:cond delay="0"/>
                                           </p:stCondLst>
@@ -8064,14 +8466,14 @@
                                 </p:cTn>
                               </p:par>
                               <p:par>
-                                <p:cTn id="57" presetID="1" presetClass="entr" presetSubtype="0" fill="hold" grpId="0" nodeType="withEffect">
+                                <p:cTn id="61" presetID="1" presetClass="entr" presetSubtype="0" fill="hold" grpId="0" nodeType="withEffect">
                                   <p:stCondLst>
                                     <p:cond delay="0"/>
                                   </p:stCondLst>
                                   <p:childTnLst>
                                     <p:set>
                                       <p:cBhvr>
-                                        <p:cTn id="58" dur="1" fill="hold">
+                                        <p:cTn id="62" dur="1" fill="hold">
                                           <p:stCondLst>
                                             <p:cond delay="0"/>
                                           </p:stCondLst>
@@ -8097,26 +8499,26 @@
                     </p:cTn>
                   </p:par>
                   <p:par>
-                    <p:cTn id="59" fill="hold">
+                    <p:cTn id="63" fill="hold">
                       <p:stCondLst>
                         <p:cond delay="indefinite"/>
                       </p:stCondLst>
                       <p:childTnLst>
                         <p:par>
-                          <p:cTn id="60" fill="hold">
+                          <p:cTn id="64" fill="hold">
                             <p:stCondLst>
                               <p:cond delay="0"/>
                             </p:stCondLst>
                             <p:childTnLst>
                               <p:par>
-                                <p:cTn id="61" presetID="1" presetClass="entr" presetSubtype="0" fill="hold" nodeType="clickEffect">
+                                <p:cTn id="65" presetID="1" presetClass="entr" presetSubtype="0" fill="hold" nodeType="clickEffect">
                                   <p:stCondLst>
                                     <p:cond delay="0"/>
                                   </p:stCondLst>
                                   <p:childTnLst>
                                     <p:set>
                                       <p:cBhvr>
-                                        <p:cTn id="62" dur="1" fill="hold">
+                                        <p:cTn id="66" dur="1" fill="hold">
                                           <p:stCondLst>
                                             <p:cond delay="0"/>
                                           </p:stCondLst>
@@ -8136,14 +8538,14 @@
                                 </p:cTn>
                               </p:par>
                               <p:par>
-                                <p:cTn id="63" presetID="1" presetClass="entr" presetSubtype="0" fill="hold" grpId="0" nodeType="withEffect">
+                                <p:cTn id="67" presetID="1" presetClass="entr" presetSubtype="0" fill="hold" grpId="0" nodeType="withEffect">
                                   <p:stCondLst>
                                     <p:cond delay="0"/>
                                   </p:stCondLst>
                                   <p:childTnLst>
                                     <p:set>
                                       <p:cBhvr>
-                                        <p:cTn id="64" dur="1" fill="hold">
+                                        <p:cTn id="68" dur="1" fill="hold">
                                           <p:stCondLst>
                                             <p:cond delay="0"/>
                                           </p:stCondLst>
@@ -8169,26 +8571,26 @@
                     </p:cTn>
                   </p:par>
                   <p:par>
-                    <p:cTn id="65" fill="hold">
+                    <p:cTn id="69" fill="hold">
                       <p:stCondLst>
                         <p:cond delay="indefinite"/>
                       </p:stCondLst>
                       <p:childTnLst>
                         <p:par>
-                          <p:cTn id="66" fill="hold">
+                          <p:cTn id="70" fill="hold">
                             <p:stCondLst>
                               <p:cond delay="0"/>
                             </p:stCondLst>
                             <p:childTnLst>
                               <p:par>
-                                <p:cTn id="67" presetID="1" presetClass="entr" presetSubtype="0" fill="hold" grpId="0" nodeType="clickEffect">
+                                <p:cTn id="71" presetID="1" presetClass="entr" presetSubtype="0" fill="hold" grpId="0" nodeType="clickEffect">
                                   <p:stCondLst>
                                     <p:cond delay="0"/>
                                   </p:stCondLst>
                                   <p:childTnLst>
                                     <p:set>
                                       <p:cBhvr>
-                                        <p:cTn id="68" dur="1" fill="hold">
+                                        <p:cTn id="72" dur="1" fill="hold">
                                           <p:stCondLst>
                                             <p:cond delay="0"/>
                                           </p:stCondLst>
@@ -8208,14 +8610,14 @@
                                 </p:cTn>
                               </p:par>
                               <p:par>
-                                <p:cTn id="69" presetID="1" presetClass="entr" presetSubtype="0" fill="hold" grpId="0" nodeType="withEffect">
+                                <p:cTn id="73" presetID="1" presetClass="entr" presetSubtype="0" fill="hold" grpId="0" nodeType="withEffect">
                                   <p:stCondLst>
                                     <p:cond delay="0"/>
                                   </p:stCondLst>
                                   <p:childTnLst>
                                     <p:set>
                                       <p:cBhvr>
-                                        <p:cTn id="70" dur="1" fill="hold">
+                                        <p:cTn id="74" dur="1" fill="hold">
                                           <p:stCondLst>
                                             <p:cond delay="0"/>
                                           </p:stCondLst>
@@ -8241,26 +8643,26 @@
                     </p:cTn>
                   </p:par>
                   <p:par>
-                    <p:cTn id="71" fill="hold">
+                    <p:cTn id="75" fill="hold">
                       <p:stCondLst>
                         <p:cond delay="indefinite"/>
                       </p:stCondLst>
                       <p:childTnLst>
                         <p:par>
-                          <p:cTn id="72" fill="hold">
+                          <p:cTn id="76" fill="hold">
                             <p:stCondLst>
                               <p:cond delay="0"/>
                             </p:stCondLst>
                             <p:childTnLst>
                               <p:par>
-                                <p:cTn id="73" presetID="1" presetClass="entr" presetSubtype="0" fill="hold" nodeType="clickEffect">
+                                <p:cTn id="77" presetID="1" presetClass="entr" presetSubtype="0" fill="hold" nodeType="clickEffect">
                                   <p:stCondLst>
                                     <p:cond delay="0"/>
                                   </p:stCondLst>
                                   <p:childTnLst>
                                     <p:set>
                                       <p:cBhvr>
-                                        <p:cTn id="74" dur="1" fill="hold">
+                                        <p:cTn id="78" dur="1" fill="hold">
                                           <p:stCondLst>
                                             <p:cond delay="0"/>
                                           </p:stCondLst>
@@ -8280,52 +8682,7 @@
                                 </p:cTn>
                               </p:par>
                               <p:par>
-                                <p:cTn id="75" presetID="1" presetClass="entr" presetSubtype="0" fill="hold" grpId="0" nodeType="withEffect">
-                                  <p:stCondLst>
-                                    <p:cond delay="0"/>
-                                  </p:stCondLst>
-                                  <p:childTnLst>
-                                    <p:set>
-                                      <p:cBhvr>
-                                        <p:cTn id="76" dur="1" fill="hold">
-                                          <p:stCondLst>
-                                            <p:cond delay="0"/>
-                                          </p:stCondLst>
-                                        </p:cTn>
-                                        <p:tgtEl>
-                                          <p:spTgt spid="165"/>
-                                        </p:tgtEl>
-                                        <p:attrNameLst>
-                                          <p:attrName>style.visibility</p:attrName>
-                                        </p:attrNameLst>
-                                      </p:cBhvr>
-                                      <p:to>
-                                        <p:strVal val="visible"/>
-                                      </p:to>
-                                    </p:set>
-                                  </p:childTnLst>
-                                </p:cTn>
-                              </p:par>
-                            </p:childTnLst>
-                          </p:cTn>
-                        </p:par>
-                      </p:childTnLst>
-                    </p:cTn>
-                  </p:par>
-                  <p:par>
-                    <p:cTn id="77" fill="hold">
-                      <p:stCondLst>
-                        <p:cond delay="indefinite"/>
-                      </p:stCondLst>
-                      <p:childTnLst>
-                        <p:par>
-                          <p:cTn id="78" fill="hold">
-                            <p:stCondLst>
-                              <p:cond delay="0"/>
-                            </p:stCondLst>
-                            <p:childTnLst>
-                              <p:par>
-                                <p:cTn id="79" presetID="1" presetClass="entr" presetSubtype="0" fill="hold" nodeType="clickEffect">
+                                <p:cTn id="79" presetID="1" presetClass="entr" presetSubtype="0" fill="hold" grpId="0" nodeType="withEffect">
                                   <p:stCondLst>
                                     <p:cond delay="0"/>
                                   </p:stCondLst>
@@ -8338,7 +8695,7 @@
                                           </p:stCondLst>
                                         </p:cTn>
                                         <p:tgtEl>
-                                          <p:spTgt spid="166"/>
+                                          <p:spTgt spid="165"/>
                                         </p:tgtEl>
                                         <p:attrNameLst>
                                           <p:attrName>style.visibility</p:attrName>
@@ -8370,7 +8727,7 @@
                             </p:stCondLst>
                             <p:childTnLst>
                               <p:par>
-                                <p:cTn id="83" presetID="1" presetClass="entr" presetSubtype="0" fill="hold" grpId="0" nodeType="clickEffect">
+                                <p:cTn id="83" presetID="1" presetClass="entr" presetSubtype="0" fill="hold" nodeType="clickEffect">
                                   <p:stCondLst>
                                     <p:cond delay="0"/>
                                   </p:stCondLst>
@@ -8378,6 +8735,51 @@
                                     <p:set>
                                       <p:cBhvr>
                                         <p:cTn id="84" dur="1" fill="hold">
+                                          <p:stCondLst>
+                                            <p:cond delay="0"/>
+                                          </p:stCondLst>
+                                        </p:cTn>
+                                        <p:tgtEl>
+                                          <p:spTgt spid="166"/>
+                                        </p:tgtEl>
+                                        <p:attrNameLst>
+                                          <p:attrName>style.visibility</p:attrName>
+                                        </p:attrNameLst>
+                                      </p:cBhvr>
+                                      <p:to>
+                                        <p:strVal val="visible"/>
+                                      </p:to>
+                                    </p:set>
+                                  </p:childTnLst>
+                                </p:cTn>
+                              </p:par>
+                            </p:childTnLst>
+                          </p:cTn>
+                        </p:par>
+                      </p:childTnLst>
+                    </p:cTn>
+                  </p:par>
+                  <p:par>
+                    <p:cTn id="85" fill="hold">
+                      <p:stCondLst>
+                        <p:cond delay="indefinite"/>
+                      </p:stCondLst>
+                      <p:childTnLst>
+                        <p:par>
+                          <p:cTn id="86" fill="hold">
+                            <p:stCondLst>
+                              <p:cond delay="0"/>
+                            </p:stCondLst>
+                            <p:childTnLst>
+                              <p:par>
+                                <p:cTn id="87" presetID="1" presetClass="entr" presetSubtype="0" fill="hold" grpId="0" nodeType="clickEffect">
+                                  <p:stCondLst>
+                                    <p:cond delay="0"/>
+                                  </p:stCondLst>
+                                  <p:childTnLst>
+                                    <p:set>
+                                      <p:cBhvr>
+                                        <p:cTn id="88" dur="1" fill="hold">
                                           <p:stCondLst>
                                             <p:cond delay="0"/>
                                           </p:stCondLst>
@@ -8397,52 +8799,7 @@
                                 </p:cTn>
                               </p:par>
                               <p:par>
-                                <p:cTn id="85" presetID="1" presetClass="entr" presetSubtype="0" fill="hold" grpId="0" nodeType="withEffect">
-                                  <p:stCondLst>
-                                    <p:cond delay="0"/>
-                                  </p:stCondLst>
-                                  <p:childTnLst>
-                                    <p:set>
-                                      <p:cBhvr>
-                                        <p:cTn id="86" dur="1" fill="hold">
-                                          <p:stCondLst>
-                                            <p:cond delay="0"/>
-                                          </p:stCondLst>
-                                        </p:cTn>
-                                        <p:tgtEl>
-                                          <p:spTgt spid="168"/>
-                                        </p:tgtEl>
-                                        <p:attrNameLst>
-                                          <p:attrName>style.visibility</p:attrName>
-                                        </p:attrNameLst>
-                                      </p:cBhvr>
-                                      <p:to>
-                                        <p:strVal val="visible"/>
-                                      </p:to>
-                                    </p:set>
-                                  </p:childTnLst>
-                                </p:cTn>
-                              </p:par>
-                            </p:childTnLst>
-                          </p:cTn>
-                        </p:par>
-                      </p:childTnLst>
-                    </p:cTn>
-                  </p:par>
-                  <p:par>
-                    <p:cTn id="87" fill="hold">
-                      <p:stCondLst>
-                        <p:cond delay="indefinite"/>
-                      </p:stCondLst>
-                      <p:childTnLst>
-                        <p:par>
-                          <p:cTn id="88" fill="hold">
-                            <p:stCondLst>
-                              <p:cond delay="0"/>
-                            </p:stCondLst>
-                            <p:childTnLst>
-                              <p:par>
-                                <p:cTn id="89" presetID="1" presetClass="entr" presetSubtype="0" fill="hold" grpId="0" nodeType="clickEffect">
+                                <p:cTn id="89" presetID="1" presetClass="entr" presetSubtype="0" fill="hold" grpId="0" nodeType="withEffect">
                                   <p:stCondLst>
                                     <p:cond delay="0"/>
                                   </p:stCondLst>
@@ -8455,7 +8812,7 @@
                                           </p:stCondLst>
                                         </p:cTn>
                                         <p:tgtEl>
-                                          <p:spTgt spid="170"/>
+                                          <p:spTgt spid="168"/>
                                         </p:tgtEl>
                                         <p:attrNameLst>
                                           <p:attrName>style.visibility</p:attrName>
@@ -8500,7 +8857,7 @@
                                           </p:stCondLst>
                                         </p:cTn>
                                         <p:tgtEl>
-                                          <p:spTgt spid="172"/>
+                                          <p:spTgt spid="170"/>
                                         </p:tgtEl>
                                         <p:attrNameLst>
                                           <p:attrName>style.visibility</p:attrName>
@@ -8532,7 +8889,7 @@
                             </p:stCondLst>
                             <p:childTnLst>
                               <p:par>
-                                <p:cTn id="97" presetID="1" presetClass="entr" presetSubtype="0" fill="hold" nodeType="clickEffect">
+                                <p:cTn id="97" presetID="1" presetClass="entr" presetSubtype="0" fill="hold" grpId="0" nodeType="clickEffect">
                                   <p:stCondLst>
                                     <p:cond delay="0"/>
                                   </p:stCondLst>
@@ -8545,7 +8902,7 @@
                                           </p:stCondLst>
                                         </p:cTn>
                                         <p:tgtEl>
-                                          <p:spTgt spid="178"/>
+                                          <p:spTgt spid="172"/>
                                         </p:tgtEl>
                                         <p:attrNameLst>
                                           <p:attrName>style.visibility</p:attrName>
@@ -8577,7 +8934,7 @@
                             </p:stCondLst>
                             <p:childTnLst>
                               <p:par>
-                                <p:cTn id="101" presetID="1" presetClass="entr" presetSubtype="0" fill="hold" grpId="0" nodeType="clickEffect">
+                                <p:cTn id="101" presetID="1" presetClass="entr" presetSubtype="0" fill="hold" nodeType="clickEffect">
                                   <p:stCondLst>
                                     <p:cond delay="0"/>
                                   </p:stCondLst>
@@ -8585,6 +8942,51 @@
                                     <p:set>
                                       <p:cBhvr>
                                         <p:cTn id="102" dur="1" fill="hold">
+                                          <p:stCondLst>
+                                            <p:cond delay="0"/>
+                                          </p:stCondLst>
+                                        </p:cTn>
+                                        <p:tgtEl>
+                                          <p:spTgt spid="178"/>
+                                        </p:tgtEl>
+                                        <p:attrNameLst>
+                                          <p:attrName>style.visibility</p:attrName>
+                                        </p:attrNameLst>
+                                      </p:cBhvr>
+                                      <p:to>
+                                        <p:strVal val="visible"/>
+                                      </p:to>
+                                    </p:set>
+                                  </p:childTnLst>
+                                </p:cTn>
+                              </p:par>
+                            </p:childTnLst>
+                          </p:cTn>
+                        </p:par>
+                      </p:childTnLst>
+                    </p:cTn>
+                  </p:par>
+                  <p:par>
+                    <p:cTn id="103" fill="hold">
+                      <p:stCondLst>
+                        <p:cond delay="indefinite"/>
+                      </p:stCondLst>
+                      <p:childTnLst>
+                        <p:par>
+                          <p:cTn id="104" fill="hold">
+                            <p:stCondLst>
+                              <p:cond delay="0"/>
+                            </p:stCondLst>
+                            <p:childTnLst>
+                              <p:par>
+                                <p:cTn id="105" presetID="1" presetClass="entr" presetSubtype="0" fill="hold" grpId="0" nodeType="clickEffect">
+                                  <p:stCondLst>
+                                    <p:cond delay="0"/>
+                                  </p:stCondLst>
+                                  <p:childTnLst>
+                                    <p:set>
+                                      <p:cBhvr>
+                                        <p:cTn id="106" dur="1" fill="hold">
                                           <p:stCondLst>
                                             <p:cond delay="0"/>
                                           </p:stCondLst>
@@ -8604,52 +9006,7 @@
                                 </p:cTn>
                               </p:par>
                               <p:par>
-                                <p:cTn id="103" presetID="1" presetClass="entr" presetSubtype="0" fill="hold" grpId="0" nodeType="withEffect">
-                                  <p:stCondLst>
-                                    <p:cond delay="0"/>
-                                  </p:stCondLst>
-                                  <p:childTnLst>
-                                    <p:set>
-                                      <p:cBhvr>
-                                        <p:cTn id="104" dur="1" fill="hold">
-                                          <p:stCondLst>
-                                            <p:cond delay="0"/>
-                                          </p:stCondLst>
-                                        </p:cTn>
-                                        <p:tgtEl>
-                                          <p:spTgt spid="180"/>
-                                        </p:tgtEl>
-                                        <p:attrNameLst>
-                                          <p:attrName>style.visibility</p:attrName>
-                                        </p:attrNameLst>
-                                      </p:cBhvr>
-                                      <p:to>
-                                        <p:strVal val="visible"/>
-                                      </p:to>
-                                    </p:set>
-                                  </p:childTnLst>
-                                </p:cTn>
-                              </p:par>
-                            </p:childTnLst>
-                          </p:cTn>
-                        </p:par>
-                      </p:childTnLst>
-                    </p:cTn>
-                  </p:par>
-                  <p:par>
-                    <p:cTn id="105" fill="hold">
-                      <p:stCondLst>
-                        <p:cond delay="indefinite"/>
-                      </p:stCondLst>
-                      <p:childTnLst>
-                        <p:par>
-                          <p:cTn id="106" fill="hold">
-                            <p:stCondLst>
-                              <p:cond delay="0"/>
-                            </p:stCondLst>
-                            <p:childTnLst>
-                              <p:par>
-                                <p:cTn id="107" presetID="1" presetClass="entr" presetSubtype="0" fill="hold" grpId="0" nodeType="clickEffect">
+                                <p:cTn id="107" presetID="1" presetClass="entr" presetSubtype="0" fill="hold" grpId="0" nodeType="withEffect">
                                   <p:stCondLst>
                                     <p:cond delay="0"/>
                                   </p:stCondLst>
@@ -8662,7 +9019,7 @@
                                           </p:stCondLst>
                                         </p:cTn>
                                         <p:tgtEl>
-                                          <p:spTgt spid="173"/>
+                                          <p:spTgt spid="180"/>
                                         </p:tgtEl>
                                         <p:attrNameLst>
                                           <p:attrName>style.visibility</p:attrName>
@@ -8694,7 +9051,7 @@
                             </p:stCondLst>
                             <p:childTnLst>
                               <p:par>
-                                <p:cTn id="111" presetID="1" presetClass="entr" presetSubtype="0" fill="hold" nodeType="clickEffect">
+                                <p:cTn id="111" presetID="1" presetClass="entr" presetSubtype="0" fill="hold" grpId="0" nodeType="clickEffect">
                                   <p:stCondLst>
                                     <p:cond delay="0"/>
                                   </p:stCondLst>
@@ -8707,7 +9064,7 @@
                                           </p:stCondLst>
                                         </p:cTn>
                                         <p:tgtEl>
-                                          <p:spTgt spid="183"/>
+                                          <p:spTgt spid="173"/>
                                         </p:tgtEl>
                                         <p:attrNameLst>
                                           <p:attrName>style.visibility</p:attrName>
@@ -8739,7 +9096,7 @@
                             </p:stCondLst>
                             <p:childTnLst>
                               <p:par>
-                                <p:cTn id="115" presetID="1" presetClass="entr" presetSubtype="0" fill="hold" grpId="0" nodeType="clickEffect">
+                                <p:cTn id="115" presetID="1" presetClass="entr" presetSubtype="0" fill="hold" nodeType="clickEffect">
                                   <p:stCondLst>
                                     <p:cond delay="0"/>
                                   </p:stCondLst>
@@ -8747,6 +9104,51 @@
                                     <p:set>
                                       <p:cBhvr>
                                         <p:cTn id="116" dur="1" fill="hold">
+                                          <p:stCondLst>
+                                            <p:cond delay="0"/>
+                                          </p:stCondLst>
+                                        </p:cTn>
+                                        <p:tgtEl>
+                                          <p:spTgt spid="183"/>
+                                        </p:tgtEl>
+                                        <p:attrNameLst>
+                                          <p:attrName>style.visibility</p:attrName>
+                                        </p:attrNameLst>
+                                      </p:cBhvr>
+                                      <p:to>
+                                        <p:strVal val="visible"/>
+                                      </p:to>
+                                    </p:set>
+                                  </p:childTnLst>
+                                </p:cTn>
+                              </p:par>
+                            </p:childTnLst>
+                          </p:cTn>
+                        </p:par>
+                      </p:childTnLst>
+                    </p:cTn>
+                  </p:par>
+                  <p:par>
+                    <p:cTn id="117" fill="hold">
+                      <p:stCondLst>
+                        <p:cond delay="indefinite"/>
+                      </p:stCondLst>
+                      <p:childTnLst>
+                        <p:par>
+                          <p:cTn id="118" fill="hold">
+                            <p:stCondLst>
+                              <p:cond delay="0"/>
+                            </p:stCondLst>
+                            <p:childTnLst>
+                              <p:par>
+                                <p:cTn id="119" presetID="1" presetClass="entr" presetSubtype="0" fill="hold" grpId="0" nodeType="clickEffect">
+                                  <p:stCondLst>
+                                    <p:cond delay="0"/>
+                                  </p:stCondLst>
+                                  <p:childTnLst>
+                                    <p:set>
+                                      <p:cBhvr>
+                                        <p:cTn id="120" dur="1" fill="hold">
                                           <p:stCondLst>
                                             <p:cond delay="0"/>
                                           </p:stCondLst>
@@ -8766,14 +9168,14 @@
                                 </p:cTn>
                               </p:par>
                               <p:par>
-                                <p:cTn id="117" presetID="1" presetClass="entr" presetSubtype="0" fill="hold" grpId="0" nodeType="withEffect">
+                                <p:cTn id="121" presetID="1" presetClass="entr" presetSubtype="0" fill="hold" grpId="0" nodeType="withEffect">
                                   <p:stCondLst>
                                     <p:cond delay="0"/>
                                   </p:stCondLst>
                                   <p:childTnLst>
                                     <p:set>
                                       <p:cBhvr>
-                                        <p:cTn id="118" dur="1" fill="hold">
+                                        <p:cTn id="122" dur="1" fill="hold">
                                           <p:stCondLst>
                                             <p:cond delay="0"/>
                                           </p:stCondLst>
@@ -8799,26 +9201,26 @@
                     </p:cTn>
                   </p:par>
                   <p:par>
-                    <p:cTn id="119" fill="hold">
+                    <p:cTn id="123" fill="hold">
                       <p:stCondLst>
                         <p:cond delay="indefinite"/>
                       </p:stCondLst>
                       <p:childTnLst>
                         <p:par>
-                          <p:cTn id="120" fill="hold">
+                          <p:cTn id="124" fill="hold">
                             <p:stCondLst>
                               <p:cond delay="0"/>
                             </p:stCondLst>
                             <p:childTnLst>
                               <p:par>
-                                <p:cTn id="121" presetID="1" presetClass="entr" presetSubtype="0" fill="hold" grpId="0" nodeType="clickEffect">
+                                <p:cTn id="125" presetID="1" presetClass="entr" presetSubtype="0" fill="hold" grpId="0" nodeType="clickEffect">
                                   <p:stCondLst>
                                     <p:cond delay="0"/>
                                   </p:stCondLst>
                                   <p:childTnLst>
                                     <p:set>
                                       <p:cBhvr>
-                                        <p:cTn id="122" dur="1" fill="hold">
+                                        <p:cTn id="126" dur="1" fill="hold">
                                           <p:stCondLst>
                                             <p:cond delay="0"/>
                                           </p:stCondLst>
@@ -8838,52 +9240,7 @@
                                 </p:cTn>
                               </p:par>
                               <p:par>
-                                <p:cTn id="123" presetID="1" presetClass="entr" presetSubtype="0" fill="hold" grpId="0" nodeType="withEffect">
-                                  <p:stCondLst>
-                                    <p:cond delay="0"/>
-                                  </p:stCondLst>
-                                  <p:childTnLst>
-                                    <p:set>
-                                      <p:cBhvr>
-                                        <p:cTn id="124" dur="1" fill="hold">
-                                          <p:stCondLst>
-                                            <p:cond delay="0"/>
-                                          </p:stCondLst>
-                                        </p:cTn>
-                                        <p:tgtEl>
-                                          <p:spTgt spid="181"/>
-                                        </p:tgtEl>
-                                        <p:attrNameLst>
-                                          <p:attrName>style.visibility</p:attrName>
-                                        </p:attrNameLst>
-                                      </p:cBhvr>
-                                      <p:to>
-                                        <p:strVal val="visible"/>
-                                      </p:to>
-                                    </p:set>
-                                  </p:childTnLst>
-                                </p:cTn>
-                              </p:par>
-                            </p:childTnLst>
-                          </p:cTn>
-                        </p:par>
-                      </p:childTnLst>
-                    </p:cTn>
-                  </p:par>
-                  <p:par>
-                    <p:cTn id="125" fill="hold">
-                      <p:stCondLst>
-                        <p:cond delay="indefinite"/>
-                      </p:stCondLst>
-                      <p:childTnLst>
-                        <p:par>
-                          <p:cTn id="126" fill="hold">
-                            <p:stCondLst>
-                              <p:cond delay="0"/>
-                            </p:stCondLst>
-                            <p:childTnLst>
-                              <p:par>
-                                <p:cTn id="127" presetID="1" presetClass="entr" presetSubtype="0" fill="hold" grpId="0" nodeType="clickEffect">
+                                <p:cTn id="127" presetID="1" presetClass="entr" presetSubtype="0" fill="hold" grpId="0" nodeType="withEffect">
                                   <p:stCondLst>
                                     <p:cond delay="0"/>
                                   </p:stCondLst>
@@ -8896,7 +9253,7 @@
                                           </p:stCondLst>
                                         </p:cTn>
                                         <p:tgtEl>
-                                          <p:spTgt spid="174"/>
+                                          <p:spTgt spid="181"/>
                                         </p:tgtEl>
                                         <p:attrNameLst>
                                           <p:attrName>style.visibility</p:attrName>
@@ -8941,7 +9298,7 @@
                                           </p:stCondLst>
                                         </p:cTn>
                                         <p:tgtEl>
-                                          <p:spTgt spid="175"/>
+                                          <p:spTgt spid="174"/>
                                         </p:tgtEl>
                                         <p:attrNameLst>
                                           <p:attrName>style.visibility</p:attrName>
@@ -8986,34 +9343,7 @@
                                           </p:stCondLst>
                                         </p:cTn>
                                         <p:tgtEl>
-                                          <p:spTgt spid="187"/>
-                                        </p:tgtEl>
-                                        <p:attrNameLst>
-                                          <p:attrName>style.visibility</p:attrName>
-                                        </p:attrNameLst>
-                                      </p:cBhvr>
-                                      <p:to>
-                                        <p:strVal val="visible"/>
-                                      </p:to>
-                                    </p:set>
-                                  </p:childTnLst>
-                                </p:cTn>
-                              </p:par>
-                              <p:par>
-                                <p:cTn id="137" presetID="1" presetClass="entr" presetSubtype="0" fill="hold" grpId="0" nodeType="withEffect">
-                                  <p:stCondLst>
-                                    <p:cond delay="0"/>
-                                  </p:stCondLst>
-                                  <p:childTnLst>
-                                    <p:set>
-                                      <p:cBhvr>
-                                        <p:cTn id="138" dur="1" fill="hold">
-                                          <p:stCondLst>
-                                            <p:cond delay="0"/>
-                                          </p:stCondLst>
-                                        </p:cTn>
-                                        <p:tgtEl>
-                                          <p:spTgt spid="186"/>
+                                          <p:spTgt spid="175"/>
                                         </p:tgtEl>
                                         <p:attrNameLst>
                                           <p:attrName>style.visibility</p:attrName>
@@ -9033,32 +9363,32 @@
                     </p:cTn>
                   </p:par>
                   <p:par>
-                    <p:cTn id="139" fill="hold">
+                    <p:cTn id="137" fill="hold">
                       <p:stCondLst>
                         <p:cond delay="indefinite"/>
                       </p:stCondLst>
                       <p:childTnLst>
                         <p:par>
-                          <p:cTn id="140" fill="hold">
+                          <p:cTn id="138" fill="hold">
                             <p:stCondLst>
                               <p:cond delay="0"/>
                             </p:stCondLst>
                             <p:childTnLst>
                               <p:par>
-                                <p:cTn id="141" presetID="1" presetClass="entr" presetSubtype="0" fill="hold" grpId="0" nodeType="clickEffect">
+                                <p:cTn id="139" presetID="1" presetClass="entr" presetSubtype="0" fill="hold" grpId="0" nodeType="clickEffect">
                                   <p:stCondLst>
                                     <p:cond delay="0"/>
                                   </p:stCondLst>
                                   <p:childTnLst>
                                     <p:set>
                                       <p:cBhvr>
-                                        <p:cTn id="142" dur="1" fill="hold">
+                                        <p:cTn id="140" dur="1" fill="hold">
                                           <p:stCondLst>
                                             <p:cond delay="0"/>
                                           </p:stCondLst>
                                         </p:cTn>
                                         <p:tgtEl>
-                                          <p:spTgt spid="192"/>
+                                          <p:spTgt spid="187"/>
                                         </p:tgtEl>
                                         <p:attrNameLst>
                                           <p:attrName>style.visibility</p:attrName>
@@ -9072,20 +9402,20 @@
                                 </p:cTn>
                               </p:par>
                               <p:par>
-                                <p:cTn id="143" presetID="1" presetClass="entr" presetSubtype="0" fill="hold" grpId="0" nodeType="withEffect">
+                                <p:cTn id="141" presetID="1" presetClass="entr" presetSubtype="0" fill="hold" grpId="0" nodeType="withEffect">
                                   <p:stCondLst>
                                     <p:cond delay="0"/>
                                   </p:stCondLst>
                                   <p:childTnLst>
                                     <p:set>
                                       <p:cBhvr>
-                                        <p:cTn id="144" dur="1" fill="hold">
+                                        <p:cTn id="142" dur="1" fill="hold">
                                           <p:stCondLst>
                                             <p:cond delay="0"/>
                                           </p:stCondLst>
                                         </p:cTn>
                                         <p:tgtEl>
-                                          <p:spTgt spid="193"/>
+                                          <p:spTgt spid="186"/>
                                         </p:tgtEl>
                                         <p:attrNameLst>
                                           <p:attrName>style.visibility</p:attrName>
@@ -9203,15 +9533,7 @@
           <a:p>
             <a:r>
               <a:rPr lang="en-US" dirty="0"/>
-              <a:t>Why blockchain &amp; </a:t>
-            </a:r>
-            <a:r>
-              <a:rPr lang="en-US" dirty="0" err="1"/>
-              <a:t>tendermint</a:t>
-            </a:r>
-            <a:r>
-              <a:rPr lang="en-US" dirty="0"/>
-              <a:t>:</a:t>
+              <a:t>Why blockchain:</a:t>
             </a:r>
           </a:p>
         </p:txBody>
@@ -9229,7 +9551,7 @@
         <p:spPr>
           <a:xfrm>
             <a:off x="1763106" y="967025"/>
-            <a:ext cx="7106464" cy="3844235"/>
+            <a:ext cx="7106464" cy="2329425"/>
           </a:xfrm>
         </p:spPr>
         <p:txBody>
@@ -9240,40 +9562,37 @@
           <a:p>
             <a:r>
               <a:rPr lang="en-US" dirty="0"/>
-              <a:t>multiple parties collaborate in a single market</a:t>
+              <a:t>Multiple parties collaborate in a single market</a:t>
             </a:r>
           </a:p>
           <a:p>
             <a:r>
               <a:rPr lang="en-US" dirty="0"/>
-              <a:t>lack of trust between the parties</a:t>
+              <a:t>Lack of trust between the parties</a:t>
             </a:r>
           </a:p>
           <a:p>
             <a:r>
               <a:rPr lang="en-US" dirty="0"/>
-              <a:t>permissioned blockchain mirrors highly regulated environment</a:t>
-            </a:r>
-          </a:p>
-          <a:p>
-            <a:r>
-              <a:rPr lang="en-US"/>
-              <a:t>proof </a:t>
-            </a:r>
+              <a:t>Distributed infrastructure</a:t>
+            </a:r>
+          </a:p>
+          <a:p>
             <a:r>
               <a:rPr lang="en-US" dirty="0"/>
-              <a:t>of stake is more energy efficient and suitable for permissioned blockchain</a:t>
-            </a:r>
-          </a:p>
-          <a:p>
-            <a:r>
-              <a:rPr lang="en-US" dirty="0" err="1"/>
-              <a:t>tendermint</a:t>
-            </a:r>
+              <a:t>Decentralized control of market</a:t>
+            </a:r>
+          </a:p>
+          <a:p>
+            <a:pPr lvl="1"/>
             <a:r>
               <a:rPr lang="en-US" dirty="0"/>
-              <a:t> is agnostic of application logic but has BFT consensus across validators and messaging implemented out of box</a:t>
-            </a:r>
+              <a:t>No single authority benefits from trading</a:t>
+            </a:r>
+          </a:p>
+          <a:p>
+            <a:pPr lvl="1"/>
+            <a:endParaRPr lang="en-US" dirty="0"/>
           </a:p>
           <a:p>
             <a:endParaRPr lang="en-US" dirty="0"/>
@@ -9312,7 +9631,13 @@
       </p:grpSpPr>
       <p:sp>
         <p:nvSpPr>
-          <p:cNvPr id="2" name="Title 1"/>
+          <p:cNvPr id="2" name="Titel 1">
+            <a:extLst>
+              <a:ext uri="{FF2B5EF4-FFF2-40B4-BE49-F238E27FC236}">
+                <a16:creationId xmlns:a16="http://schemas.microsoft.com/office/drawing/2014/main" id="{7064C2B5-0A59-41E5-B75B-162A17BCC669}"/>
+              </a:ext>
+            </a:extLst>
+          </p:cNvPr>
           <p:cNvSpPr>
             <a:spLocks noGrp="1"/>
           </p:cNvSpPr>
@@ -9322,21 +9647,55 @@
         </p:nvSpPr>
         <p:spPr/>
         <p:txBody>
-          <a:bodyPr>
-            <a:normAutofit/>
-          </a:bodyPr>
+          <a:bodyPr/>
           <a:lstStyle/>
           <a:p>
             <a:r>
               <a:rPr lang="en-US" dirty="0"/>
-              <a:t>Implementation overview:</a:t>
-            </a:r>
-          </a:p>
-        </p:txBody>
-      </p:sp>
-      <p:sp>
-        <p:nvSpPr>
-          <p:cNvPr id="3" name="Content Placeholder 2"/>
+              <a:t>The blockchain &amp; the grid</a:t>
+            </a:r>
+          </a:p>
+        </p:txBody>
+      </p:sp>
+      <p:pic>
+        <p:nvPicPr>
+          <p:cNvPr id="4" name="Afbeelding 3">
+            <a:extLst>
+              <a:ext uri="{FF2B5EF4-FFF2-40B4-BE49-F238E27FC236}">
+                <a16:creationId xmlns:a16="http://schemas.microsoft.com/office/drawing/2014/main" id="{BDC70AFD-1AD9-47F9-B0A9-7E2940C98AD1}"/>
+              </a:ext>
+            </a:extLst>
+          </p:cNvPr>
+          <p:cNvPicPr>
+            <a:picLocks noChangeAspect="1"/>
+          </p:cNvPicPr>
+          <p:nvPr/>
+        </p:nvPicPr>
+        <p:blipFill>
+          <a:blip r:embed="rId2"/>
+          <a:stretch>
+            <a:fillRect/>
+          </a:stretch>
+        </p:blipFill>
+        <p:spPr>
+          <a:xfrm>
+            <a:off x="1763106" y="1992997"/>
+            <a:ext cx="6875034" cy="3057981"/>
+          </a:xfrm>
+          <a:prstGeom prst="rect">
+            <a:avLst/>
+          </a:prstGeom>
+        </p:spPr>
+      </p:pic>
+      <p:sp>
+        <p:nvSpPr>
+          <p:cNvPr id="5" name="Content Placeholder 2">
+            <a:extLst>
+              <a:ext uri="{FF2B5EF4-FFF2-40B4-BE49-F238E27FC236}">
+                <a16:creationId xmlns:a16="http://schemas.microsoft.com/office/drawing/2014/main" id="{13E0DDF0-EB5D-41B9-9EA1-25B65210F77C}"/>
+              </a:ext>
+            </a:extLst>
+          </p:cNvPr>
           <p:cNvSpPr>
             <a:spLocks noGrp="1"/>
           </p:cNvSpPr>
@@ -9346,143 +9705,46 @@
         </p:nvSpPr>
         <p:spPr>
           <a:xfrm>
-            <a:off x="1763106" y="1045957"/>
-            <a:ext cx="7106464" cy="3844235"/>
+            <a:off x="1763106" y="967026"/>
+            <a:ext cx="7106464" cy="1025972"/>
           </a:xfrm>
         </p:spPr>
         <p:txBody>
           <a:bodyPr>
-            <a:normAutofit fontScale="62500" lnSpcReduction="20000"/>
+            <a:normAutofit fontScale="70000" lnSpcReduction="20000"/>
           </a:bodyPr>
           <a:lstStyle/>
           <a:p>
             <a:r>
               <a:rPr lang="en-US" dirty="0"/>
-              <a:t>Toolkit: </a:t>
-            </a:r>
-            <a:r>
-              <a:rPr lang="en-US" dirty="0" err="1"/>
-              <a:t>Tendermint</a:t>
-            </a:r>
+              <a:t>Reflects the physical grid</a:t>
+            </a:r>
+          </a:p>
+          <a:p>
             <a:r>
               <a:rPr lang="en-US" dirty="0"/>
-              <a:t>, </a:t>
-            </a:r>
-            <a:r>
-              <a:rPr lang="en-US" dirty="0" err="1"/>
-              <a:t>Protobuf</a:t>
-            </a:r>
+              <a:t>Inline with per cluster balancing</a:t>
+            </a:r>
+          </a:p>
+          <a:p>
             <a:r>
               <a:rPr lang="en-US" dirty="0"/>
-              <a:t>, Python, Docker, Node.js, </a:t>
-            </a:r>
-            <a:r>
-              <a:rPr lang="en-US" dirty="0" err="1"/>
-              <a:t>Github</a:t>
-            </a:r>
+              <a:t>Scalability: prevent 8 million households on a single chain</a:t>
+            </a:r>
+          </a:p>
+          <a:p>
+            <a:pPr lvl="1"/>
             <a:endParaRPr lang="en-US" dirty="0"/>
           </a:p>
           <a:p>
-            <a:r>
-              <a:rPr lang="en-US" dirty="0"/>
-              <a:t>Clients:</a:t>
-            </a:r>
-          </a:p>
-          <a:p>
-            <a:pPr lvl="1"/>
-            <a:r>
-              <a:rPr lang="en-US" dirty="0"/>
-              <a:t>Simulated data</a:t>
-            </a:r>
-          </a:p>
-          <a:p>
-            <a:r>
-              <a:rPr lang="en-US" dirty="0" err="1"/>
-              <a:t>Tendermint</a:t>
-            </a:r>
-            <a:r>
-              <a:rPr lang="en-US" dirty="0"/>
-              <a:t> ABCI:</a:t>
-            </a:r>
-          </a:p>
-          <a:p>
-            <a:pPr lvl="1"/>
-            <a:r>
-              <a:rPr lang="en-US" dirty="0"/>
-              <a:t>Transactions</a:t>
-            </a:r>
-          </a:p>
-          <a:p>
-            <a:pPr lvl="1"/>
-            <a:r>
-              <a:rPr lang="en-US" dirty="0"/>
-              <a:t>Signatures</a:t>
-            </a:r>
-          </a:p>
-          <a:p>
-            <a:pPr lvl="1"/>
-            <a:r>
-              <a:rPr lang="en-US" dirty="0"/>
-              <a:t>Tagging</a:t>
-            </a:r>
-          </a:p>
-          <a:p>
-            <a:pPr lvl="1"/>
-            <a:r>
-              <a:rPr lang="en-US" dirty="0"/>
-              <a:t>Balancing algorithm (every 15 mins, configurable)</a:t>
-            </a:r>
-          </a:p>
-          <a:p>
-            <a:r>
-              <a:rPr lang="en-US" dirty="0"/>
-              <a:t>Thin </a:t>
-            </a:r>
-            <a:r>
-              <a:rPr lang="en-US" dirty="0" err="1"/>
-              <a:t>Visualisation</a:t>
-            </a:r>
-            <a:r>
-              <a:rPr lang="en-US" dirty="0"/>
-              <a:t> Client:</a:t>
-            </a:r>
-          </a:p>
-          <a:p>
-            <a:pPr lvl="1"/>
-            <a:r>
-              <a:rPr lang="en-US" dirty="0"/>
-              <a:t>Subscribed to messaging using tags</a:t>
-            </a:r>
-          </a:p>
-          <a:p>
-            <a:pPr lvl="1"/>
-            <a:r>
-              <a:rPr lang="en-US" dirty="0" err="1"/>
-              <a:t>Visualises</a:t>
-            </a:r>
-            <a:r>
-              <a:rPr lang="en-US" dirty="0"/>
-              <a:t> state and transaction flow</a:t>
-            </a:r>
-          </a:p>
-          <a:p>
-            <a:r>
-              <a:rPr lang="en-US" dirty="0"/>
-              <a:t>Number of nodes:</a:t>
-            </a:r>
-          </a:p>
-          <a:p>
-            <a:r>
-              <a:rPr lang="en-US" dirty="0"/>
-              <a:t>Number of clients:</a:t>
-            </a:r>
+            <a:endParaRPr lang="en-US" dirty="0"/>
           </a:p>
         </p:txBody>
       </p:sp>
     </p:spTree>
     <p:extLst>
       <p:ext uri="{BB962C8B-B14F-4D97-AF65-F5344CB8AC3E}">
-        <p14:creationId xmlns:p14="http://schemas.microsoft.com/office/powerpoint/2010/main" val="2063307225"/>
+        <p14:creationId xmlns:p14="http://schemas.microsoft.com/office/powerpoint/2010/main" val="4211519558"/>
       </p:ext>
     </p:extLst>
   </p:cSld>
@@ -9528,7 +9790,15 @@
           <a:p>
             <a:r>
               <a:rPr lang="en-US" dirty="0"/>
-              <a:t>Demo</a:t>
+              <a:t>Why </a:t>
+            </a:r>
+            <a:r>
+              <a:rPr lang="en-US" dirty="0" err="1"/>
+              <a:t>Tendermint</a:t>
+            </a:r>
+            <a:r>
+              <a:rPr lang="en-US" dirty="0"/>
+              <a:t>:</a:t>
             </a:r>
           </a:p>
         </p:txBody>
@@ -9545,7 +9815,7 @@
         </p:nvSpPr>
         <p:spPr>
           <a:xfrm>
-            <a:off x="1763106" y="842037"/>
+            <a:off x="1763106" y="967025"/>
             <a:ext cx="7106464" cy="3844235"/>
           </a:xfrm>
         </p:spPr>
@@ -9555,9 +9825,28 @@
           </a:bodyPr>
           <a:lstStyle/>
           <a:p>
-            <a:pPr marL="0" indent="0">
-              <a:buNone/>
-            </a:pPr>
+            <a:r>
+              <a:rPr lang="en-US" dirty="0"/>
+              <a:t>Permissioned blockchain: The energy market is a highly regulated environment</a:t>
+            </a:r>
+          </a:p>
+          <a:p>
+            <a:r>
+              <a:rPr lang="en-US" dirty="0"/>
+              <a:t>Proof of stake is more energy efficient and suitable for permissioned blockchain</a:t>
+            </a:r>
+          </a:p>
+          <a:p>
+            <a:r>
+              <a:rPr lang="en-US" dirty="0" err="1"/>
+              <a:t>Tendermint</a:t>
+            </a:r>
+            <a:r>
+              <a:rPr lang="en-US" dirty="0"/>
+              <a:t> is agnostic of application logic but has BFT consensus across validators and messaging implemented out of box</a:t>
+            </a:r>
+          </a:p>
+          <a:p>
             <a:endParaRPr lang="en-US" dirty="0"/>
           </a:p>
         </p:txBody>
@@ -9565,7 +9854,7 @@
     </p:spTree>
     <p:extLst>
       <p:ext uri="{BB962C8B-B14F-4D97-AF65-F5344CB8AC3E}">
-        <p14:creationId xmlns:p14="http://schemas.microsoft.com/office/powerpoint/2010/main" val="3839504634"/>
+        <p14:creationId xmlns:p14="http://schemas.microsoft.com/office/powerpoint/2010/main" val="1372680517"/>
       </p:ext>
     </p:extLst>
   </p:cSld>
@@ -9611,7 +9900,7 @@
           <a:p>
             <a:r>
               <a:rPr lang="en-US" dirty="0"/>
-              <a:t>Questions</a:t>
+              <a:t>Implementation overview:</a:t>
             </a:r>
           </a:p>
         </p:txBody>
@@ -9628,27 +9917,131 @@
         </p:nvSpPr>
         <p:spPr>
           <a:xfrm>
-            <a:off x="1763106" y="842037"/>
+            <a:off x="1763106" y="1045957"/>
             <a:ext cx="7106464" cy="3844235"/>
           </a:xfrm>
         </p:spPr>
         <p:txBody>
           <a:bodyPr>
-            <a:normAutofit/>
+            <a:normAutofit fontScale="62500" lnSpcReduction="20000"/>
           </a:bodyPr>
           <a:lstStyle/>
           <a:p>
-            <a:pPr marL="0" indent="0">
-              <a:buNone/>
-            </a:pPr>
+            <a:r>
+              <a:rPr lang="en-US" dirty="0"/>
+              <a:t>Toolkit: </a:t>
+            </a:r>
+            <a:r>
+              <a:rPr lang="en-US" dirty="0" err="1"/>
+              <a:t>Tendermint</a:t>
+            </a:r>
+            <a:r>
+              <a:rPr lang="en-US" dirty="0"/>
+              <a:t>, </a:t>
+            </a:r>
+            <a:r>
+              <a:rPr lang="en-US" dirty="0" err="1"/>
+              <a:t>Protobuf</a:t>
+            </a:r>
+            <a:r>
+              <a:rPr lang="en-US" dirty="0"/>
+              <a:t>, Python, Docker, Node.js, </a:t>
+            </a:r>
+            <a:r>
+              <a:rPr lang="en-US" dirty="0" err="1"/>
+              <a:t>Github</a:t>
+            </a:r>
             <a:endParaRPr lang="en-US" dirty="0"/>
+          </a:p>
+          <a:p>
+            <a:r>
+              <a:rPr lang="en-US" dirty="0"/>
+              <a:t>Clients:</a:t>
+            </a:r>
+          </a:p>
+          <a:p>
+            <a:pPr lvl="1"/>
+            <a:r>
+              <a:rPr lang="en-US" dirty="0"/>
+              <a:t>Simulated data</a:t>
+            </a:r>
+          </a:p>
+          <a:p>
+            <a:r>
+              <a:rPr lang="en-US" dirty="0" err="1"/>
+              <a:t>Tendermint</a:t>
+            </a:r>
+            <a:r>
+              <a:rPr lang="en-US" dirty="0"/>
+              <a:t> ABCI (Application Blockchain interface):</a:t>
+            </a:r>
+          </a:p>
+          <a:p>
+            <a:pPr lvl="1"/>
+            <a:r>
+              <a:rPr lang="en-US" dirty="0"/>
+              <a:t>Transactions</a:t>
+            </a:r>
+          </a:p>
+          <a:p>
+            <a:pPr lvl="1"/>
+            <a:r>
+              <a:rPr lang="en-US" dirty="0"/>
+              <a:t>Signatures</a:t>
+            </a:r>
+          </a:p>
+          <a:p>
+            <a:pPr lvl="1"/>
+            <a:r>
+              <a:rPr lang="en-US" dirty="0"/>
+              <a:t>Tagging</a:t>
+            </a:r>
+          </a:p>
+          <a:p>
+            <a:pPr lvl="1"/>
+            <a:r>
+              <a:rPr lang="en-US" dirty="0"/>
+              <a:t>Balancing algorithm (every 15 mins, configurable)</a:t>
+            </a:r>
+          </a:p>
+          <a:p>
+            <a:r>
+              <a:rPr lang="en-US" dirty="0"/>
+              <a:t>Thin Visualization Client:</a:t>
+            </a:r>
+          </a:p>
+          <a:p>
+            <a:pPr lvl="1"/>
+            <a:r>
+              <a:rPr lang="en-US" dirty="0"/>
+              <a:t>Subscribed to messaging using tags</a:t>
+            </a:r>
+          </a:p>
+          <a:p>
+            <a:pPr lvl="1"/>
+            <a:r>
+              <a:rPr lang="en-US" dirty="0"/>
+              <a:t>Visualizes state and transaction flow</a:t>
+            </a:r>
+          </a:p>
+          <a:p>
+            <a:r>
+              <a:rPr lang="en-US" dirty="0"/>
+              <a:t>Number of nodes:</a:t>
+            </a:r>
+          </a:p>
+          <a:p>
+            <a:r>
+              <a:rPr lang="en-US" dirty="0"/>
+              <a:t>Number of clients:</a:t>
+            </a:r>
           </a:p>
         </p:txBody>
       </p:sp>
     </p:spTree>
     <p:extLst>
       <p:ext uri="{BB962C8B-B14F-4D97-AF65-F5344CB8AC3E}">
-        <p14:creationId xmlns:p14="http://schemas.microsoft.com/office/powerpoint/2010/main" val="2585660627"/>
+        <p14:creationId xmlns:p14="http://schemas.microsoft.com/office/powerpoint/2010/main" val="2063307225"/>
       </p:ext>
     </p:extLst>
   </p:cSld>

</xml_diff>

<commit_message>
adjusted and changed structure a bit of powerpoint
</commit_message>
<xml_diff>
--- a/Documentation/SmartGridChain.pptx
+++ b/Documentation/SmartGridChain.pptx
@@ -6,17 +6,19 @@
     <p:sldMasterId id="2147483660" r:id="rId2"/>
   </p:sldMasterIdLst>
   <p:handoutMasterIdLst>
-    <p:handoutMasterId r:id="rId11"/>
+    <p:handoutMasterId r:id="rId13"/>
   </p:handoutMasterIdLst>
   <p:sldIdLst>
     <p:sldId id="256" r:id="rId3"/>
     <p:sldId id="266" r:id="rId4"/>
     <p:sldId id="270" r:id="rId5"/>
-    <p:sldId id="271" r:id="rId6"/>
-    <p:sldId id="272" r:id="rId7"/>
-    <p:sldId id="273" r:id="rId8"/>
-    <p:sldId id="274" r:id="rId9"/>
-    <p:sldId id="275" r:id="rId10"/>
+    <p:sldId id="276" r:id="rId6"/>
+    <p:sldId id="271" r:id="rId7"/>
+    <p:sldId id="272" r:id="rId8"/>
+    <p:sldId id="273" r:id="rId9"/>
+    <p:sldId id="277" r:id="rId10"/>
+    <p:sldId id="274" r:id="rId11"/>
+    <p:sldId id="275" r:id="rId12"/>
   </p:sldIdLst>
   <p:sldSz cx="9144000" cy="5143500" type="screen16x9"/>
   <p:notesSz cx="6858000" cy="9144000"/>
@@ -216,7 +218,7 @@
           <a:p>
             <a:fld id="{DBAE3B3E-782A-9745-8E84-372F7B6771BF}" type="datetimeFigureOut">
               <a:rPr lang="en-US" smtClean="0"/>
-              <a:t>23-Jan-18</a:t>
+              <a:t>2/18/2018</a:t>
             </a:fld>
             <a:endParaRPr lang="en-US" dirty="0"/>
           </a:p>
@@ -956,7 +958,7 @@
           <a:p>
             <a:fld id="{462A2416-1570-3849-86F9-07F78746E1B2}" type="datetimeFigureOut">
               <a:rPr lang="en-US" smtClean="0"/>
-              <a:t>23-Jan-18</a:t>
+              <a:t>2/18/2018</a:t>
             </a:fld>
             <a:endParaRPr lang="en-US" dirty="0"/>
           </a:p>
@@ -2291,10 +2293,6 @@
           <a:lstStyle/>
           <a:p>
             <a:pPr algn="l"/>
-            <a:r>
-              <a:rPr lang="en-US" sz="6600" dirty="0" err="1"/>
-              <a:t>SmartGridChain</a:t>
-            </a:r>
             <a:endParaRPr lang="en-US" sz="6600" dirty="0">
               <a:latin typeface="Arial"/>
               <a:cs typeface="Arial"/>
@@ -2388,10 +2386,123 @@
           </a:p>
         </p:txBody>
       </p:sp>
+      <p:pic>
+        <p:nvPicPr>
+          <p:cNvPr id="5" name="Picture 4">
+            <a:extLst>
+              <a:ext uri="{FF2B5EF4-FFF2-40B4-BE49-F238E27FC236}">
+                <a16:creationId xmlns:a16="http://schemas.microsoft.com/office/drawing/2014/main" id="{C18C5AC1-A322-4BD1-82CF-9EBF380BFEB4}"/>
+              </a:ext>
+            </a:extLst>
+          </p:cNvPr>
+          <p:cNvPicPr>
+            <a:picLocks noChangeAspect="1"/>
+          </p:cNvPicPr>
+          <p:nvPr/>
+        </p:nvPicPr>
+        <p:blipFill>
+          <a:blip r:embed="rId2"/>
+          <a:stretch>
+            <a:fillRect/>
+          </a:stretch>
+        </p:blipFill>
+        <p:spPr>
+          <a:xfrm>
+            <a:off x="1605132" y="146839"/>
+            <a:ext cx="7538867" cy="2662562"/>
+          </a:xfrm>
+          <a:prstGeom prst="rect">
+            <a:avLst/>
+          </a:prstGeom>
+        </p:spPr>
+      </p:pic>
     </p:spTree>
     <p:extLst>
       <p:ext uri="{BB962C8B-B14F-4D97-AF65-F5344CB8AC3E}">
         <p14:creationId xmlns:p14="http://schemas.microsoft.com/office/powerpoint/2010/main" val="3087952304"/>
+      </p:ext>
+    </p:extLst>
+  </p:cSld>
+  <p:clrMapOvr>
+    <a:masterClrMapping/>
+  </p:clrMapOvr>
+</p:sld>
+</file>
+
+<file path=ppt/slides/slide10.xml><?xml version="1.0" encoding="utf-8"?>
+<p:sld xmlns:a="http://schemas.openxmlformats.org/drawingml/2006/main" xmlns:r="http://schemas.openxmlformats.org/officeDocument/2006/relationships" xmlns:p="http://schemas.openxmlformats.org/presentationml/2006/main">
+  <p:cSld>
+    <p:spTree>
+      <p:nvGrpSpPr>
+        <p:cNvPr id="1" name=""/>
+        <p:cNvGrpSpPr/>
+        <p:nvPr/>
+      </p:nvGrpSpPr>
+      <p:grpSpPr>
+        <a:xfrm>
+          <a:off x="0" y="0"/>
+          <a:ext cx="0" cy="0"/>
+          <a:chOff x="0" y="0"/>
+          <a:chExt cx="0" cy="0"/>
+        </a:xfrm>
+      </p:grpSpPr>
+      <p:sp>
+        <p:nvSpPr>
+          <p:cNvPr id="2" name="Title 1"/>
+          <p:cNvSpPr>
+            <a:spLocks noGrp="1"/>
+          </p:cNvSpPr>
+          <p:nvPr>
+            <p:ph type="title"/>
+          </p:nvPr>
+        </p:nvSpPr>
+        <p:spPr/>
+        <p:txBody>
+          <a:bodyPr>
+            <a:normAutofit/>
+          </a:bodyPr>
+          <a:lstStyle/>
+          <a:p>
+            <a:r>
+              <a:rPr lang="en-US" dirty="0"/>
+              <a:t>Questions</a:t>
+            </a:r>
+          </a:p>
+        </p:txBody>
+      </p:sp>
+      <p:sp>
+        <p:nvSpPr>
+          <p:cNvPr id="3" name="Content Placeholder 2"/>
+          <p:cNvSpPr>
+            <a:spLocks noGrp="1"/>
+          </p:cNvSpPr>
+          <p:nvPr>
+            <p:ph idx="1"/>
+          </p:nvPr>
+        </p:nvSpPr>
+        <p:spPr>
+          <a:xfrm>
+            <a:off x="1763106" y="842037"/>
+            <a:ext cx="7106464" cy="3844235"/>
+          </a:xfrm>
+        </p:spPr>
+        <p:txBody>
+          <a:bodyPr>
+            <a:normAutofit/>
+          </a:bodyPr>
+          <a:lstStyle/>
+          <a:p>
+            <a:pPr marL="0" indent="0">
+              <a:buNone/>
+            </a:pPr>
+            <a:endParaRPr lang="en-US" dirty="0"/>
+          </a:p>
+        </p:txBody>
+      </p:sp>
+    </p:spTree>
+    <p:extLst>
+      <p:ext uri="{BB962C8B-B14F-4D97-AF65-F5344CB8AC3E}">
+        <p14:creationId xmlns:p14="http://schemas.microsoft.com/office/powerpoint/2010/main" val="2585660627"/>
       </p:ext>
     </p:extLst>
   </p:cSld>
@@ -2463,7 +2574,7 @@
           <a:p>
             <a:r>
               <a:rPr lang="en-US" dirty="0"/>
-              <a:t>consumers are also producers</a:t>
+              <a:t>consumers are also becoming producers</a:t>
             </a:r>
           </a:p>
           <a:p>
@@ -2609,7 +2720,13 @@
       </p:grpSpPr>
       <p:sp>
         <p:nvSpPr>
-          <p:cNvPr id="2" name="Title 1"/>
+          <p:cNvPr id="2" name="Title 1">
+            <a:extLst>
+              <a:ext uri="{FF2B5EF4-FFF2-40B4-BE49-F238E27FC236}">
+                <a16:creationId xmlns:a16="http://schemas.microsoft.com/office/drawing/2014/main" id="{C1FB7D28-88C2-44EC-84E5-914BBBAC175E}"/>
+              </a:ext>
+            </a:extLst>
+          </p:cNvPr>
           <p:cNvSpPr>
             <a:spLocks noGrp="1"/>
           </p:cNvSpPr>
@@ -2617,75 +2734,57 @@
             <p:ph type="title"/>
           </p:nvPr>
         </p:nvSpPr>
-        <p:spPr/>
+        <p:spPr>
+          <a:xfrm>
+            <a:off x="1763106" y="205979"/>
+            <a:ext cx="7106464" cy="857250"/>
+          </a:xfrm>
+        </p:spPr>
         <p:txBody>
           <a:bodyPr/>
           <a:lstStyle/>
           <a:p>
             <a:r>
-              <a:rPr lang="en-US" dirty="0"/>
-              <a:t>How to balance dynamically:</a:t>
+              <a:rPr lang="nl-NL" dirty="0"/>
+              <a:t>Solution:</a:t>
             </a:r>
           </a:p>
         </p:txBody>
       </p:sp>
-      <p:sp>
-        <p:nvSpPr>
-          <p:cNvPr id="3" name="Content Placeholder 2"/>
-          <p:cNvSpPr>
-            <a:spLocks noGrp="1"/>
-          </p:cNvSpPr>
-          <p:nvPr>
-            <p:ph idx="1"/>
-          </p:nvPr>
-        </p:nvSpPr>
+      <p:pic>
+        <p:nvPicPr>
+          <p:cNvPr id="5" name="Picture 4">
+            <a:extLst>
+              <a:ext uri="{FF2B5EF4-FFF2-40B4-BE49-F238E27FC236}">
+                <a16:creationId xmlns:a16="http://schemas.microsoft.com/office/drawing/2014/main" id="{9002034D-9743-418F-80F8-5523D5E3407A}"/>
+              </a:ext>
+            </a:extLst>
+          </p:cNvPr>
+          <p:cNvPicPr>
+            <a:picLocks noChangeAspect="1"/>
+          </p:cNvPicPr>
+          <p:nvPr/>
+        </p:nvPicPr>
+        <p:blipFill>
+          <a:blip r:embed="rId2"/>
+          <a:stretch>
+            <a:fillRect/>
+          </a:stretch>
+        </p:blipFill>
         <p:spPr>
           <a:xfrm>
-            <a:off x="1763106" y="980181"/>
-            <a:ext cx="7106464" cy="3844235"/>
+            <a:off x="1611714" y="1410732"/>
+            <a:ext cx="7492817" cy="3332767"/>
           </a:xfrm>
+          <a:prstGeom prst="rect">
+            <a:avLst/>
+          </a:prstGeom>
         </p:spPr>
-        <p:txBody>
-          <a:bodyPr>
-            <a:normAutofit lnSpcReduction="10000"/>
-          </a:bodyPr>
-          <a:lstStyle/>
-          <a:p>
-            <a:r>
-              <a:rPr lang="en-US" dirty="0"/>
-              <a:t>have a backup supplier at all time</a:t>
-            </a:r>
-          </a:p>
-          <a:p>
-            <a:r>
-              <a:rPr lang="en-US" dirty="0"/>
-              <a:t>collect clients baseline consumption and their flexibility</a:t>
-            </a:r>
-          </a:p>
-          <a:p>
-            <a:r>
-              <a:rPr lang="en-US" dirty="0"/>
-              <a:t>balance at the cluster level</a:t>
-            </a:r>
-          </a:p>
-          <a:p>
-            <a:r>
-              <a:rPr lang="en-US" dirty="0"/>
-              <a:t>send aggregated cluster imbalance and flexibility up to intra-cluster level</a:t>
-            </a:r>
-          </a:p>
-          <a:p>
-            <a:r>
-              <a:rPr lang="en-US" dirty="0"/>
-              <a:t>repeat through cluster levels until no imbalance or the root is reached</a:t>
-            </a:r>
-          </a:p>
-        </p:txBody>
-      </p:sp>
+      </p:pic>
     </p:spTree>
     <p:extLst>
       <p:ext uri="{BB962C8B-B14F-4D97-AF65-F5344CB8AC3E}">
-        <p14:creationId xmlns:p14="http://schemas.microsoft.com/office/powerpoint/2010/main" val="3986785348"/>
+        <p14:creationId xmlns:p14="http://schemas.microsoft.com/office/powerpoint/2010/main" val="3438966187"/>
       </p:ext>
     </p:extLst>
   </p:cSld>
@@ -2724,22 +2823,12 @@
         </p:nvSpPr>
         <p:spPr/>
         <p:txBody>
-          <a:bodyPr>
-            <a:normAutofit/>
-          </a:bodyPr>
+          <a:bodyPr/>
           <a:lstStyle/>
           <a:p>
             <a:r>
               <a:rPr lang="en-US" dirty="0"/>
-              <a:t>Why blockchain &amp; </a:t>
-            </a:r>
-            <a:r>
-              <a:rPr lang="en-US" dirty="0" err="1"/>
-              <a:t>tendermint</a:t>
-            </a:r>
-            <a:r>
-              <a:rPr lang="en-US" dirty="0"/>
-              <a:t>:</a:t>
+              <a:t>How to balance dynamically:</a:t>
             </a:r>
           </a:p>
         </p:txBody>
@@ -2756,62 +2845,51 @@
         </p:nvSpPr>
         <p:spPr>
           <a:xfrm>
-            <a:off x="1763106" y="967025"/>
+            <a:off x="1763106" y="980181"/>
             <a:ext cx="7106464" cy="3844235"/>
           </a:xfrm>
         </p:spPr>
         <p:txBody>
           <a:bodyPr>
-            <a:normAutofit fontScale="92500" lnSpcReduction="20000"/>
+            <a:normAutofit lnSpcReduction="10000"/>
           </a:bodyPr>
           <a:lstStyle/>
           <a:p>
             <a:r>
               <a:rPr lang="en-US" dirty="0"/>
-              <a:t>multiple parties collaborate in a single market</a:t>
-            </a:r>
-          </a:p>
-          <a:p>
-            <a:r>
-              <a:rPr lang="en-US" dirty="0"/>
-              <a:t>lack of trust between the parties</a:t>
-            </a:r>
-          </a:p>
-          <a:p>
-            <a:r>
-              <a:rPr lang="en-US" dirty="0"/>
-              <a:t>permissioned blockchain mirrors highly regulated environment</a:t>
-            </a:r>
-          </a:p>
-          <a:p>
-            <a:r>
-              <a:rPr lang="en-US"/>
-              <a:t>proof </a:t>
-            </a:r>
-            <a:r>
-              <a:rPr lang="en-US" dirty="0"/>
-              <a:t>of stake is more energy efficient and suitable for permissioned blockchain</a:t>
-            </a:r>
-          </a:p>
-          <a:p>
-            <a:r>
-              <a:rPr lang="en-US" dirty="0" err="1"/>
-              <a:t>tendermint</a:t>
-            </a:r>
-            <a:r>
-              <a:rPr lang="en-US" dirty="0"/>
-              <a:t> is agnostic of application logic but has BFT consensus across validators and messaging implemented out of box</a:t>
-            </a:r>
-          </a:p>
-          <a:p>
-            <a:endParaRPr lang="en-US" dirty="0"/>
+              <a:t>have a backup supplier at all time</a:t>
+            </a:r>
+          </a:p>
+          <a:p>
+            <a:r>
+              <a:rPr lang="en-US" dirty="0"/>
+              <a:t>collect clients baseline consumption and their flexibility</a:t>
+            </a:r>
+          </a:p>
+          <a:p>
+            <a:r>
+              <a:rPr lang="en-US" dirty="0"/>
+              <a:t>balance at the cluster level</a:t>
+            </a:r>
+          </a:p>
+          <a:p>
+            <a:r>
+              <a:rPr lang="en-US" dirty="0"/>
+              <a:t>send aggregated cluster imbalance and flexibility up to intra-cluster level</a:t>
+            </a:r>
+          </a:p>
+          <a:p>
+            <a:r>
+              <a:rPr lang="en-US" dirty="0"/>
+              <a:t>repeat through cluster levels until no imbalance or the root is reached</a:t>
+            </a:r>
           </a:p>
         </p:txBody>
       </p:sp>
     </p:spTree>
     <p:extLst>
       <p:ext uri="{BB962C8B-B14F-4D97-AF65-F5344CB8AC3E}">
-        <p14:creationId xmlns:p14="http://schemas.microsoft.com/office/powerpoint/2010/main" val="1616441654"/>
+        <p14:creationId xmlns:p14="http://schemas.microsoft.com/office/powerpoint/2010/main" val="3986785348"/>
       </p:ext>
     </p:extLst>
   </p:cSld>
@@ -2857,7 +2935,15 @@
           <a:p>
             <a:r>
               <a:rPr lang="en-US" dirty="0"/>
-              <a:t>Implementation overview:</a:t>
+              <a:t>Why blockchain &amp; </a:t>
+            </a:r>
+            <a:r>
+              <a:rPr lang="en-US" dirty="0" err="1"/>
+              <a:t>tendermint</a:t>
+            </a:r>
+            <a:r>
+              <a:rPr lang="en-US" dirty="0"/>
+              <a:t>:</a:t>
             </a:r>
           </a:p>
         </p:txBody>
@@ -2874,143 +2960,62 @@
         </p:nvSpPr>
         <p:spPr>
           <a:xfrm>
-            <a:off x="1763106" y="1045957"/>
+            <a:off x="1763106" y="967025"/>
             <a:ext cx="7106464" cy="3844235"/>
           </a:xfrm>
         </p:spPr>
         <p:txBody>
           <a:bodyPr>
-            <a:normAutofit fontScale="62500" lnSpcReduction="20000"/>
+            <a:normAutofit fontScale="92500" lnSpcReduction="20000"/>
           </a:bodyPr>
           <a:lstStyle/>
           <a:p>
             <a:r>
               <a:rPr lang="en-US" dirty="0"/>
-              <a:t>Toolkit: </a:t>
-            </a:r>
+              <a:t>multiple parties collaborate in a single market</a:t>
+            </a:r>
+          </a:p>
+          <a:p>
+            <a:r>
+              <a:rPr lang="en-US" dirty="0"/>
+              <a:t>lack of trust between the parties</a:t>
+            </a:r>
+          </a:p>
+          <a:p>
+            <a:r>
+              <a:rPr lang="en-US" dirty="0"/>
+              <a:t>permissioned blockchain mirrors highly regulated environment</a:t>
+            </a:r>
+          </a:p>
+          <a:p>
+            <a:r>
+              <a:rPr lang="en-US"/>
+              <a:t>proof </a:t>
+            </a:r>
+            <a:r>
+              <a:rPr lang="en-US" dirty="0"/>
+              <a:t>of stake is more energy efficient and suitable for permissioned blockchain</a:t>
+            </a:r>
+          </a:p>
+          <a:p>
             <a:r>
               <a:rPr lang="en-US" dirty="0" err="1"/>
-              <a:t>Tendermint</a:t>
-            </a:r>
-            <a:r>
-              <a:rPr lang="en-US" dirty="0"/>
-              <a:t>, </a:t>
-            </a:r>
-            <a:r>
-              <a:rPr lang="en-US" dirty="0" err="1"/>
-              <a:t>Protobuf</a:t>
-            </a:r>
-            <a:r>
-              <a:rPr lang="en-US" dirty="0"/>
-              <a:t>, Python, Docker, Node.js, </a:t>
-            </a:r>
-            <a:r>
-              <a:rPr lang="en-US" dirty="0" err="1"/>
-              <a:t>Github</a:t>
-            </a:r>
+              <a:t>tendermint</a:t>
+            </a:r>
+            <a:r>
+              <a:rPr lang="en-US" dirty="0"/>
+              <a:t> is agnostic of application logic but has BFT consensus across validators and messaging implemented out of box</a:t>
+            </a:r>
+          </a:p>
+          <a:p>
             <a:endParaRPr lang="en-US" dirty="0"/>
-          </a:p>
-          <a:p>
-            <a:r>
-              <a:rPr lang="en-US" dirty="0"/>
-              <a:t>Clients:</a:t>
-            </a:r>
-          </a:p>
-          <a:p>
-            <a:pPr lvl="1"/>
-            <a:r>
-              <a:rPr lang="en-US" dirty="0"/>
-              <a:t>Simulated data</a:t>
-            </a:r>
-          </a:p>
-          <a:p>
-            <a:r>
-              <a:rPr lang="en-US" dirty="0" err="1"/>
-              <a:t>Tendermint</a:t>
-            </a:r>
-            <a:r>
-              <a:rPr lang="en-US" dirty="0"/>
-              <a:t> ABCI:</a:t>
-            </a:r>
-          </a:p>
-          <a:p>
-            <a:pPr lvl="1"/>
-            <a:r>
-              <a:rPr lang="en-US" dirty="0"/>
-              <a:t>Transactions</a:t>
-            </a:r>
-          </a:p>
-          <a:p>
-            <a:pPr lvl="1"/>
-            <a:r>
-              <a:rPr lang="en-US" dirty="0"/>
-              <a:t>Signatures</a:t>
-            </a:r>
-          </a:p>
-          <a:p>
-            <a:pPr lvl="1"/>
-            <a:r>
-              <a:rPr lang="en-US" dirty="0"/>
-              <a:t>Tagging</a:t>
-            </a:r>
-          </a:p>
-          <a:p>
-            <a:pPr lvl="1"/>
-            <a:r>
-              <a:rPr lang="en-US" dirty="0"/>
-              <a:t>Balancing algorithm (every 15 mins, configurable)</a:t>
-            </a:r>
-          </a:p>
-          <a:p>
-            <a:r>
-              <a:rPr lang="en-US" dirty="0"/>
-              <a:t>Thin </a:t>
-            </a:r>
-            <a:r>
-              <a:rPr lang="en-US" dirty="0" err="1"/>
-              <a:t>Visualisation</a:t>
-            </a:r>
-            <a:r>
-              <a:rPr lang="en-US" dirty="0"/>
-              <a:t> Client:</a:t>
-            </a:r>
-          </a:p>
-          <a:p>
-            <a:pPr lvl="1"/>
-            <a:r>
-              <a:rPr lang="en-US" dirty="0"/>
-              <a:t>Subscribed to messaging using tags</a:t>
-            </a:r>
-          </a:p>
-          <a:p>
-            <a:pPr lvl="1"/>
-            <a:r>
-              <a:rPr lang="en-US" dirty="0" err="1"/>
-              <a:t>Visualises</a:t>
-            </a:r>
-            <a:r>
-              <a:rPr lang="en-US" dirty="0"/>
-              <a:t> state and transaction flow</a:t>
-            </a:r>
-          </a:p>
-          <a:p>
-            <a:r>
-              <a:rPr lang="en-US" dirty="0"/>
-              <a:t>Number of nodes:</a:t>
-            </a:r>
-          </a:p>
-          <a:p>
-            <a:r>
-              <a:rPr lang="en-US" dirty="0"/>
-              <a:t>Number of clients:</a:t>
-            </a:r>
           </a:p>
         </p:txBody>
       </p:sp>
     </p:spTree>
     <p:extLst>
       <p:ext uri="{BB962C8B-B14F-4D97-AF65-F5344CB8AC3E}">
-        <p14:creationId xmlns:p14="http://schemas.microsoft.com/office/powerpoint/2010/main" val="2063307225"/>
+        <p14:creationId xmlns:p14="http://schemas.microsoft.com/office/powerpoint/2010/main" val="1616441654"/>
       </p:ext>
     </p:extLst>
   </p:cSld>
@@ -3056,7 +3061,7 @@
           <a:p>
             <a:r>
               <a:rPr lang="en-US" dirty="0"/>
-              <a:t>Demo</a:t>
+              <a:t>Implementation overview:</a:t>
             </a:r>
           </a:p>
         </p:txBody>
@@ -3073,27 +3078,143 @@
         </p:nvSpPr>
         <p:spPr>
           <a:xfrm>
-            <a:off x="1763106" y="842037"/>
+            <a:off x="1763106" y="1045957"/>
             <a:ext cx="7106464" cy="3844235"/>
           </a:xfrm>
         </p:spPr>
         <p:txBody>
           <a:bodyPr>
-            <a:normAutofit/>
+            <a:normAutofit fontScale="62500" lnSpcReduction="20000"/>
           </a:bodyPr>
           <a:lstStyle/>
           <a:p>
-            <a:pPr marL="0" indent="0">
-              <a:buNone/>
-            </a:pPr>
+            <a:r>
+              <a:rPr lang="en-US" dirty="0"/>
+              <a:t>Toolkit: </a:t>
+            </a:r>
+            <a:r>
+              <a:rPr lang="en-US" dirty="0" err="1"/>
+              <a:t>Tendermint</a:t>
+            </a:r>
+            <a:r>
+              <a:rPr lang="en-US" dirty="0"/>
+              <a:t>, </a:t>
+            </a:r>
+            <a:r>
+              <a:rPr lang="en-US" dirty="0" err="1"/>
+              <a:t>Protobuf</a:t>
+            </a:r>
+            <a:r>
+              <a:rPr lang="en-US" dirty="0"/>
+              <a:t>, Python, Docker, Node.js, </a:t>
+            </a:r>
+            <a:r>
+              <a:rPr lang="en-US" dirty="0" err="1"/>
+              <a:t>Github</a:t>
+            </a:r>
             <a:endParaRPr lang="en-US" dirty="0"/>
+          </a:p>
+          <a:p>
+            <a:r>
+              <a:rPr lang="en-US" dirty="0"/>
+              <a:t>Clients:</a:t>
+            </a:r>
+          </a:p>
+          <a:p>
+            <a:pPr lvl="1"/>
+            <a:r>
+              <a:rPr lang="en-US" dirty="0"/>
+              <a:t>Simulated data</a:t>
+            </a:r>
+          </a:p>
+          <a:p>
+            <a:r>
+              <a:rPr lang="en-US" dirty="0" err="1"/>
+              <a:t>Tendermint</a:t>
+            </a:r>
+            <a:r>
+              <a:rPr lang="en-US" dirty="0"/>
+              <a:t> ABCI:</a:t>
+            </a:r>
+          </a:p>
+          <a:p>
+            <a:pPr lvl="1"/>
+            <a:r>
+              <a:rPr lang="en-US" dirty="0"/>
+              <a:t>Transactions</a:t>
+            </a:r>
+          </a:p>
+          <a:p>
+            <a:pPr lvl="1"/>
+            <a:r>
+              <a:rPr lang="en-US" dirty="0"/>
+              <a:t>Signatures</a:t>
+            </a:r>
+          </a:p>
+          <a:p>
+            <a:pPr lvl="1"/>
+            <a:r>
+              <a:rPr lang="en-US" dirty="0"/>
+              <a:t>Tagging</a:t>
+            </a:r>
+          </a:p>
+          <a:p>
+            <a:pPr lvl="1"/>
+            <a:r>
+              <a:rPr lang="en-US" dirty="0"/>
+              <a:t>Balancing algorithm (every 15 mins, configurable)</a:t>
+            </a:r>
+          </a:p>
+          <a:p>
+            <a:r>
+              <a:rPr lang="en-US" dirty="0"/>
+              <a:t>Thin </a:t>
+            </a:r>
+            <a:r>
+              <a:rPr lang="en-US" dirty="0" err="1"/>
+              <a:t>Visualisation</a:t>
+            </a:r>
+            <a:r>
+              <a:rPr lang="en-US" dirty="0"/>
+              <a:t> Client:</a:t>
+            </a:r>
+          </a:p>
+          <a:p>
+            <a:pPr lvl="1"/>
+            <a:r>
+              <a:rPr lang="en-US" dirty="0"/>
+              <a:t>Subscribed to messaging using tags</a:t>
+            </a:r>
+          </a:p>
+          <a:p>
+            <a:pPr lvl="1"/>
+            <a:r>
+              <a:rPr lang="en-US" dirty="0" err="1"/>
+              <a:t>Visualises</a:t>
+            </a:r>
+            <a:r>
+              <a:rPr lang="en-US" dirty="0"/>
+              <a:t> state and transaction flow</a:t>
+            </a:r>
+          </a:p>
+          <a:p>
+            <a:r>
+              <a:rPr lang="en-US" dirty="0"/>
+              <a:t>Number of nodes:</a:t>
+            </a:r>
+          </a:p>
+          <a:p>
+            <a:r>
+              <a:rPr lang="en-US" dirty="0"/>
+              <a:t>Number of clients:</a:t>
+            </a:r>
           </a:p>
         </p:txBody>
       </p:sp>
     </p:spTree>
     <p:extLst>
       <p:ext uri="{BB962C8B-B14F-4D97-AF65-F5344CB8AC3E}">
-        <p14:creationId xmlns:p14="http://schemas.microsoft.com/office/powerpoint/2010/main" val="3839504634"/>
+        <p14:creationId xmlns:p14="http://schemas.microsoft.com/office/powerpoint/2010/main" val="2063307225"/>
       </p:ext>
     </p:extLst>
   </p:cSld>
@@ -3104,6 +3225,125 @@
 </file>
 
 <file path=ppt/slides/slide8.xml><?xml version="1.0" encoding="utf-8"?>
+<p:sld xmlns:a="http://schemas.openxmlformats.org/drawingml/2006/main" xmlns:r="http://schemas.openxmlformats.org/officeDocument/2006/relationships" xmlns:p="http://schemas.openxmlformats.org/presentationml/2006/main">
+  <p:cSld>
+    <p:spTree>
+      <p:nvGrpSpPr>
+        <p:cNvPr id="1" name=""/>
+        <p:cNvGrpSpPr/>
+        <p:nvPr/>
+      </p:nvGrpSpPr>
+      <p:grpSpPr>
+        <a:xfrm>
+          <a:off x="0" y="0"/>
+          <a:ext cx="0" cy="0"/>
+          <a:chOff x="0" y="0"/>
+          <a:chExt cx="0" cy="0"/>
+        </a:xfrm>
+      </p:grpSpPr>
+      <p:sp>
+        <p:nvSpPr>
+          <p:cNvPr id="2" name="Title 1">
+            <a:extLst>
+              <a:ext uri="{FF2B5EF4-FFF2-40B4-BE49-F238E27FC236}">
+                <a16:creationId xmlns:a16="http://schemas.microsoft.com/office/drawing/2014/main" id="{A7180E90-1325-43FB-8AE6-81DEFE848139}"/>
+              </a:ext>
+            </a:extLst>
+          </p:cNvPr>
+          <p:cNvSpPr>
+            <a:spLocks noGrp="1"/>
+          </p:cNvSpPr>
+          <p:nvPr>
+            <p:ph type="title"/>
+          </p:nvPr>
+        </p:nvSpPr>
+        <p:spPr/>
+        <p:txBody>
+          <a:bodyPr/>
+          <a:lstStyle/>
+          <a:p>
+            <a:r>
+              <a:rPr lang="nl-NL" dirty="0" err="1"/>
+              <a:t>Results</a:t>
+            </a:r>
+            <a:r>
+              <a:rPr lang="nl-NL" dirty="0"/>
+              <a:t>:</a:t>
+            </a:r>
+          </a:p>
+        </p:txBody>
+      </p:sp>
+      <p:sp>
+        <p:nvSpPr>
+          <p:cNvPr id="3" name="Content Placeholder 2">
+            <a:extLst>
+              <a:ext uri="{FF2B5EF4-FFF2-40B4-BE49-F238E27FC236}">
+                <a16:creationId xmlns:a16="http://schemas.microsoft.com/office/drawing/2014/main" id="{BC9D4343-429F-4C18-B525-77DBFDFE77B6}"/>
+              </a:ext>
+            </a:extLst>
+          </p:cNvPr>
+          <p:cNvSpPr>
+            <a:spLocks noGrp="1"/>
+          </p:cNvSpPr>
+          <p:nvPr>
+            <p:ph idx="1"/>
+          </p:nvPr>
+        </p:nvSpPr>
+        <p:spPr/>
+        <p:txBody>
+          <a:bodyPr/>
+          <a:lstStyle/>
+          <a:p>
+            <a:r>
+              <a:rPr lang="nl-NL" dirty="0"/>
+              <a:t>X </a:t>
+            </a:r>
+            <a:r>
+              <a:rPr lang="nl-NL" dirty="0" err="1"/>
+              <a:t>amount</a:t>
+            </a:r>
+            <a:r>
+              <a:rPr lang="nl-NL" dirty="0"/>
+              <a:t> more </a:t>
+            </a:r>
+            <a:r>
+              <a:rPr lang="nl-NL" dirty="0" err="1"/>
+              <a:t>balanced</a:t>
+            </a:r>
+            <a:endParaRPr lang="nl-NL" dirty="0"/>
+          </a:p>
+          <a:p>
+            <a:r>
+              <a:rPr lang="nl-NL" dirty="0" err="1"/>
+              <a:t>Can</a:t>
+            </a:r>
+            <a:r>
+              <a:rPr lang="nl-NL" dirty="0"/>
+              <a:t> handle X transactions/second</a:t>
+            </a:r>
+          </a:p>
+          <a:p>
+            <a:r>
+              <a:rPr lang="nl-NL" dirty="0"/>
+              <a:t>Ect…</a:t>
+            </a:r>
+          </a:p>
+        </p:txBody>
+      </p:sp>
+    </p:spTree>
+    <p:extLst>
+      <p:ext uri="{BB962C8B-B14F-4D97-AF65-F5344CB8AC3E}">
+        <p14:creationId xmlns:p14="http://schemas.microsoft.com/office/powerpoint/2010/main" val="2396185212"/>
+      </p:ext>
+    </p:extLst>
+  </p:cSld>
+  <p:clrMapOvr>
+    <a:masterClrMapping/>
+  </p:clrMapOvr>
+</p:sld>
+</file>
+
+<file path=ppt/slides/slide9.xml><?xml version="1.0" encoding="utf-8"?>
 <p:sld xmlns:a="http://schemas.openxmlformats.org/drawingml/2006/main" xmlns:r="http://schemas.openxmlformats.org/officeDocument/2006/relationships" xmlns:p="http://schemas.openxmlformats.org/presentationml/2006/main">
   <p:cSld>
     <p:spTree>
@@ -3139,7 +3379,7 @@
           <a:p>
             <a:r>
               <a:rPr lang="en-US" dirty="0"/>
-              <a:t>Questions</a:t>
+              <a:t>Demo</a:t>
             </a:r>
           </a:p>
         </p:txBody>
@@ -3176,7 +3416,7 @@
     </p:spTree>
     <p:extLst>
       <p:ext uri="{BB962C8B-B14F-4D97-AF65-F5344CB8AC3E}">
-        <p14:creationId xmlns:p14="http://schemas.microsoft.com/office/powerpoint/2010/main" val="2585660627"/>
+        <p14:creationId xmlns:p14="http://schemas.microsoft.com/office/powerpoint/2010/main" val="3839504634"/>
       </p:ext>
     </p:extLst>
   </p:cSld>

</xml_diff>

<commit_message>
made points in power point more concise and easier to read, added comments for each point
</commit_message>
<xml_diff>
--- a/Documentation/SmartGridChain.pptx
+++ b/Documentation/SmartGridChain.pptx
@@ -5,8 +5,11 @@
     <p:sldMasterId id="2147483648" r:id="rId1"/>
     <p:sldMasterId id="2147483660" r:id="rId2"/>
   </p:sldMasterIdLst>
+  <p:notesMasterIdLst>
+    <p:notesMasterId r:id="rId13"/>
+  </p:notesMasterIdLst>
   <p:handoutMasterIdLst>
-    <p:handoutMasterId r:id="rId13"/>
+    <p:handoutMasterId r:id="rId14"/>
   </p:handoutMasterIdLst>
   <p:sldIdLst>
     <p:sldId id="256" r:id="rId3"/>
@@ -299,6 +302,1835 @@
   </p:cSld>
   <p:clrMap bg1="lt1" tx1="dk1" bg2="lt2" tx2="dk2" accent1="accent1" accent2="accent2" accent3="accent3" accent4="accent4" accent5="accent5" accent6="accent6" hlink="hlink" folHlink="folHlink"/>
 </p:handoutMaster>
+</file>
+
+<file path=ppt/notesMasters/notesMaster1.xml><?xml version="1.0" encoding="utf-8"?>
+<p:notesMaster xmlns:a="http://schemas.openxmlformats.org/drawingml/2006/main" xmlns:r="http://schemas.openxmlformats.org/officeDocument/2006/relationships" xmlns:p="http://schemas.openxmlformats.org/presentationml/2006/main">
+  <p:cSld>
+    <p:bg>
+      <p:bgRef idx="1001">
+        <a:schemeClr val="bg1"/>
+      </p:bgRef>
+    </p:bg>
+    <p:spTree>
+      <p:nvGrpSpPr>
+        <p:cNvPr id="1" name=""/>
+        <p:cNvGrpSpPr/>
+        <p:nvPr/>
+      </p:nvGrpSpPr>
+      <p:grpSpPr>
+        <a:xfrm>
+          <a:off x="0" y="0"/>
+          <a:ext cx="0" cy="0"/>
+          <a:chOff x="0" y="0"/>
+          <a:chExt cx="0" cy="0"/>
+        </a:xfrm>
+      </p:grpSpPr>
+      <p:sp>
+        <p:nvSpPr>
+          <p:cNvPr id="2" name="Header Placeholder 1"/>
+          <p:cNvSpPr>
+            <a:spLocks noGrp="1"/>
+          </p:cNvSpPr>
+          <p:nvPr>
+            <p:ph type="hdr" sz="quarter"/>
+          </p:nvPr>
+        </p:nvSpPr>
+        <p:spPr>
+          <a:xfrm>
+            <a:off x="0" y="0"/>
+            <a:ext cx="2971800" cy="458788"/>
+          </a:xfrm>
+          <a:prstGeom prst="rect">
+            <a:avLst/>
+          </a:prstGeom>
+        </p:spPr>
+        <p:txBody>
+          <a:bodyPr vert="horz" lIns="91440" tIns="45720" rIns="91440" bIns="45720" rtlCol="0"/>
+          <a:lstStyle>
+            <a:lvl1pPr algn="l">
+              <a:defRPr sz="1200"/>
+            </a:lvl1pPr>
+          </a:lstStyle>
+          <a:p>
+            <a:endParaRPr lang="nl-NL"/>
+          </a:p>
+        </p:txBody>
+      </p:sp>
+      <p:sp>
+        <p:nvSpPr>
+          <p:cNvPr id="3" name="Date Placeholder 2"/>
+          <p:cNvSpPr>
+            <a:spLocks noGrp="1"/>
+          </p:cNvSpPr>
+          <p:nvPr>
+            <p:ph type="dt" idx="1"/>
+          </p:nvPr>
+        </p:nvSpPr>
+        <p:spPr>
+          <a:xfrm>
+            <a:off x="3884613" y="0"/>
+            <a:ext cx="2971800" cy="458788"/>
+          </a:xfrm>
+          <a:prstGeom prst="rect">
+            <a:avLst/>
+          </a:prstGeom>
+        </p:spPr>
+        <p:txBody>
+          <a:bodyPr vert="horz" lIns="91440" tIns="45720" rIns="91440" bIns="45720" rtlCol="0"/>
+          <a:lstStyle>
+            <a:lvl1pPr algn="r">
+              <a:defRPr sz="1200"/>
+            </a:lvl1pPr>
+          </a:lstStyle>
+          <a:p>
+            <a:fld id="{86A2537F-BF31-42A6-A915-F1A57E104BE2}" type="datetimeFigureOut">
+              <a:rPr lang="nl-NL" smtClean="0"/>
+              <a:t>18-2-2018</a:t>
+            </a:fld>
+            <a:endParaRPr lang="nl-NL"/>
+          </a:p>
+        </p:txBody>
+      </p:sp>
+      <p:sp>
+        <p:nvSpPr>
+          <p:cNvPr id="4" name="Slide Image Placeholder 3"/>
+          <p:cNvSpPr>
+            <a:spLocks noGrp="1" noRot="1" noChangeAspect="1"/>
+          </p:cNvSpPr>
+          <p:nvPr>
+            <p:ph type="sldImg" idx="2"/>
+          </p:nvPr>
+        </p:nvSpPr>
+        <p:spPr>
+          <a:xfrm>
+            <a:off x="685800" y="1143000"/>
+            <a:ext cx="5486400" cy="3086100"/>
+          </a:xfrm>
+          <a:prstGeom prst="rect">
+            <a:avLst/>
+          </a:prstGeom>
+          <a:noFill/>
+          <a:ln w="12700">
+            <a:solidFill>
+              <a:prstClr val="black"/>
+            </a:solidFill>
+          </a:ln>
+        </p:spPr>
+        <p:txBody>
+          <a:bodyPr vert="horz" lIns="91440" tIns="45720" rIns="91440" bIns="45720" rtlCol="0" anchor="ctr"/>
+          <a:lstStyle/>
+          <a:p>
+            <a:endParaRPr lang="nl-NL"/>
+          </a:p>
+        </p:txBody>
+      </p:sp>
+      <p:sp>
+        <p:nvSpPr>
+          <p:cNvPr id="5" name="Notes Placeholder 4"/>
+          <p:cNvSpPr>
+            <a:spLocks noGrp="1"/>
+          </p:cNvSpPr>
+          <p:nvPr>
+            <p:ph type="body" sz="quarter" idx="3"/>
+          </p:nvPr>
+        </p:nvSpPr>
+        <p:spPr>
+          <a:xfrm>
+            <a:off x="685800" y="4400550"/>
+            <a:ext cx="5486400" cy="3600450"/>
+          </a:xfrm>
+          <a:prstGeom prst="rect">
+            <a:avLst/>
+          </a:prstGeom>
+        </p:spPr>
+        <p:txBody>
+          <a:bodyPr vert="horz" lIns="91440" tIns="45720" rIns="91440" bIns="45720" rtlCol="0"/>
+          <a:lstStyle/>
+          <a:p>
+            <a:pPr lvl="0"/>
+            <a:r>
+              <a:rPr lang="en-US"/>
+              <a:t>Edit Master text styles</a:t>
+            </a:r>
+          </a:p>
+          <a:p>
+            <a:pPr lvl="1"/>
+            <a:r>
+              <a:rPr lang="en-US"/>
+              <a:t>Second level</a:t>
+            </a:r>
+          </a:p>
+          <a:p>
+            <a:pPr lvl="2"/>
+            <a:r>
+              <a:rPr lang="en-US"/>
+              <a:t>Third level</a:t>
+            </a:r>
+          </a:p>
+          <a:p>
+            <a:pPr lvl="3"/>
+            <a:r>
+              <a:rPr lang="en-US"/>
+              <a:t>Fourth level</a:t>
+            </a:r>
+          </a:p>
+          <a:p>
+            <a:pPr lvl="4"/>
+            <a:r>
+              <a:rPr lang="en-US"/>
+              <a:t>Fifth level</a:t>
+            </a:r>
+            <a:endParaRPr lang="nl-NL"/>
+          </a:p>
+        </p:txBody>
+      </p:sp>
+      <p:sp>
+        <p:nvSpPr>
+          <p:cNvPr id="6" name="Footer Placeholder 5"/>
+          <p:cNvSpPr>
+            <a:spLocks noGrp="1"/>
+          </p:cNvSpPr>
+          <p:nvPr>
+            <p:ph type="ftr" sz="quarter" idx="4"/>
+          </p:nvPr>
+        </p:nvSpPr>
+        <p:spPr>
+          <a:xfrm>
+            <a:off x="0" y="8685213"/>
+            <a:ext cx="2971800" cy="458787"/>
+          </a:xfrm>
+          <a:prstGeom prst="rect">
+            <a:avLst/>
+          </a:prstGeom>
+        </p:spPr>
+        <p:txBody>
+          <a:bodyPr vert="horz" lIns="91440" tIns="45720" rIns="91440" bIns="45720" rtlCol="0" anchor="b"/>
+          <a:lstStyle>
+            <a:lvl1pPr algn="l">
+              <a:defRPr sz="1200"/>
+            </a:lvl1pPr>
+          </a:lstStyle>
+          <a:p>
+            <a:endParaRPr lang="nl-NL"/>
+          </a:p>
+        </p:txBody>
+      </p:sp>
+      <p:sp>
+        <p:nvSpPr>
+          <p:cNvPr id="7" name="Slide Number Placeholder 6"/>
+          <p:cNvSpPr>
+            <a:spLocks noGrp="1"/>
+          </p:cNvSpPr>
+          <p:nvPr>
+            <p:ph type="sldNum" sz="quarter" idx="5"/>
+          </p:nvPr>
+        </p:nvSpPr>
+        <p:spPr>
+          <a:xfrm>
+            <a:off x="3884613" y="8685213"/>
+            <a:ext cx="2971800" cy="458787"/>
+          </a:xfrm>
+          <a:prstGeom prst="rect">
+            <a:avLst/>
+          </a:prstGeom>
+        </p:spPr>
+        <p:txBody>
+          <a:bodyPr vert="horz" lIns="91440" tIns="45720" rIns="91440" bIns="45720" rtlCol="0" anchor="b"/>
+          <a:lstStyle>
+            <a:lvl1pPr algn="r">
+              <a:defRPr sz="1200"/>
+            </a:lvl1pPr>
+          </a:lstStyle>
+          <a:p>
+            <a:fld id="{168E5194-5D91-4137-A187-4C8F6A803743}" type="slidenum">
+              <a:rPr lang="nl-NL" smtClean="0"/>
+              <a:t>‹#›</a:t>
+            </a:fld>
+            <a:endParaRPr lang="nl-NL"/>
+          </a:p>
+        </p:txBody>
+      </p:sp>
+    </p:spTree>
+    <p:extLst>
+      <p:ext uri="{BB962C8B-B14F-4D97-AF65-F5344CB8AC3E}">
+        <p14:creationId xmlns:p14="http://schemas.microsoft.com/office/powerpoint/2010/main" val="3425091560"/>
+      </p:ext>
+    </p:extLst>
+  </p:cSld>
+  <p:clrMap bg1="lt1" tx1="dk1" bg2="lt2" tx2="dk2" accent1="accent1" accent2="accent2" accent3="accent3" accent4="accent4" accent5="accent5" accent6="accent6" hlink="hlink" folHlink="folHlink"/>
+  <p:notesStyle>
+    <a:lvl1pPr marL="0" algn="l" defTabSz="914400" rtl="0" eaLnBrk="1" latinLnBrk="0" hangingPunct="1">
+      <a:defRPr sz="1200" kern="1200">
+        <a:solidFill>
+          <a:schemeClr val="tx1"/>
+        </a:solidFill>
+        <a:latin typeface="+mn-lt"/>
+        <a:ea typeface="+mn-ea"/>
+        <a:cs typeface="+mn-cs"/>
+      </a:defRPr>
+    </a:lvl1pPr>
+    <a:lvl2pPr marL="457200" algn="l" defTabSz="914400" rtl="0" eaLnBrk="1" latinLnBrk="0" hangingPunct="1">
+      <a:defRPr sz="1200" kern="1200">
+        <a:solidFill>
+          <a:schemeClr val="tx1"/>
+        </a:solidFill>
+        <a:latin typeface="+mn-lt"/>
+        <a:ea typeface="+mn-ea"/>
+        <a:cs typeface="+mn-cs"/>
+      </a:defRPr>
+    </a:lvl2pPr>
+    <a:lvl3pPr marL="914400" algn="l" defTabSz="914400" rtl="0" eaLnBrk="1" latinLnBrk="0" hangingPunct="1">
+      <a:defRPr sz="1200" kern="1200">
+        <a:solidFill>
+          <a:schemeClr val="tx1"/>
+        </a:solidFill>
+        <a:latin typeface="+mn-lt"/>
+        <a:ea typeface="+mn-ea"/>
+        <a:cs typeface="+mn-cs"/>
+      </a:defRPr>
+    </a:lvl3pPr>
+    <a:lvl4pPr marL="1371600" algn="l" defTabSz="914400" rtl="0" eaLnBrk="1" latinLnBrk="0" hangingPunct="1">
+      <a:defRPr sz="1200" kern="1200">
+        <a:solidFill>
+          <a:schemeClr val="tx1"/>
+        </a:solidFill>
+        <a:latin typeface="+mn-lt"/>
+        <a:ea typeface="+mn-ea"/>
+        <a:cs typeface="+mn-cs"/>
+      </a:defRPr>
+    </a:lvl4pPr>
+    <a:lvl5pPr marL="1828800" algn="l" defTabSz="914400" rtl="0" eaLnBrk="1" latinLnBrk="0" hangingPunct="1">
+      <a:defRPr sz="1200" kern="1200">
+        <a:solidFill>
+          <a:schemeClr val="tx1"/>
+        </a:solidFill>
+        <a:latin typeface="+mn-lt"/>
+        <a:ea typeface="+mn-ea"/>
+        <a:cs typeface="+mn-cs"/>
+      </a:defRPr>
+    </a:lvl5pPr>
+    <a:lvl6pPr marL="2286000" algn="l" defTabSz="914400" rtl="0" eaLnBrk="1" latinLnBrk="0" hangingPunct="1">
+      <a:defRPr sz="1200" kern="1200">
+        <a:solidFill>
+          <a:schemeClr val="tx1"/>
+        </a:solidFill>
+        <a:latin typeface="+mn-lt"/>
+        <a:ea typeface="+mn-ea"/>
+        <a:cs typeface="+mn-cs"/>
+      </a:defRPr>
+    </a:lvl6pPr>
+    <a:lvl7pPr marL="2743200" algn="l" defTabSz="914400" rtl="0" eaLnBrk="1" latinLnBrk="0" hangingPunct="1">
+      <a:defRPr sz="1200" kern="1200">
+        <a:solidFill>
+          <a:schemeClr val="tx1"/>
+        </a:solidFill>
+        <a:latin typeface="+mn-lt"/>
+        <a:ea typeface="+mn-ea"/>
+        <a:cs typeface="+mn-cs"/>
+      </a:defRPr>
+    </a:lvl7pPr>
+    <a:lvl8pPr marL="3200400" algn="l" defTabSz="914400" rtl="0" eaLnBrk="1" latinLnBrk="0" hangingPunct="1">
+      <a:defRPr sz="1200" kern="1200">
+        <a:solidFill>
+          <a:schemeClr val="tx1"/>
+        </a:solidFill>
+        <a:latin typeface="+mn-lt"/>
+        <a:ea typeface="+mn-ea"/>
+        <a:cs typeface="+mn-cs"/>
+      </a:defRPr>
+    </a:lvl8pPr>
+    <a:lvl9pPr marL="3657600" algn="l" defTabSz="914400" rtl="0" eaLnBrk="1" latinLnBrk="0" hangingPunct="1">
+      <a:defRPr sz="1200" kern="1200">
+        <a:solidFill>
+          <a:schemeClr val="tx1"/>
+        </a:solidFill>
+        <a:latin typeface="+mn-lt"/>
+        <a:ea typeface="+mn-ea"/>
+        <a:cs typeface="+mn-cs"/>
+      </a:defRPr>
+    </a:lvl9pPr>
+  </p:notesStyle>
+</p:notesMaster>
+</file>
+
+<file path=ppt/notesSlides/notesSlide1.xml><?xml version="1.0" encoding="utf-8"?>
+<p:notes xmlns:a="http://schemas.openxmlformats.org/drawingml/2006/main" xmlns:r="http://schemas.openxmlformats.org/officeDocument/2006/relationships" xmlns:p="http://schemas.openxmlformats.org/presentationml/2006/main">
+  <p:cSld>
+    <p:spTree>
+      <p:nvGrpSpPr>
+        <p:cNvPr id="1" name=""/>
+        <p:cNvGrpSpPr/>
+        <p:nvPr/>
+      </p:nvGrpSpPr>
+      <p:grpSpPr>
+        <a:xfrm>
+          <a:off x="0" y="0"/>
+          <a:ext cx="0" cy="0"/>
+          <a:chOff x="0" y="0"/>
+          <a:chExt cx="0" cy="0"/>
+        </a:xfrm>
+      </p:grpSpPr>
+      <p:sp>
+        <p:nvSpPr>
+          <p:cNvPr id="2" name="Slide Image Placeholder 1"/>
+          <p:cNvSpPr>
+            <a:spLocks noGrp="1" noRot="1" noChangeAspect="1"/>
+          </p:cNvSpPr>
+          <p:nvPr>
+            <p:ph type="sldImg"/>
+          </p:nvPr>
+        </p:nvSpPr>
+        <p:spPr/>
+      </p:sp>
+      <p:sp>
+        <p:nvSpPr>
+          <p:cNvPr id="3" name="Notes Placeholder 2"/>
+          <p:cNvSpPr>
+            <a:spLocks noGrp="1"/>
+          </p:cNvSpPr>
+          <p:nvPr>
+            <p:ph type="body" idx="1"/>
+          </p:nvPr>
+        </p:nvSpPr>
+        <p:spPr/>
+        <p:txBody>
+          <a:bodyPr/>
+          <a:lstStyle/>
+          <a:p>
+            <a:r>
+              <a:rPr lang="en-US" dirty="0"/>
+              <a:t>imbalance caused by unpredictable consumers and producers</a:t>
+            </a:r>
+          </a:p>
+          <a:p>
+            <a:endParaRPr lang="en-US" dirty="0"/>
+          </a:p>
+          <a:p>
+            <a:r>
+              <a:rPr lang="en-US" dirty="0"/>
+              <a:t>consumers are also becoming producers</a:t>
+            </a:r>
+            <a:endParaRPr lang="nl-NL" dirty="0"/>
+          </a:p>
+        </p:txBody>
+      </p:sp>
+      <p:sp>
+        <p:nvSpPr>
+          <p:cNvPr id="4" name="Slide Number Placeholder 3"/>
+          <p:cNvSpPr>
+            <a:spLocks noGrp="1"/>
+          </p:cNvSpPr>
+          <p:nvPr>
+            <p:ph type="sldNum" sz="quarter" idx="10"/>
+          </p:nvPr>
+        </p:nvSpPr>
+        <p:spPr/>
+        <p:txBody>
+          <a:bodyPr/>
+          <a:lstStyle/>
+          <a:p>
+            <a:fld id="{168E5194-5D91-4137-A187-4C8F6A803743}" type="slidenum">
+              <a:rPr lang="nl-NL" smtClean="0"/>
+              <a:t>2</a:t>
+            </a:fld>
+            <a:endParaRPr lang="nl-NL"/>
+          </a:p>
+        </p:txBody>
+      </p:sp>
+    </p:spTree>
+    <p:extLst>
+      <p:ext uri="{BB962C8B-B14F-4D97-AF65-F5344CB8AC3E}">
+        <p14:creationId xmlns:p14="http://schemas.microsoft.com/office/powerpoint/2010/main" val="728153563"/>
+      </p:ext>
+    </p:extLst>
+  </p:cSld>
+  <p:clrMapOvr>
+    <a:masterClrMapping/>
+  </p:clrMapOvr>
+</p:notes>
+</file>
+
+<file path=ppt/notesSlides/notesSlide2.xml><?xml version="1.0" encoding="utf-8"?>
+<p:notes xmlns:a="http://schemas.openxmlformats.org/drawingml/2006/main" xmlns:r="http://schemas.openxmlformats.org/officeDocument/2006/relationships" xmlns:p="http://schemas.openxmlformats.org/presentationml/2006/main">
+  <p:cSld>
+    <p:spTree>
+      <p:nvGrpSpPr>
+        <p:cNvPr id="1" name=""/>
+        <p:cNvGrpSpPr/>
+        <p:nvPr/>
+      </p:nvGrpSpPr>
+      <p:grpSpPr>
+        <a:xfrm>
+          <a:off x="0" y="0"/>
+          <a:ext cx="0" cy="0"/>
+          <a:chOff x="0" y="0"/>
+          <a:chExt cx="0" cy="0"/>
+        </a:xfrm>
+      </p:grpSpPr>
+      <p:sp>
+        <p:nvSpPr>
+          <p:cNvPr id="2" name="Slide Image Placeholder 1"/>
+          <p:cNvSpPr>
+            <a:spLocks noGrp="1" noRot="1" noChangeAspect="1"/>
+          </p:cNvSpPr>
+          <p:nvPr>
+            <p:ph type="sldImg"/>
+          </p:nvPr>
+        </p:nvSpPr>
+        <p:spPr/>
+      </p:sp>
+      <p:sp>
+        <p:nvSpPr>
+          <p:cNvPr id="3" name="Notes Placeholder 2"/>
+          <p:cNvSpPr>
+            <a:spLocks noGrp="1"/>
+          </p:cNvSpPr>
+          <p:nvPr>
+            <p:ph type="body" idx="1"/>
+          </p:nvPr>
+        </p:nvSpPr>
+        <p:spPr/>
+        <p:txBody>
+          <a:bodyPr/>
+          <a:lstStyle/>
+          <a:p>
+            <a:pPr marL="0" marR="0" lvl="0" indent="0" algn="l" defTabSz="914400" rtl="0" eaLnBrk="1" fontAlgn="auto" latinLnBrk="0" hangingPunct="1">
+              <a:lnSpc>
+                <a:spcPct val="100000"/>
+              </a:lnSpc>
+              <a:spcBef>
+                <a:spcPts val="0"/>
+              </a:spcBef>
+              <a:spcAft>
+                <a:spcPts val="0"/>
+              </a:spcAft>
+              <a:buClrTx/>
+              <a:buSzTx/>
+              <a:buFontTx/>
+              <a:buNone/>
+              <a:tabLst/>
+              <a:defRPr/>
+            </a:pPr>
+            <a:r>
+              <a:rPr lang="en-US" dirty="0"/>
+              <a:t>physical grid setup:</a:t>
+            </a:r>
+          </a:p>
+          <a:p>
+            <a:pPr marL="0" marR="0" lvl="0" indent="0" algn="l" defTabSz="914400" rtl="0" eaLnBrk="1" fontAlgn="auto" latinLnBrk="0" hangingPunct="1">
+              <a:lnSpc>
+                <a:spcPct val="100000"/>
+              </a:lnSpc>
+              <a:spcBef>
+                <a:spcPts val="0"/>
+              </a:spcBef>
+              <a:spcAft>
+                <a:spcPts val="0"/>
+              </a:spcAft>
+              <a:buClrTx/>
+              <a:buSzTx/>
+              <a:buFontTx/>
+              <a:buNone/>
+              <a:tabLst/>
+              <a:defRPr/>
+            </a:pPr>
+            <a:r>
+              <a:rPr lang="en-US" dirty="0"/>
+              <a:t>	grid is static</a:t>
+            </a:r>
+          </a:p>
+          <a:p>
+            <a:pPr marL="0" marR="0" lvl="0" indent="0" algn="l" defTabSz="914400" rtl="0" eaLnBrk="1" fontAlgn="auto" latinLnBrk="0" hangingPunct="1">
+              <a:lnSpc>
+                <a:spcPct val="100000"/>
+              </a:lnSpc>
+              <a:spcBef>
+                <a:spcPts val="0"/>
+              </a:spcBef>
+              <a:spcAft>
+                <a:spcPts val="0"/>
+              </a:spcAft>
+              <a:buClrTx/>
+              <a:buSzTx/>
+              <a:buFontTx/>
+              <a:buNone/>
+              <a:tabLst/>
+              <a:defRPr/>
+            </a:pPr>
+            <a:r>
+              <a:rPr lang="en-US" dirty="0"/>
+              <a:t>	hard to change / adjust</a:t>
+            </a:r>
+          </a:p>
+          <a:p>
+            <a:pPr marL="0" marR="0" lvl="0" indent="0" algn="l" defTabSz="914400" rtl="0" eaLnBrk="1" fontAlgn="auto" latinLnBrk="0" hangingPunct="1">
+              <a:lnSpc>
+                <a:spcPct val="100000"/>
+              </a:lnSpc>
+              <a:spcBef>
+                <a:spcPts val="0"/>
+              </a:spcBef>
+              <a:spcAft>
+                <a:spcPts val="0"/>
+              </a:spcAft>
+              <a:buClrTx/>
+              <a:buSzTx/>
+              <a:buFontTx/>
+              <a:buNone/>
+              <a:tabLst/>
+              <a:defRPr/>
+            </a:pPr>
+            <a:endParaRPr lang="en-US" dirty="0"/>
+          </a:p>
+          <a:p>
+            <a:pPr marL="0" marR="0" lvl="0" indent="0" algn="l" defTabSz="914400" rtl="0" eaLnBrk="1" fontAlgn="auto" latinLnBrk="0" hangingPunct="1">
+              <a:lnSpc>
+                <a:spcPct val="100000"/>
+              </a:lnSpc>
+              <a:spcBef>
+                <a:spcPts val="0"/>
+              </a:spcBef>
+              <a:spcAft>
+                <a:spcPts val="0"/>
+              </a:spcAft>
+              <a:buClrTx/>
+              <a:buSzTx/>
+              <a:buFontTx/>
+              <a:buNone/>
+              <a:tabLst/>
+              <a:defRPr/>
+            </a:pPr>
+            <a:r>
+              <a:rPr lang="en-US" dirty="0"/>
+              <a:t>physical limit on capacity:</a:t>
+            </a:r>
+          </a:p>
+          <a:p>
+            <a:pPr marL="0" marR="0" lvl="0" indent="0" algn="l" defTabSz="914400" rtl="0" eaLnBrk="1" fontAlgn="auto" latinLnBrk="0" hangingPunct="1">
+              <a:lnSpc>
+                <a:spcPct val="100000"/>
+              </a:lnSpc>
+              <a:spcBef>
+                <a:spcPts val="0"/>
+              </a:spcBef>
+              <a:spcAft>
+                <a:spcPts val="0"/>
+              </a:spcAft>
+              <a:buClrTx/>
+              <a:buSzTx/>
+              <a:buFontTx/>
+              <a:buNone/>
+              <a:tabLst/>
+              <a:defRPr/>
+            </a:pPr>
+            <a:r>
+              <a:rPr lang="en-US" dirty="0"/>
+              <a:t>	power limit for each cluster</a:t>
+            </a:r>
+          </a:p>
+          <a:p>
+            <a:pPr marL="0" marR="0" lvl="0" indent="0" algn="l" defTabSz="914400" rtl="0" eaLnBrk="1" fontAlgn="auto" latinLnBrk="0" hangingPunct="1">
+              <a:lnSpc>
+                <a:spcPct val="100000"/>
+              </a:lnSpc>
+              <a:spcBef>
+                <a:spcPts val="0"/>
+              </a:spcBef>
+              <a:spcAft>
+                <a:spcPts val="0"/>
+              </a:spcAft>
+              <a:buClrTx/>
+              <a:buSzTx/>
+              <a:buFontTx/>
+              <a:buNone/>
+              <a:tabLst/>
+              <a:defRPr/>
+            </a:pPr>
+            <a:r>
+              <a:rPr lang="en-US" dirty="0"/>
+              <a:t>	if broken large consequences </a:t>
+            </a:r>
+          </a:p>
+          <a:p>
+            <a:pPr marL="0" marR="0" lvl="0" indent="0" algn="l" defTabSz="914400" rtl="0" eaLnBrk="1" fontAlgn="auto" latinLnBrk="0" hangingPunct="1">
+              <a:lnSpc>
+                <a:spcPct val="100000"/>
+              </a:lnSpc>
+              <a:spcBef>
+                <a:spcPts val="0"/>
+              </a:spcBef>
+              <a:spcAft>
+                <a:spcPts val="0"/>
+              </a:spcAft>
+              <a:buClrTx/>
+              <a:buSzTx/>
+              <a:buFontTx/>
+              <a:buNone/>
+              <a:tabLst/>
+              <a:defRPr/>
+            </a:pPr>
+            <a:endParaRPr lang="en-US" dirty="0"/>
+          </a:p>
+          <a:p>
+            <a:pPr marL="0" marR="0" lvl="0" indent="0" algn="l" defTabSz="914400" rtl="0" eaLnBrk="1" fontAlgn="auto" latinLnBrk="0" hangingPunct="1">
+              <a:lnSpc>
+                <a:spcPct val="100000"/>
+              </a:lnSpc>
+              <a:spcBef>
+                <a:spcPts val="0"/>
+              </a:spcBef>
+              <a:spcAft>
+                <a:spcPts val="0"/>
+              </a:spcAft>
+              <a:buClrTx/>
+              <a:buSzTx/>
+              <a:buFontTx/>
+              <a:buNone/>
+              <a:tabLst/>
+              <a:defRPr/>
+            </a:pPr>
+            <a:r>
+              <a:rPr lang="en-US" dirty="0"/>
+              <a:t>absence of dynamic balancing:</a:t>
+            </a:r>
+          </a:p>
+          <a:p>
+            <a:pPr marL="0" marR="0" lvl="0" indent="0" algn="l" defTabSz="914400" rtl="0" eaLnBrk="1" fontAlgn="auto" latinLnBrk="0" hangingPunct="1">
+              <a:lnSpc>
+                <a:spcPct val="100000"/>
+              </a:lnSpc>
+              <a:spcBef>
+                <a:spcPts val="0"/>
+              </a:spcBef>
+              <a:spcAft>
+                <a:spcPts val="0"/>
+              </a:spcAft>
+              <a:buClrTx/>
+              <a:buSzTx/>
+              <a:buFontTx/>
+              <a:buNone/>
+              <a:tabLst/>
+              <a:defRPr/>
+            </a:pPr>
+            <a:r>
+              <a:rPr lang="en-US" dirty="0"/>
+              <a:t>	only at highest level imbalance is corrected thereby still imbalance at lower levels</a:t>
+            </a:r>
+          </a:p>
+          <a:p>
+            <a:pPr marL="0" marR="0" lvl="0" indent="0" algn="l" defTabSz="914400" rtl="0" eaLnBrk="1" fontAlgn="auto" latinLnBrk="0" hangingPunct="1">
+              <a:lnSpc>
+                <a:spcPct val="100000"/>
+              </a:lnSpc>
+              <a:spcBef>
+                <a:spcPts val="0"/>
+              </a:spcBef>
+              <a:spcAft>
+                <a:spcPts val="0"/>
+              </a:spcAft>
+              <a:buClrTx/>
+              <a:buSzTx/>
+              <a:buFontTx/>
+              <a:buNone/>
+              <a:tabLst/>
+              <a:defRPr/>
+            </a:pPr>
+            <a:endParaRPr lang="en-US" dirty="0"/>
+          </a:p>
+          <a:p>
+            <a:pPr marL="0" marR="0" lvl="0" indent="0" algn="l" defTabSz="914400" rtl="0" eaLnBrk="1" fontAlgn="auto" latinLnBrk="0" hangingPunct="1">
+              <a:lnSpc>
+                <a:spcPct val="100000"/>
+              </a:lnSpc>
+              <a:spcBef>
+                <a:spcPts val="0"/>
+              </a:spcBef>
+              <a:spcAft>
+                <a:spcPts val="0"/>
+              </a:spcAft>
+              <a:buClrTx/>
+              <a:buSzTx/>
+              <a:buFontTx/>
+              <a:buNone/>
+              <a:tabLst/>
+              <a:defRPr/>
+            </a:pPr>
+            <a:r>
+              <a:rPr lang="en-US" dirty="0"/>
+              <a:t>physical grid setup:</a:t>
+            </a:r>
+          </a:p>
+          <a:p>
+            <a:pPr marL="0" marR="0" lvl="0" indent="0" algn="l" defTabSz="914400" rtl="0" eaLnBrk="1" fontAlgn="auto" latinLnBrk="0" hangingPunct="1">
+              <a:lnSpc>
+                <a:spcPct val="100000"/>
+              </a:lnSpc>
+              <a:spcBef>
+                <a:spcPts val="0"/>
+              </a:spcBef>
+              <a:spcAft>
+                <a:spcPts val="0"/>
+              </a:spcAft>
+              <a:buClrTx/>
+              <a:buSzTx/>
+              <a:buFontTx/>
+              <a:buNone/>
+              <a:tabLst/>
+              <a:defRPr/>
+            </a:pPr>
+            <a:r>
+              <a:rPr lang="en-US" dirty="0"/>
+              <a:t>	grid is static</a:t>
+            </a:r>
+          </a:p>
+          <a:p>
+            <a:pPr marL="0" marR="0" lvl="0" indent="0" algn="l" defTabSz="914400" rtl="0" eaLnBrk="1" fontAlgn="auto" latinLnBrk="0" hangingPunct="1">
+              <a:lnSpc>
+                <a:spcPct val="100000"/>
+              </a:lnSpc>
+              <a:spcBef>
+                <a:spcPts val="0"/>
+              </a:spcBef>
+              <a:spcAft>
+                <a:spcPts val="0"/>
+              </a:spcAft>
+              <a:buClrTx/>
+              <a:buSzTx/>
+              <a:buFontTx/>
+              <a:buNone/>
+              <a:tabLst/>
+              <a:defRPr/>
+            </a:pPr>
+            <a:r>
+              <a:rPr lang="en-US" dirty="0"/>
+              <a:t>	hard to change / adjust</a:t>
+            </a:r>
+          </a:p>
+          <a:p>
+            <a:pPr marL="0" marR="0" lvl="0" indent="0" algn="l" defTabSz="914400" rtl="0" eaLnBrk="1" fontAlgn="auto" latinLnBrk="0" hangingPunct="1">
+              <a:lnSpc>
+                <a:spcPct val="100000"/>
+              </a:lnSpc>
+              <a:spcBef>
+                <a:spcPts val="0"/>
+              </a:spcBef>
+              <a:spcAft>
+                <a:spcPts val="0"/>
+              </a:spcAft>
+              <a:buClrTx/>
+              <a:buSzTx/>
+              <a:buFontTx/>
+              <a:buNone/>
+              <a:tabLst/>
+              <a:defRPr/>
+            </a:pPr>
+            <a:endParaRPr lang="en-US" dirty="0"/>
+          </a:p>
+          <a:p>
+            <a:pPr marL="0" marR="0" lvl="0" indent="0" algn="l" defTabSz="914400" rtl="0" eaLnBrk="1" fontAlgn="auto" latinLnBrk="0" hangingPunct="1">
+              <a:lnSpc>
+                <a:spcPct val="100000"/>
+              </a:lnSpc>
+              <a:spcBef>
+                <a:spcPts val="0"/>
+              </a:spcBef>
+              <a:spcAft>
+                <a:spcPts val="0"/>
+              </a:spcAft>
+              <a:buClrTx/>
+              <a:buSzTx/>
+              <a:buFontTx/>
+              <a:buNone/>
+              <a:tabLst/>
+              <a:defRPr/>
+            </a:pPr>
+            <a:r>
+              <a:rPr lang="en-US" dirty="0"/>
+              <a:t>physical limit on capacity:</a:t>
+            </a:r>
+          </a:p>
+          <a:p>
+            <a:pPr marL="0" marR="0" lvl="0" indent="0" algn="l" defTabSz="914400" rtl="0" eaLnBrk="1" fontAlgn="auto" latinLnBrk="0" hangingPunct="1">
+              <a:lnSpc>
+                <a:spcPct val="100000"/>
+              </a:lnSpc>
+              <a:spcBef>
+                <a:spcPts val="0"/>
+              </a:spcBef>
+              <a:spcAft>
+                <a:spcPts val="0"/>
+              </a:spcAft>
+              <a:buClrTx/>
+              <a:buSzTx/>
+              <a:buFontTx/>
+              <a:buNone/>
+              <a:tabLst/>
+              <a:defRPr/>
+            </a:pPr>
+            <a:r>
+              <a:rPr lang="en-US" dirty="0"/>
+              <a:t>	power limit for each cluster</a:t>
+            </a:r>
+          </a:p>
+          <a:p>
+            <a:pPr marL="0" marR="0" lvl="0" indent="0" algn="l" defTabSz="914400" rtl="0" eaLnBrk="1" fontAlgn="auto" latinLnBrk="0" hangingPunct="1">
+              <a:lnSpc>
+                <a:spcPct val="100000"/>
+              </a:lnSpc>
+              <a:spcBef>
+                <a:spcPts val="0"/>
+              </a:spcBef>
+              <a:spcAft>
+                <a:spcPts val="0"/>
+              </a:spcAft>
+              <a:buClrTx/>
+              <a:buSzTx/>
+              <a:buFontTx/>
+              <a:buNone/>
+              <a:tabLst/>
+              <a:defRPr/>
+            </a:pPr>
+            <a:r>
+              <a:rPr lang="en-US" dirty="0"/>
+              <a:t>	if broken large consequences </a:t>
+            </a:r>
+          </a:p>
+          <a:p>
+            <a:pPr marL="0" marR="0" lvl="0" indent="0" algn="l" defTabSz="914400" rtl="0" eaLnBrk="1" fontAlgn="auto" latinLnBrk="0" hangingPunct="1">
+              <a:lnSpc>
+                <a:spcPct val="100000"/>
+              </a:lnSpc>
+              <a:spcBef>
+                <a:spcPts val="0"/>
+              </a:spcBef>
+              <a:spcAft>
+                <a:spcPts val="0"/>
+              </a:spcAft>
+              <a:buClrTx/>
+              <a:buSzTx/>
+              <a:buFontTx/>
+              <a:buNone/>
+              <a:tabLst/>
+              <a:defRPr/>
+            </a:pPr>
+            <a:endParaRPr lang="en-US" dirty="0"/>
+          </a:p>
+          <a:p>
+            <a:pPr marL="0" marR="0" lvl="0" indent="0" algn="l" defTabSz="914400" rtl="0" eaLnBrk="1" fontAlgn="auto" latinLnBrk="0" hangingPunct="1">
+              <a:lnSpc>
+                <a:spcPct val="100000"/>
+              </a:lnSpc>
+              <a:spcBef>
+                <a:spcPts val="0"/>
+              </a:spcBef>
+              <a:spcAft>
+                <a:spcPts val="0"/>
+              </a:spcAft>
+              <a:buClrTx/>
+              <a:buSzTx/>
+              <a:buFontTx/>
+              <a:buNone/>
+              <a:tabLst/>
+              <a:defRPr/>
+            </a:pPr>
+            <a:r>
+              <a:rPr lang="en-US" dirty="0"/>
+              <a:t>multiple parties involved:</a:t>
+            </a:r>
+          </a:p>
+          <a:p>
+            <a:pPr marL="0" marR="0" lvl="0" indent="0" algn="l" defTabSz="914400" rtl="0" eaLnBrk="1" fontAlgn="auto" latinLnBrk="0" hangingPunct="1">
+              <a:lnSpc>
+                <a:spcPct val="100000"/>
+              </a:lnSpc>
+              <a:spcBef>
+                <a:spcPts val="0"/>
+              </a:spcBef>
+              <a:spcAft>
+                <a:spcPts val="0"/>
+              </a:spcAft>
+              <a:buClrTx/>
+              <a:buSzTx/>
+              <a:buFontTx/>
+              <a:buNone/>
+              <a:tabLst/>
+              <a:defRPr/>
+            </a:pPr>
+            <a:r>
+              <a:rPr lang="en-US" dirty="0"/>
+              <a:t>	for balancing many parties need to come to an agreement</a:t>
+            </a:r>
+          </a:p>
+          <a:p>
+            <a:pPr marL="0" marR="0" lvl="0" indent="0" algn="l" defTabSz="914400" rtl="0" eaLnBrk="1" fontAlgn="auto" latinLnBrk="0" hangingPunct="1">
+              <a:lnSpc>
+                <a:spcPct val="100000"/>
+              </a:lnSpc>
+              <a:spcBef>
+                <a:spcPts val="0"/>
+              </a:spcBef>
+              <a:spcAft>
+                <a:spcPts val="0"/>
+              </a:spcAft>
+              <a:buClrTx/>
+              <a:buSzTx/>
+              <a:buFontTx/>
+              <a:buNone/>
+              <a:tabLst/>
+              <a:defRPr/>
+            </a:pPr>
+            <a:r>
+              <a:rPr lang="en-US" dirty="0"/>
+              <a:t>	parties may not want to share information</a:t>
+            </a:r>
+          </a:p>
+          <a:p>
+            <a:pPr marL="0" marR="0" lvl="0" indent="0" algn="l" defTabSz="914400" rtl="0" eaLnBrk="1" fontAlgn="auto" latinLnBrk="0" hangingPunct="1">
+              <a:lnSpc>
+                <a:spcPct val="100000"/>
+              </a:lnSpc>
+              <a:spcBef>
+                <a:spcPts val="0"/>
+              </a:spcBef>
+              <a:spcAft>
+                <a:spcPts val="0"/>
+              </a:spcAft>
+              <a:buClrTx/>
+              <a:buSzTx/>
+              <a:buFontTx/>
+              <a:buNone/>
+              <a:tabLst/>
+              <a:defRPr/>
+            </a:pPr>
+            <a:endParaRPr lang="en-US" dirty="0"/>
+          </a:p>
+          <a:p>
+            <a:pPr marL="0" marR="0" lvl="0" indent="0" algn="l" defTabSz="914400" rtl="0" eaLnBrk="1" fontAlgn="auto" latinLnBrk="0" hangingPunct="1">
+              <a:lnSpc>
+                <a:spcPct val="100000"/>
+              </a:lnSpc>
+              <a:spcBef>
+                <a:spcPts val="0"/>
+              </a:spcBef>
+              <a:spcAft>
+                <a:spcPts val="0"/>
+              </a:spcAft>
+              <a:buClrTx/>
+              <a:buSzTx/>
+              <a:buFontTx/>
+              <a:buNone/>
+              <a:tabLst/>
+              <a:defRPr/>
+            </a:pPr>
+            <a:r>
+              <a:rPr lang="en-US" dirty="0"/>
+              <a:t>absence of dynamic balancing:</a:t>
+            </a:r>
+          </a:p>
+          <a:p>
+            <a:pPr marL="0" marR="0" lvl="0" indent="0" algn="l" defTabSz="914400" rtl="0" eaLnBrk="1" fontAlgn="auto" latinLnBrk="0" hangingPunct="1">
+              <a:lnSpc>
+                <a:spcPct val="100000"/>
+              </a:lnSpc>
+              <a:spcBef>
+                <a:spcPts val="0"/>
+              </a:spcBef>
+              <a:spcAft>
+                <a:spcPts val="0"/>
+              </a:spcAft>
+              <a:buClrTx/>
+              <a:buSzTx/>
+              <a:buFontTx/>
+              <a:buNone/>
+              <a:tabLst/>
+              <a:defRPr/>
+            </a:pPr>
+            <a:r>
+              <a:rPr lang="en-US" dirty="0"/>
+              <a:t>	only at highest level imbalance is corrected thereby still imbalance at lower levels</a:t>
+            </a:r>
+          </a:p>
+          <a:p>
+            <a:pPr marL="0" marR="0" lvl="0" indent="0" algn="l" defTabSz="914400" rtl="0" eaLnBrk="1" fontAlgn="auto" latinLnBrk="0" hangingPunct="1">
+              <a:lnSpc>
+                <a:spcPct val="100000"/>
+              </a:lnSpc>
+              <a:spcBef>
+                <a:spcPts val="0"/>
+              </a:spcBef>
+              <a:spcAft>
+                <a:spcPts val="0"/>
+              </a:spcAft>
+              <a:buClrTx/>
+              <a:buSzTx/>
+              <a:buFontTx/>
+              <a:buNone/>
+              <a:tabLst/>
+              <a:defRPr/>
+            </a:pPr>
+            <a:endParaRPr lang="en-US" dirty="0"/>
+          </a:p>
+          <a:p>
+            <a:pPr marL="0" marR="0" lvl="0" indent="0" algn="l" defTabSz="914400" rtl="0" eaLnBrk="1" fontAlgn="auto" latinLnBrk="0" hangingPunct="1">
+              <a:lnSpc>
+                <a:spcPct val="100000"/>
+              </a:lnSpc>
+              <a:spcBef>
+                <a:spcPts val="0"/>
+              </a:spcBef>
+              <a:spcAft>
+                <a:spcPts val="0"/>
+              </a:spcAft>
+              <a:buClrTx/>
+              <a:buSzTx/>
+              <a:buFontTx/>
+              <a:buNone/>
+              <a:tabLst/>
+              <a:defRPr/>
+            </a:pPr>
+            <a:r>
+              <a:rPr lang="en-US" dirty="0"/>
+              <a:t>cumulative imbalance:</a:t>
+            </a:r>
+          </a:p>
+          <a:p>
+            <a:pPr marL="0" marR="0" lvl="0" indent="0" algn="l" defTabSz="914400" rtl="0" eaLnBrk="1" fontAlgn="auto" latinLnBrk="0" hangingPunct="1">
+              <a:lnSpc>
+                <a:spcPct val="100000"/>
+              </a:lnSpc>
+              <a:spcBef>
+                <a:spcPts val="0"/>
+              </a:spcBef>
+              <a:spcAft>
+                <a:spcPts val="0"/>
+              </a:spcAft>
+              <a:buClrTx/>
+              <a:buSzTx/>
+              <a:buFontTx/>
+              <a:buNone/>
+              <a:tabLst/>
+              <a:defRPr/>
+            </a:pPr>
+            <a:r>
+              <a:rPr lang="en-US" dirty="0"/>
+              <a:t>	on the lowest level the imbalances are not yet a problem, but combined they become large and can overload grid inter-cluster connections</a:t>
+            </a:r>
+          </a:p>
+          <a:p>
+            <a:pPr marL="0" marR="0" lvl="0" indent="0" algn="l" defTabSz="914400" rtl="0" eaLnBrk="1" fontAlgn="auto" latinLnBrk="0" hangingPunct="1">
+              <a:lnSpc>
+                <a:spcPct val="100000"/>
+              </a:lnSpc>
+              <a:spcBef>
+                <a:spcPts val="0"/>
+              </a:spcBef>
+              <a:spcAft>
+                <a:spcPts val="0"/>
+              </a:spcAft>
+              <a:buClrTx/>
+              <a:buSzTx/>
+              <a:buFontTx/>
+              <a:buNone/>
+              <a:tabLst/>
+              <a:defRPr/>
+            </a:pPr>
+            <a:endParaRPr lang="en-US" dirty="0"/>
+          </a:p>
+          <a:p>
+            <a:pPr marL="0" marR="0" lvl="0" indent="0" algn="l" defTabSz="914400" rtl="0" eaLnBrk="1" fontAlgn="auto" latinLnBrk="0" hangingPunct="1">
+              <a:lnSpc>
+                <a:spcPct val="100000"/>
+              </a:lnSpc>
+              <a:spcBef>
+                <a:spcPts val="0"/>
+              </a:spcBef>
+              <a:spcAft>
+                <a:spcPts val="0"/>
+              </a:spcAft>
+              <a:buClrTx/>
+              <a:buSzTx/>
+              <a:buFontTx/>
+              <a:buNone/>
+              <a:tabLst/>
+              <a:defRPr/>
+            </a:pPr>
+            <a:r>
+              <a:rPr lang="en-US" dirty="0"/>
+              <a:t>multiple parties involved:</a:t>
+            </a:r>
+          </a:p>
+          <a:p>
+            <a:pPr marL="0" marR="0" lvl="0" indent="0" algn="l" defTabSz="914400" rtl="0" eaLnBrk="1" fontAlgn="auto" latinLnBrk="0" hangingPunct="1">
+              <a:lnSpc>
+                <a:spcPct val="100000"/>
+              </a:lnSpc>
+              <a:spcBef>
+                <a:spcPts val="0"/>
+              </a:spcBef>
+              <a:spcAft>
+                <a:spcPts val="0"/>
+              </a:spcAft>
+              <a:buClrTx/>
+              <a:buSzTx/>
+              <a:buFontTx/>
+              <a:buNone/>
+              <a:tabLst/>
+              <a:defRPr/>
+            </a:pPr>
+            <a:r>
+              <a:rPr lang="en-US" dirty="0"/>
+              <a:t>	for balancing many parties need to come to an agreement</a:t>
+            </a:r>
+          </a:p>
+          <a:p>
+            <a:pPr marL="0" marR="0" lvl="0" indent="0" algn="l" defTabSz="914400" rtl="0" eaLnBrk="1" fontAlgn="auto" latinLnBrk="0" hangingPunct="1">
+              <a:lnSpc>
+                <a:spcPct val="100000"/>
+              </a:lnSpc>
+              <a:spcBef>
+                <a:spcPts val="0"/>
+              </a:spcBef>
+              <a:spcAft>
+                <a:spcPts val="0"/>
+              </a:spcAft>
+              <a:buClrTx/>
+              <a:buSzTx/>
+              <a:buFontTx/>
+              <a:buNone/>
+              <a:tabLst/>
+              <a:defRPr/>
+            </a:pPr>
+            <a:r>
+              <a:rPr lang="en-US" dirty="0"/>
+              <a:t>	parties may not want to share information</a:t>
+            </a:r>
+          </a:p>
+          <a:p>
+            <a:pPr marL="0" marR="0" lvl="0" indent="0" algn="l" defTabSz="914400" rtl="0" eaLnBrk="1" fontAlgn="auto" latinLnBrk="0" hangingPunct="1">
+              <a:lnSpc>
+                <a:spcPct val="100000"/>
+              </a:lnSpc>
+              <a:spcBef>
+                <a:spcPts val="0"/>
+              </a:spcBef>
+              <a:spcAft>
+                <a:spcPts val="0"/>
+              </a:spcAft>
+              <a:buClrTx/>
+              <a:buSzTx/>
+              <a:buFontTx/>
+              <a:buNone/>
+              <a:tabLst/>
+              <a:defRPr/>
+            </a:pPr>
+            <a:endParaRPr lang="en-US" dirty="0"/>
+          </a:p>
+          <a:p>
+            <a:pPr marL="0" marR="0" lvl="0" indent="0" algn="l" defTabSz="914400" rtl="0" eaLnBrk="1" fontAlgn="auto" latinLnBrk="0" hangingPunct="1">
+              <a:lnSpc>
+                <a:spcPct val="100000"/>
+              </a:lnSpc>
+              <a:spcBef>
+                <a:spcPts val="0"/>
+              </a:spcBef>
+              <a:spcAft>
+                <a:spcPts val="0"/>
+              </a:spcAft>
+              <a:buClrTx/>
+              <a:buSzTx/>
+              <a:buFontTx/>
+              <a:buNone/>
+              <a:tabLst/>
+              <a:defRPr/>
+            </a:pPr>
+            <a:endParaRPr lang="en-US" dirty="0"/>
+          </a:p>
+          <a:p>
+            <a:pPr marL="0" marR="0" lvl="0" indent="0" algn="l" defTabSz="914400" rtl="0" eaLnBrk="1" fontAlgn="auto" latinLnBrk="0" hangingPunct="1">
+              <a:lnSpc>
+                <a:spcPct val="100000"/>
+              </a:lnSpc>
+              <a:spcBef>
+                <a:spcPts val="0"/>
+              </a:spcBef>
+              <a:spcAft>
+                <a:spcPts val="0"/>
+              </a:spcAft>
+              <a:buClrTx/>
+              <a:buSzTx/>
+              <a:buFontTx/>
+              <a:buNone/>
+              <a:tabLst/>
+              <a:defRPr/>
+            </a:pPr>
+            <a:endParaRPr lang="en-US" dirty="0"/>
+          </a:p>
+          <a:p>
+            <a:endParaRPr lang="nl-NL" dirty="0"/>
+          </a:p>
+        </p:txBody>
+      </p:sp>
+      <p:sp>
+        <p:nvSpPr>
+          <p:cNvPr id="4" name="Slide Number Placeholder 3"/>
+          <p:cNvSpPr>
+            <a:spLocks noGrp="1"/>
+          </p:cNvSpPr>
+          <p:nvPr>
+            <p:ph type="sldNum" sz="quarter" idx="10"/>
+          </p:nvPr>
+        </p:nvSpPr>
+        <p:spPr/>
+        <p:txBody>
+          <a:bodyPr/>
+          <a:lstStyle/>
+          <a:p>
+            <a:fld id="{168E5194-5D91-4137-A187-4C8F6A803743}" type="slidenum">
+              <a:rPr lang="nl-NL" smtClean="0"/>
+              <a:t>3</a:t>
+            </a:fld>
+            <a:endParaRPr lang="nl-NL"/>
+          </a:p>
+        </p:txBody>
+      </p:sp>
+    </p:spTree>
+    <p:extLst>
+      <p:ext uri="{BB962C8B-B14F-4D97-AF65-F5344CB8AC3E}">
+        <p14:creationId xmlns:p14="http://schemas.microsoft.com/office/powerpoint/2010/main" val="2498914061"/>
+      </p:ext>
+    </p:extLst>
+  </p:cSld>
+  <p:clrMapOvr>
+    <a:masterClrMapping/>
+  </p:clrMapOvr>
+</p:notes>
+</file>
+
+<file path=ppt/notesSlides/notesSlide3.xml><?xml version="1.0" encoding="utf-8"?>
+<p:notes xmlns:a="http://schemas.openxmlformats.org/drawingml/2006/main" xmlns:r="http://schemas.openxmlformats.org/officeDocument/2006/relationships" xmlns:p="http://schemas.openxmlformats.org/presentationml/2006/main">
+  <p:cSld>
+    <p:spTree>
+      <p:nvGrpSpPr>
+        <p:cNvPr id="1" name=""/>
+        <p:cNvGrpSpPr/>
+        <p:nvPr/>
+      </p:nvGrpSpPr>
+      <p:grpSpPr>
+        <a:xfrm>
+          <a:off x="0" y="0"/>
+          <a:ext cx="0" cy="0"/>
+          <a:chOff x="0" y="0"/>
+          <a:chExt cx="0" cy="0"/>
+        </a:xfrm>
+      </p:grpSpPr>
+      <p:sp>
+        <p:nvSpPr>
+          <p:cNvPr id="2" name="Slide Image Placeholder 1"/>
+          <p:cNvSpPr>
+            <a:spLocks noGrp="1" noRot="1" noChangeAspect="1"/>
+          </p:cNvSpPr>
+          <p:nvPr>
+            <p:ph type="sldImg"/>
+          </p:nvPr>
+        </p:nvSpPr>
+        <p:spPr/>
+      </p:sp>
+      <p:sp>
+        <p:nvSpPr>
+          <p:cNvPr id="3" name="Notes Placeholder 2"/>
+          <p:cNvSpPr>
+            <a:spLocks noGrp="1"/>
+          </p:cNvSpPr>
+          <p:nvPr>
+            <p:ph type="body" idx="1"/>
+          </p:nvPr>
+        </p:nvSpPr>
+        <p:spPr/>
+        <p:txBody>
+          <a:bodyPr/>
+          <a:lstStyle/>
+          <a:p>
+            <a:r>
+              <a:rPr lang="en-US" noProof="0" dirty="0"/>
+              <a:t>Clustered blockchain, each cluster own blockchain which propagates up.</a:t>
+            </a:r>
+          </a:p>
+          <a:p>
+            <a:endParaRPr lang="en-US" noProof="0" dirty="0"/>
+          </a:p>
+          <a:p>
+            <a:r>
+              <a:rPr lang="en-US" noProof="0" dirty="0"/>
+              <a:t>Each cluster balances and the remaining imbalance is send up.</a:t>
+            </a:r>
+          </a:p>
+          <a:p>
+            <a:endParaRPr lang="en-US" noProof="0" dirty="0"/>
+          </a:p>
+          <a:p>
+            <a:endParaRPr lang="en-US" noProof="0" dirty="0"/>
+          </a:p>
+        </p:txBody>
+      </p:sp>
+      <p:sp>
+        <p:nvSpPr>
+          <p:cNvPr id="4" name="Slide Number Placeholder 3"/>
+          <p:cNvSpPr>
+            <a:spLocks noGrp="1"/>
+          </p:cNvSpPr>
+          <p:nvPr>
+            <p:ph type="sldNum" sz="quarter" idx="10"/>
+          </p:nvPr>
+        </p:nvSpPr>
+        <p:spPr/>
+        <p:txBody>
+          <a:bodyPr/>
+          <a:lstStyle/>
+          <a:p>
+            <a:fld id="{168E5194-5D91-4137-A187-4C8F6A803743}" type="slidenum">
+              <a:rPr lang="nl-NL" smtClean="0"/>
+              <a:t>4</a:t>
+            </a:fld>
+            <a:endParaRPr lang="nl-NL"/>
+          </a:p>
+        </p:txBody>
+      </p:sp>
+    </p:spTree>
+    <p:extLst>
+      <p:ext uri="{BB962C8B-B14F-4D97-AF65-F5344CB8AC3E}">
+        <p14:creationId xmlns:p14="http://schemas.microsoft.com/office/powerpoint/2010/main" val="2924586827"/>
+      </p:ext>
+    </p:extLst>
+  </p:cSld>
+  <p:clrMapOvr>
+    <a:masterClrMapping/>
+  </p:clrMapOvr>
+</p:notes>
+</file>
+
+<file path=ppt/notesSlides/notesSlide4.xml><?xml version="1.0" encoding="utf-8"?>
+<p:notes xmlns:a="http://schemas.openxmlformats.org/drawingml/2006/main" xmlns:r="http://schemas.openxmlformats.org/officeDocument/2006/relationships" xmlns:p="http://schemas.openxmlformats.org/presentationml/2006/main">
+  <p:cSld>
+    <p:spTree>
+      <p:nvGrpSpPr>
+        <p:cNvPr id="1" name=""/>
+        <p:cNvGrpSpPr/>
+        <p:nvPr/>
+      </p:nvGrpSpPr>
+      <p:grpSpPr>
+        <a:xfrm>
+          <a:off x="0" y="0"/>
+          <a:ext cx="0" cy="0"/>
+          <a:chOff x="0" y="0"/>
+          <a:chExt cx="0" cy="0"/>
+        </a:xfrm>
+      </p:grpSpPr>
+      <p:sp>
+        <p:nvSpPr>
+          <p:cNvPr id="2" name="Slide Image Placeholder 1"/>
+          <p:cNvSpPr>
+            <a:spLocks noGrp="1" noRot="1" noChangeAspect="1"/>
+          </p:cNvSpPr>
+          <p:nvPr>
+            <p:ph type="sldImg"/>
+          </p:nvPr>
+        </p:nvSpPr>
+        <p:spPr/>
+      </p:sp>
+      <p:sp>
+        <p:nvSpPr>
+          <p:cNvPr id="3" name="Notes Placeholder 2"/>
+          <p:cNvSpPr>
+            <a:spLocks noGrp="1"/>
+          </p:cNvSpPr>
+          <p:nvPr>
+            <p:ph type="body" idx="1"/>
+          </p:nvPr>
+        </p:nvSpPr>
+        <p:spPr/>
+        <p:txBody>
+          <a:bodyPr/>
+          <a:lstStyle/>
+          <a:p>
+            <a:r>
+              <a:rPr lang="en-US" dirty="0"/>
+              <a:t>have a backup supplier at all time</a:t>
+            </a:r>
+          </a:p>
+          <a:p>
+            <a:endParaRPr lang="en-US" dirty="0"/>
+          </a:p>
+          <a:p>
+            <a:r>
+              <a:rPr lang="en-US" dirty="0"/>
+              <a:t>collect clients baseline consumption and their flexibility</a:t>
+            </a:r>
+          </a:p>
+          <a:p>
+            <a:endParaRPr lang="en-US" dirty="0"/>
+          </a:p>
+          <a:p>
+            <a:r>
+              <a:rPr lang="en-US" dirty="0"/>
+              <a:t>balance at the cluster level</a:t>
+            </a:r>
+          </a:p>
+          <a:p>
+            <a:endParaRPr lang="en-US" dirty="0"/>
+          </a:p>
+          <a:p>
+            <a:r>
+              <a:rPr lang="en-US" dirty="0"/>
+              <a:t>send aggregated cluster imbalance and flexibility up to intra-cluster level</a:t>
+            </a:r>
+          </a:p>
+          <a:p>
+            <a:endParaRPr lang="en-US" dirty="0"/>
+          </a:p>
+          <a:p>
+            <a:r>
+              <a:rPr lang="en-US" dirty="0"/>
+              <a:t>repeat through cluster levels until no imbalance or the root is reached</a:t>
+            </a:r>
+          </a:p>
+          <a:p>
+            <a:endParaRPr lang="nl-NL" dirty="0"/>
+          </a:p>
+        </p:txBody>
+      </p:sp>
+      <p:sp>
+        <p:nvSpPr>
+          <p:cNvPr id="4" name="Slide Number Placeholder 3"/>
+          <p:cNvSpPr>
+            <a:spLocks noGrp="1"/>
+          </p:cNvSpPr>
+          <p:nvPr>
+            <p:ph type="sldNum" sz="quarter" idx="10"/>
+          </p:nvPr>
+        </p:nvSpPr>
+        <p:spPr/>
+        <p:txBody>
+          <a:bodyPr/>
+          <a:lstStyle/>
+          <a:p>
+            <a:fld id="{168E5194-5D91-4137-A187-4C8F6A803743}" type="slidenum">
+              <a:rPr lang="nl-NL" smtClean="0"/>
+              <a:t>5</a:t>
+            </a:fld>
+            <a:endParaRPr lang="nl-NL"/>
+          </a:p>
+        </p:txBody>
+      </p:sp>
+    </p:spTree>
+    <p:extLst>
+      <p:ext uri="{BB962C8B-B14F-4D97-AF65-F5344CB8AC3E}">
+        <p14:creationId xmlns:p14="http://schemas.microsoft.com/office/powerpoint/2010/main" val="3891678849"/>
+      </p:ext>
+    </p:extLst>
+  </p:cSld>
+  <p:clrMapOvr>
+    <a:masterClrMapping/>
+  </p:clrMapOvr>
+</p:notes>
+</file>
+
+<file path=ppt/notesSlides/notesSlide5.xml><?xml version="1.0" encoding="utf-8"?>
+<p:notes xmlns:a="http://schemas.openxmlformats.org/drawingml/2006/main" xmlns:r="http://schemas.openxmlformats.org/officeDocument/2006/relationships" xmlns:p="http://schemas.openxmlformats.org/presentationml/2006/main">
+  <p:cSld>
+    <p:spTree>
+      <p:nvGrpSpPr>
+        <p:cNvPr id="1" name=""/>
+        <p:cNvGrpSpPr/>
+        <p:nvPr/>
+      </p:nvGrpSpPr>
+      <p:grpSpPr>
+        <a:xfrm>
+          <a:off x="0" y="0"/>
+          <a:ext cx="0" cy="0"/>
+          <a:chOff x="0" y="0"/>
+          <a:chExt cx="0" cy="0"/>
+        </a:xfrm>
+      </p:grpSpPr>
+      <p:sp>
+        <p:nvSpPr>
+          <p:cNvPr id="2" name="Slide Image Placeholder 1"/>
+          <p:cNvSpPr>
+            <a:spLocks noGrp="1" noRot="1" noChangeAspect="1"/>
+          </p:cNvSpPr>
+          <p:nvPr>
+            <p:ph type="sldImg"/>
+          </p:nvPr>
+        </p:nvSpPr>
+        <p:spPr/>
+      </p:sp>
+      <p:sp>
+        <p:nvSpPr>
+          <p:cNvPr id="3" name="Notes Placeholder 2"/>
+          <p:cNvSpPr>
+            <a:spLocks noGrp="1"/>
+          </p:cNvSpPr>
+          <p:nvPr>
+            <p:ph type="body" idx="1"/>
+          </p:nvPr>
+        </p:nvSpPr>
+        <p:spPr/>
+        <p:txBody>
+          <a:bodyPr/>
+          <a:lstStyle/>
+          <a:p>
+            <a:r>
+              <a:rPr lang="en-US" dirty="0"/>
+              <a:t>multiple parties collaborate in a single market</a:t>
+            </a:r>
+          </a:p>
+          <a:p>
+            <a:endParaRPr lang="en-US" dirty="0"/>
+          </a:p>
+          <a:p>
+            <a:r>
+              <a:rPr lang="en-US" dirty="0"/>
+              <a:t>lack of trust between the parties</a:t>
+            </a:r>
+          </a:p>
+          <a:p>
+            <a:endParaRPr lang="en-US" dirty="0"/>
+          </a:p>
+          <a:p>
+            <a:r>
+              <a:rPr lang="en-US" dirty="0"/>
+              <a:t>permissioned blockchain mirrors highly regulated environment</a:t>
+            </a:r>
+          </a:p>
+          <a:p>
+            <a:endParaRPr lang="en-US" dirty="0"/>
+          </a:p>
+          <a:p>
+            <a:r>
+              <a:rPr lang="en-US" dirty="0"/>
+              <a:t>proof of stake is more energy efficient and suitable for permissioned blockchain</a:t>
+            </a:r>
+          </a:p>
+          <a:p>
+            <a:endParaRPr lang="en-US" dirty="0"/>
+          </a:p>
+          <a:p>
+            <a:r>
+              <a:rPr lang="en-US" dirty="0" err="1"/>
+              <a:t>tendermint</a:t>
+            </a:r>
+            <a:r>
+              <a:rPr lang="en-US" dirty="0"/>
+              <a:t> is agnostic of application logic but has BFT consensus across validators and messaging implemented out of box</a:t>
+            </a:r>
+          </a:p>
+          <a:p>
+            <a:endParaRPr lang="nl-NL" dirty="0"/>
+          </a:p>
+        </p:txBody>
+      </p:sp>
+      <p:sp>
+        <p:nvSpPr>
+          <p:cNvPr id="4" name="Slide Number Placeholder 3"/>
+          <p:cNvSpPr>
+            <a:spLocks noGrp="1"/>
+          </p:cNvSpPr>
+          <p:nvPr>
+            <p:ph type="sldNum" sz="quarter" idx="10"/>
+          </p:nvPr>
+        </p:nvSpPr>
+        <p:spPr/>
+        <p:txBody>
+          <a:bodyPr/>
+          <a:lstStyle/>
+          <a:p>
+            <a:fld id="{168E5194-5D91-4137-A187-4C8F6A803743}" type="slidenum">
+              <a:rPr lang="nl-NL" smtClean="0"/>
+              <a:t>6</a:t>
+            </a:fld>
+            <a:endParaRPr lang="nl-NL"/>
+          </a:p>
+        </p:txBody>
+      </p:sp>
+    </p:spTree>
+    <p:extLst>
+      <p:ext uri="{BB962C8B-B14F-4D97-AF65-F5344CB8AC3E}">
+        <p14:creationId xmlns:p14="http://schemas.microsoft.com/office/powerpoint/2010/main" val="2398196183"/>
+      </p:ext>
+    </p:extLst>
+  </p:cSld>
+  <p:clrMapOvr>
+    <a:masterClrMapping/>
+  </p:clrMapOvr>
+</p:notes>
+</file>
+
+<file path=ppt/notesSlides/notesSlide6.xml><?xml version="1.0" encoding="utf-8"?>
+<p:notes xmlns:a="http://schemas.openxmlformats.org/drawingml/2006/main" xmlns:r="http://schemas.openxmlformats.org/officeDocument/2006/relationships" xmlns:p="http://schemas.openxmlformats.org/presentationml/2006/main">
+  <p:cSld>
+    <p:spTree>
+      <p:nvGrpSpPr>
+        <p:cNvPr id="1" name=""/>
+        <p:cNvGrpSpPr/>
+        <p:nvPr/>
+      </p:nvGrpSpPr>
+      <p:grpSpPr>
+        <a:xfrm>
+          <a:off x="0" y="0"/>
+          <a:ext cx="0" cy="0"/>
+          <a:chOff x="0" y="0"/>
+          <a:chExt cx="0" cy="0"/>
+        </a:xfrm>
+      </p:grpSpPr>
+      <p:sp>
+        <p:nvSpPr>
+          <p:cNvPr id="2" name="Slide Image Placeholder 1"/>
+          <p:cNvSpPr>
+            <a:spLocks noGrp="1" noRot="1" noChangeAspect="1"/>
+          </p:cNvSpPr>
+          <p:nvPr>
+            <p:ph type="sldImg"/>
+          </p:nvPr>
+        </p:nvSpPr>
+        <p:spPr/>
+      </p:sp>
+      <p:sp>
+        <p:nvSpPr>
+          <p:cNvPr id="3" name="Notes Placeholder 2"/>
+          <p:cNvSpPr>
+            <a:spLocks noGrp="1"/>
+          </p:cNvSpPr>
+          <p:nvPr>
+            <p:ph type="body" idx="1"/>
+          </p:nvPr>
+        </p:nvSpPr>
+        <p:spPr/>
+        <p:txBody>
+          <a:bodyPr/>
+          <a:lstStyle/>
+          <a:p>
+            <a:endParaRPr lang="nl-NL" dirty="0"/>
+          </a:p>
+        </p:txBody>
+      </p:sp>
+      <p:sp>
+        <p:nvSpPr>
+          <p:cNvPr id="4" name="Slide Number Placeholder 3"/>
+          <p:cNvSpPr>
+            <a:spLocks noGrp="1"/>
+          </p:cNvSpPr>
+          <p:nvPr>
+            <p:ph type="sldNum" sz="quarter" idx="10"/>
+          </p:nvPr>
+        </p:nvSpPr>
+        <p:spPr/>
+        <p:txBody>
+          <a:bodyPr/>
+          <a:lstStyle/>
+          <a:p>
+            <a:fld id="{168E5194-5D91-4137-A187-4C8F6A803743}" type="slidenum">
+              <a:rPr lang="nl-NL" smtClean="0"/>
+              <a:t>7</a:t>
+            </a:fld>
+            <a:endParaRPr lang="nl-NL"/>
+          </a:p>
+        </p:txBody>
+      </p:sp>
+    </p:spTree>
+    <p:extLst>
+      <p:ext uri="{BB962C8B-B14F-4D97-AF65-F5344CB8AC3E}">
+        <p14:creationId xmlns:p14="http://schemas.microsoft.com/office/powerpoint/2010/main" val="2156123126"/>
+      </p:ext>
+    </p:extLst>
+  </p:cSld>
+  <p:clrMapOvr>
+    <a:masterClrMapping/>
+  </p:clrMapOvr>
+</p:notes>
+</file>
+
+<file path=ppt/notesSlides/notesSlide7.xml><?xml version="1.0" encoding="utf-8"?>
+<p:notes xmlns:a="http://schemas.openxmlformats.org/drawingml/2006/main" xmlns:r="http://schemas.openxmlformats.org/officeDocument/2006/relationships" xmlns:p="http://schemas.openxmlformats.org/presentationml/2006/main">
+  <p:cSld>
+    <p:spTree>
+      <p:nvGrpSpPr>
+        <p:cNvPr id="1" name=""/>
+        <p:cNvGrpSpPr/>
+        <p:nvPr/>
+      </p:nvGrpSpPr>
+      <p:grpSpPr>
+        <a:xfrm>
+          <a:off x="0" y="0"/>
+          <a:ext cx="0" cy="0"/>
+          <a:chOff x="0" y="0"/>
+          <a:chExt cx="0" cy="0"/>
+        </a:xfrm>
+      </p:grpSpPr>
+      <p:sp>
+        <p:nvSpPr>
+          <p:cNvPr id="2" name="Slide Image Placeholder 1"/>
+          <p:cNvSpPr>
+            <a:spLocks noGrp="1" noRot="1" noChangeAspect="1"/>
+          </p:cNvSpPr>
+          <p:nvPr>
+            <p:ph type="sldImg"/>
+          </p:nvPr>
+        </p:nvSpPr>
+        <p:spPr/>
+      </p:sp>
+      <p:sp>
+        <p:nvSpPr>
+          <p:cNvPr id="3" name="Notes Placeholder 2"/>
+          <p:cNvSpPr>
+            <a:spLocks noGrp="1"/>
+          </p:cNvSpPr>
+          <p:nvPr>
+            <p:ph type="body" idx="1"/>
+          </p:nvPr>
+        </p:nvSpPr>
+        <p:spPr/>
+        <p:txBody>
+          <a:bodyPr/>
+          <a:lstStyle/>
+          <a:p>
+            <a:endParaRPr lang="nl-NL"/>
+          </a:p>
+        </p:txBody>
+      </p:sp>
+      <p:sp>
+        <p:nvSpPr>
+          <p:cNvPr id="4" name="Slide Number Placeholder 3"/>
+          <p:cNvSpPr>
+            <a:spLocks noGrp="1"/>
+          </p:cNvSpPr>
+          <p:nvPr>
+            <p:ph type="sldNum" sz="quarter" idx="10"/>
+          </p:nvPr>
+        </p:nvSpPr>
+        <p:spPr/>
+        <p:txBody>
+          <a:bodyPr/>
+          <a:lstStyle/>
+          <a:p>
+            <a:fld id="{168E5194-5D91-4137-A187-4C8F6A803743}" type="slidenum">
+              <a:rPr lang="nl-NL" smtClean="0"/>
+              <a:t>10</a:t>
+            </a:fld>
+            <a:endParaRPr lang="nl-NL"/>
+          </a:p>
+        </p:txBody>
+      </p:sp>
+    </p:spTree>
+    <p:extLst>
+      <p:ext uri="{BB962C8B-B14F-4D97-AF65-F5344CB8AC3E}">
+        <p14:creationId xmlns:p14="http://schemas.microsoft.com/office/powerpoint/2010/main" val="2212025423"/>
+      </p:ext>
+    </p:extLst>
+  </p:cSld>
+  <p:clrMapOvr>
+    <a:masterClrMapping/>
+  </p:clrMapOvr>
+</p:notes>
 </file>
 
 <file path=ppt/slideLayouts/slideLayout1.xml><?xml version="1.0" encoding="utf-8"?>
@@ -2568,19 +4400,13 @@
           <a:p>
             <a:r>
               <a:rPr lang="en-US" dirty="0"/>
-              <a:t>imbalance caused by unpredictable consumers and producers</a:t>
-            </a:r>
-          </a:p>
-          <a:p>
-            <a:r>
-              <a:rPr lang="en-US" dirty="0"/>
-              <a:t>consumers are also becoming producers</a:t>
-            </a:r>
-          </a:p>
-          <a:p>
-            <a:r>
-              <a:rPr lang="en-US" dirty="0"/>
-              <a:t>intermittent sources vs old fashioned powerplant-household configuration</a:t>
+              <a:t>unpredictable consumers and producers</a:t>
+            </a:r>
+          </a:p>
+          <a:p>
+            <a:r>
+              <a:rPr lang="en-US" dirty="0"/>
+              <a:t>consumers become producers</a:t>
             </a:r>
           </a:p>
         </p:txBody>
@@ -2650,7 +4476,7 @@
         <p:spPr/>
         <p:txBody>
           <a:bodyPr>
-            <a:normAutofit fontScale="92500" lnSpcReduction="10000"/>
+            <a:normAutofit/>
           </a:bodyPr>
           <a:lstStyle/>
           <a:p>
@@ -2668,20 +4494,26 @@
           <a:p>
             <a:r>
               <a:rPr lang="en-US" dirty="0"/>
+              <a:t>absence of dynamic balancing</a:t>
+            </a:r>
+          </a:p>
+          <a:p>
+            <a:r>
+              <a:rPr lang="en-US" dirty="0"/>
+              <a:t>cumulative imbalance</a:t>
+            </a:r>
+          </a:p>
+          <a:p>
+            <a:r>
+              <a:rPr lang="en-US" dirty="0"/>
               <a:t>multiple parties involved</a:t>
             </a:r>
           </a:p>
           <a:p>
-            <a:r>
-              <a:rPr lang="en-US" dirty="0"/>
-              <a:t>absence of dynamic balancing</a:t>
-            </a:r>
-          </a:p>
-          <a:p>
-            <a:r>
-              <a:rPr lang="en-US" dirty="0"/>
-              <a:t>on the lowest level the imbalances are not yet a problem, but combined they become large and can overload grid inter-cluster connections</a:t>
-            </a:r>
+            <a:pPr marL="0" indent="0">
+              <a:buNone/>
+            </a:pPr>
+            <a:endParaRPr lang="en-US" dirty="0"/>
           </a:p>
           <a:p>
             <a:endParaRPr lang="en-US" dirty="0"/>
@@ -2766,7 +4598,7 @@
           <p:nvPr/>
         </p:nvPicPr>
         <p:blipFill>
-          <a:blip r:embed="rId2"/>
+          <a:blip r:embed="rId3"/>
           <a:stretch>
             <a:fillRect/>
           </a:stretch>
@@ -2851,19 +4683,19 @@
         </p:spPr>
         <p:txBody>
           <a:bodyPr>
-            <a:normAutofit lnSpcReduction="10000"/>
+            <a:normAutofit/>
           </a:bodyPr>
           <a:lstStyle/>
           <a:p>
             <a:r>
               <a:rPr lang="en-US" dirty="0"/>
-              <a:t>have a backup supplier at all time</a:t>
-            </a:r>
-          </a:p>
-          <a:p>
-            <a:r>
-              <a:rPr lang="en-US" dirty="0"/>
-              <a:t>collect clients baseline consumption and their flexibility</a:t>
+              <a:t>backup supplier</a:t>
+            </a:r>
+          </a:p>
+          <a:p>
+            <a:r>
+              <a:rPr lang="en-US" dirty="0"/>
+              <a:t>baseline consumption and flexibility</a:t>
             </a:r>
           </a:p>
           <a:p>
@@ -2875,13 +4707,13 @@
           <a:p>
             <a:r>
               <a:rPr lang="en-US" dirty="0"/>
-              <a:t>send aggregated cluster imbalance and flexibility up to intra-cluster level</a:t>
-            </a:r>
-          </a:p>
-          <a:p>
-            <a:r>
-              <a:rPr lang="en-US" dirty="0"/>
-              <a:t>repeat through cluster levels until no imbalance or the root is reached</a:t>
+              <a:t>cluster imbalance and flexibility send up </a:t>
+            </a:r>
+          </a:p>
+          <a:p>
+            <a:r>
+              <a:rPr lang="en-US" dirty="0"/>
+              <a:t>Repeat until at top</a:t>
             </a:r>
           </a:p>
         </p:txBody>
@@ -2966,35 +4798,31 @@
         </p:spPr>
         <p:txBody>
           <a:bodyPr>
-            <a:normAutofit fontScale="92500" lnSpcReduction="20000"/>
+            <a:normAutofit/>
           </a:bodyPr>
           <a:lstStyle/>
           <a:p>
             <a:r>
               <a:rPr lang="en-US" dirty="0"/>
-              <a:t>multiple parties collaborate in a single market</a:t>
-            </a:r>
-          </a:p>
-          <a:p>
-            <a:r>
-              <a:rPr lang="en-US" dirty="0"/>
-              <a:t>lack of trust between the parties</a:t>
-            </a:r>
-          </a:p>
-          <a:p>
-            <a:r>
-              <a:rPr lang="en-US" dirty="0"/>
-              <a:t>permissioned blockchain mirrors highly regulated environment</a:t>
-            </a:r>
-          </a:p>
-          <a:p>
-            <a:r>
-              <a:rPr lang="en-US"/>
-              <a:t>proof </a:t>
-            </a:r>
-            <a:r>
-              <a:rPr lang="en-US" dirty="0"/>
-              <a:t>of stake is more energy efficient and suitable for permissioned blockchain</a:t>
+              <a:t>multiple parties on a single market</a:t>
+            </a:r>
+          </a:p>
+          <a:p>
+            <a:r>
+              <a:rPr lang="en-US" dirty="0"/>
+              <a:t>no trust between parties</a:t>
+            </a:r>
+          </a:p>
+          <a:p>
+            <a:r>
+              <a:rPr lang="en-US" dirty="0"/>
+              <a:t>permissioned blockchain</a:t>
+            </a:r>
+          </a:p>
+          <a:p>
+            <a:r>
+              <a:rPr lang="en-US" dirty="0"/>
+              <a:t>proof of stake</a:t>
             </a:r>
           </a:p>
           <a:p>
@@ -3002,12 +4830,6 @@
               <a:rPr lang="en-US" dirty="0" err="1"/>
               <a:t>tendermint</a:t>
             </a:r>
-            <a:r>
-              <a:rPr lang="en-US" dirty="0"/>
-              <a:t> is agnostic of application logic but has BFT consensus across validators and messaging implemented out of box</a:t>
-            </a:r>
-          </a:p>
-          <a:p>
             <a:endParaRPr lang="en-US" dirty="0"/>
           </a:p>
         </p:txBody>
@@ -4075,6 +5897,301 @@
         <a:sysClr val="window" lastClr="FFFFFF"/>
       </a:lt1>
       <a:dk2>
+        <a:srgbClr val="44546A"/>
+      </a:dk2>
+      <a:lt2>
+        <a:srgbClr val="E7E6E6"/>
+      </a:lt2>
+      <a:accent1>
+        <a:srgbClr val="4472C4"/>
+      </a:accent1>
+      <a:accent2>
+        <a:srgbClr val="ED7D31"/>
+      </a:accent2>
+      <a:accent3>
+        <a:srgbClr val="A5A5A5"/>
+      </a:accent3>
+      <a:accent4>
+        <a:srgbClr val="FFC000"/>
+      </a:accent4>
+      <a:accent5>
+        <a:srgbClr val="5B9BD5"/>
+      </a:accent5>
+      <a:accent6>
+        <a:srgbClr val="70AD47"/>
+      </a:accent6>
+      <a:hlink>
+        <a:srgbClr val="0563C1"/>
+      </a:hlink>
+      <a:folHlink>
+        <a:srgbClr val="954F72"/>
+      </a:folHlink>
+    </a:clrScheme>
+    <a:fontScheme name="Office">
+      <a:majorFont>
+        <a:latin typeface="Calibri Light" panose="020F0302020204030204"/>
+        <a:ea typeface=""/>
+        <a:cs typeface=""/>
+        <a:font script="Jpan" typeface="游ゴシック Light"/>
+        <a:font script="Hang" typeface="맑은 고딕"/>
+        <a:font script="Hans" typeface="等线 Light"/>
+        <a:font script="Hant" typeface="新細明體"/>
+        <a:font script="Arab" typeface="Times New Roman"/>
+        <a:font script="Hebr" typeface="Times New Roman"/>
+        <a:font script="Thai" typeface="Angsana New"/>
+        <a:font script="Ethi" typeface="Nyala"/>
+        <a:font script="Beng" typeface="Vrinda"/>
+        <a:font script="Gujr" typeface="Shruti"/>
+        <a:font script="Khmr" typeface="MoolBoran"/>
+        <a:font script="Knda" typeface="Tunga"/>
+        <a:font script="Guru" typeface="Raavi"/>
+        <a:font script="Cans" typeface="Euphemia"/>
+        <a:font script="Cher" typeface="Plantagenet Cherokee"/>
+        <a:font script="Yiii" typeface="Microsoft Yi Baiti"/>
+        <a:font script="Tibt" typeface="Microsoft Himalaya"/>
+        <a:font script="Thaa" typeface="MV Boli"/>
+        <a:font script="Deva" typeface="Mangal"/>
+        <a:font script="Telu" typeface="Gautami"/>
+        <a:font script="Taml" typeface="Latha"/>
+        <a:font script="Syrc" typeface="Estrangelo Edessa"/>
+        <a:font script="Orya" typeface="Kalinga"/>
+        <a:font script="Mlym" typeface="Kartika"/>
+        <a:font script="Laoo" typeface="DokChampa"/>
+        <a:font script="Sinh" typeface="Iskoola Pota"/>
+        <a:font script="Mong" typeface="Mongolian Baiti"/>
+        <a:font script="Viet" typeface="Times New Roman"/>
+        <a:font script="Uigh" typeface="Microsoft Uighur"/>
+        <a:font script="Geor" typeface="Sylfaen"/>
+        <a:font script="Armn" typeface="Arial"/>
+        <a:font script="Bugi" typeface="Leelawadee UI"/>
+        <a:font script="Bopo" typeface="Microsoft JhengHei"/>
+        <a:font script="Java" typeface="Javanese Text"/>
+        <a:font script="Lisu" typeface="Segoe UI"/>
+        <a:font script="Mymr" typeface="Myanmar Text"/>
+        <a:font script="Nkoo" typeface="Ebrima"/>
+        <a:font script="Olck" typeface="Nirmala UI"/>
+        <a:font script="Osma" typeface="Ebrima"/>
+        <a:font script="Phag" typeface="Phagspa"/>
+        <a:font script="Syrn" typeface="Estrangelo Edessa"/>
+        <a:font script="Syrj" typeface="Estrangelo Edessa"/>
+        <a:font script="Syre" typeface="Estrangelo Edessa"/>
+        <a:font script="Sora" typeface="Nirmala UI"/>
+        <a:font script="Tale" typeface="Microsoft Tai Le"/>
+        <a:font script="Talu" typeface="Microsoft New Tai Lue"/>
+        <a:font script="Tfng" typeface="Ebrima"/>
+      </a:majorFont>
+      <a:minorFont>
+        <a:latin typeface="Calibri" panose="020F0502020204030204"/>
+        <a:ea typeface=""/>
+        <a:cs typeface=""/>
+        <a:font script="Jpan" typeface="游ゴシック"/>
+        <a:font script="Hang" typeface="맑은 고딕"/>
+        <a:font script="Hans" typeface="等线"/>
+        <a:font script="Hant" typeface="新細明體"/>
+        <a:font script="Arab" typeface="Arial"/>
+        <a:font script="Hebr" typeface="Arial"/>
+        <a:font script="Thai" typeface="Cordia New"/>
+        <a:font script="Ethi" typeface="Nyala"/>
+        <a:font script="Beng" typeface="Vrinda"/>
+        <a:font script="Gujr" typeface="Shruti"/>
+        <a:font script="Khmr" typeface="DaunPenh"/>
+        <a:font script="Knda" typeface="Tunga"/>
+        <a:font script="Guru" typeface="Raavi"/>
+        <a:font script="Cans" typeface="Euphemia"/>
+        <a:font script="Cher" typeface="Plantagenet Cherokee"/>
+        <a:font script="Yiii" typeface="Microsoft Yi Baiti"/>
+        <a:font script="Tibt" typeface="Microsoft Himalaya"/>
+        <a:font script="Thaa" typeface="MV Boli"/>
+        <a:font script="Deva" typeface="Mangal"/>
+        <a:font script="Telu" typeface="Gautami"/>
+        <a:font script="Taml" typeface="Latha"/>
+        <a:font script="Syrc" typeface="Estrangelo Edessa"/>
+        <a:font script="Orya" typeface="Kalinga"/>
+        <a:font script="Mlym" typeface="Kartika"/>
+        <a:font script="Laoo" typeface="DokChampa"/>
+        <a:font script="Sinh" typeface="Iskoola Pota"/>
+        <a:font script="Mong" typeface="Mongolian Baiti"/>
+        <a:font script="Viet" typeface="Arial"/>
+        <a:font script="Uigh" typeface="Microsoft Uighur"/>
+        <a:font script="Geor" typeface="Sylfaen"/>
+        <a:font script="Armn" typeface="Arial"/>
+        <a:font script="Bugi" typeface="Leelawadee UI"/>
+        <a:font script="Bopo" typeface="Microsoft JhengHei"/>
+        <a:font script="Java" typeface="Javanese Text"/>
+        <a:font script="Lisu" typeface="Segoe UI"/>
+        <a:font script="Mymr" typeface="Myanmar Text"/>
+        <a:font script="Nkoo" typeface="Ebrima"/>
+        <a:font script="Olck" typeface="Nirmala UI"/>
+        <a:font script="Osma" typeface="Ebrima"/>
+        <a:font script="Phag" typeface="Phagspa"/>
+        <a:font script="Syrn" typeface="Estrangelo Edessa"/>
+        <a:font script="Syrj" typeface="Estrangelo Edessa"/>
+        <a:font script="Syre" typeface="Estrangelo Edessa"/>
+        <a:font script="Sora" typeface="Nirmala UI"/>
+        <a:font script="Tale" typeface="Microsoft Tai Le"/>
+        <a:font script="Talu" typeface="Microsoft New Tai Lue"/>
+        <a:font script="Tfng" typeface="Ebrima"/>
+      </a:minorFont>
+    </a:fontScheme>
+    <a:fmtScheme name="Office">
+      <a:fillStyleLst>
+        <a:solidFill>
+          <a:schemeClr val="phClr"/>
+        </a:solidFill>
+        <a:gradFill rotWithShape="1">
+          <a:gsLst>
+            <a:gs pos="0">
+              <a:schemeClr val="phClr">
+                <a:lumMod val="110000"/>
+                <a:satMod val="105000"/>
+                <a:tint val="67000"/>
+              </a:schemeClr>
+            </a:gs>
+            <a:gs pos="50000">
+              <a:schemeClr val="phClr">
+                <a:lumMod val="105000"/>
+                <a:satMod val="103000"/>
+                <a:tint val="73000"/>
+              </a:schemeClr>
+            </a:gs>
+            <a:gs pos="100000">
+              <a:schemeClr val="phClr">
+                <a:lumMod val="105000"/>
+                <a:satMod val="109000"/>
+                <a:tint val="81000"/>
+              </a:schemeClr>
+            </a:gs>
+          </a:gsLst>
+          <a:lin ang="5400000" scaled="0"/>
+        </a:gradFill>
+        <a:gradFill rotWithShape="1">
+          <a:gsLst>
+            <a:gs pos="0">
+              <a:schemeClr val="phClr">
+                <a:satMod val="103000"/>
+                <a:lumMod val="102000"/>
+                <a:tint val="94000"/>
+              </a:schemeClr>
+            </a:gs>
+            <a:gs pos="50000">
+              <a:schemeClr val="phClr">
+                <a:satMod val="110000"/>
+                <a:lumMod val="100000"/>
+                <a:shade val="100000"/>
+              </a:schemeClr>
+            </a:gs>
+            <a:gs pos="100000">
+              <a:schemeClr val="phClr">
+                <a:lumMod val="99000"/>
+                <a:satMod val="120000"/>
+                <a:shade val="78000"/>
+              </a:schemeClr>
+            </a:gs>
+          </a:gsLst>
+          <a:lin ang="5400000" scaled="0"/>
+        </a:gradFill>
+      </a:fillStyleLst>
+      <a:lnStyleLst>
+        <a:ln w="6350" cap="flat" cmpd="sng" algn="ctr">
+          <a:solidFill>
+            <a:schemeClr val="phClr"/>
+          </a:solidFill>
+          <a:prstDash val="solid"/>
+          <a:miter lim="800000"/>
+        </a:ln>
+        <a:ln w="12700" cap="flat" cmpd="sng" algn="ctr">
+          <a:solidFill>
+            <a:schemeClr val="phClr"/>
+          </a:solidFill>
+          <a:prstDash val="solid"/>
+          <a:miter lim="800000"/>
+        </a:ln>
+        <a:ln w="19050" cap="flat" cmpd="sng" algn="ctr">
+          <a:solidFill>
+            <a:schemeClr val="phClr"/>
+          </a:solidFill>
+          <a:prstDash val="solid"/>
+          <a:miter lim="800000"/>
+        </a:ln>
+      </a:lnStyleLst>
+      <a:effectStyleLst>
+        <a:effectStyle>
+          <a:effectLst/>
+        </a:effectStyle>
+        <a:effectStyle>
+          <a:effectLst/>
+        </a:effectStyle>
+        <a:effectStyle>
+          <a:effectLst>
+            <a:outerShdw blurRad="57150" dist="19050" dir="5400000" algn="ctr" rotWithShape="0">
+              <a:srgbClr val="000000">
+                <a:alpha val="63000"/>
+              </a:srgbClr>
+            </a:outerShdw>
+          </a:effectLst>
+        </a:effectStyle>
+      </a:effectStyleLst>
+      <a:bgFillStyleLst>
+        <a:solidFill>
+          <a:schemeClr val="phClr"/>
+        </a:solidFill>
+        <a:solidFill>
+          <a:schemeClr val="phClr">
+            <a:tint val="95000"/>
+            <a:satMod val="170000"/>
+          </a:schemeClr>
+        </a:solidFill>
+        <a:gradFill rotWithShape="1">
+          <a:gsLst>
+            <a:gs pos="0">
+              <a:schemeClr val="phClr">
+                <a:tint val="93000"/>
+                <a:satMod val="150000"/>
+                <a:shade val="98000"/>
+                <a:lumMod val="102000"/>
+              </a:schemeClr>
+            </a:gs>
+            <a:gs pos="50000">
+              <a:schemeClr val="phClr">
+                <a:tint val="98000"/>
+                <a:satMod val="130000"/>
+                <a:shade val="90000"/>
+                <a:lumMod val="103000"/>
+              </a:schemeClr>
+            </a:gs>
+            <a:gs pos="100000">
+              <a:schemeClr val="phClr">
+                <a:shade val="63000"/>
+                <a:satMod val="120000"/>
+              </a:schemeClr>
+            </a:gs>
+          </a:gsLst>
+          <a:lin ang="5400000" scaled="0"/>
+        </a:gradFill>
+      </a:bgFillStyleLst>
+    </a:fmtScheme>
+  </a:themeElements>
+  <a:objectDefaults/>
+  <a:extraClrSchemeLst/>
+  <a:extLst>
+    <a:ext uri="{05A4C25C-085E-4340-85A3-A5531E510DB2}">
+      <thm15:themeFamily xmlns:thm15="http://schemas.microsoft.com/office/thememl/2012/main" name="Office Theme" id="{62F939B6-93AF-4DB8-9C6B-D6C7DFDC589F}" vid="{4A3C46E8-61CC-4603-A589-7422A47A8E4A}"/>
+    </a:ext>
+  </a:extLst>
+</a:theme>
+</file>
+
+<file path=ppt/theme/theme4.xml><?xml version="1.0" encoding="utf-8"?>
+<a:theme xmlns:a="http://schemas.openxmlformats.org/drawingml/2006/main" name="Office Theme">
+  <a:themeElements>
+    <a:clrScheme name="Office">
+      <a:dk1>
+        <a:sysClr val="windowText" lastClr="000000"/>
+      </a:dk1>
+      <a:lt1>
+        <a:sysClr val="window" lastClr="FFFFFF"/>
+      </a:lt1>
+      <a:dk2>
         <a:srgbClr val="1F497D"/>
       </a:dk2>
       <a:lt2>

</xml_diff>